<commit_message>
Updated Review3 PPT in Review Folder
</commit_message>
<xml_diff>
--- a/Review/review3.pptx
+++ b/Review/review3.pptx
@@ -1514,11 +1514,11 @@
     <dgm:cxn modelId="{E2CCB81D-6DAD-48FC-8CB0-E60C1786F7AC}" srcId="{A0A53B87-62DC-4AED-9C5A-0B6E15C22349}" destId="{06C86882-3F05-456E-83C0-D255BB878372}" srcOrd="4" destOrd="0" parTransId="{B386C92A-0310-49A4-BF2D-DE1E1ABCFC7B}" sibTransId="{6BA6C88D-DB67-4649-9B19-BF50CF93F081}"/>
     <dgm:cxn modelId="{E6AADB35-7842-4267-8B5C-52649B59B7C5}" srcId="{A0A53B87-62DC-4AED-9C5A-0B6E15C22349}" destId="{635C8A57-031A-4E5C-990C-7CB76A99AC2C}" srcOrd="2" destOrd="0" parTransId="{D7858CB9-4FBD-47B3-B477-C6D52C0CF0B9}" sibTransId="{EE85D5C1-C6FB-4AEC-B47E-D0A2A4703B11}"/>
     <dgm:cxn modelId="{37B874C6-4311-4ECA-A692-ADC9DF440494}" type="presOf" srcId="{B698D731-9C8F-4CC2-8D55-1C3E5E1DEAE0}" destId="{056207CF-9F58-405F-A833-F7586576B34E}" srcOrd="0" destOrd="0" presId="urn:microsoft.com/office/officeart/2005/8/layout/process1"/>
+    <dgm:cxn modelId="{B1CFAFA9-9C7A-4F8A-88F3-C542AB4ABC11}" type="presOf" srcId="{A0A53B87-62DC-4AED-9C5A-0B6E15C22349}" destId="{A317762D-84C5-4AD3-A0BC-58B4FD2F6595}" srcOrd="0" destOrd="0" presId="urn:microsoft.com/office/officeart/2005/8/layout/process1"/>
     <dgm:cxn modelId="{7226A391-66D7-46C9-89EA-774BC5A3B37E}" type="presOf" srcId="{A93EF5DE-7609-4209-A000-05A3889A49DA}" destId="{6F5942D6-A099-4E54-BD92-BF4593AD4572}" srcOrd="1" destOrd="0" presId="urn:microsoft.com/office/officeart/2005/8/layout/process1"/>
-    <dgm:cxn modelId="{B1CFAFA9-9C7A-4F8A-88F3-C542AB4ABC11}" type="presOf" srcId="{A0A53B87-62DC-4AED-9C5A-0B6E15C22349}" destId="{A317762D-84C5-4AD3-A0BC-58B4FD2F6595}" srcOrd="0" destOrd="0" presId="urn:microsoft.com/office/officeart/2005/8/layout/process1"/>
     <dgm:cxn modelId="{634E6FC1-12C9-40A0-AC01-211EBDCBD62C}" type="presOf" srcId="{FA8EBFA3-5BB2-43A9-8F1A-082198A0D149}" destId="{63A1EDBC-80C2-4C39-8AB1-49894774D360}" srcOrd="0" destOrd="0" presId="urn:microsoft.com/office/officeart/2005/8/layout/process1"/>
+    <dgm:cxn modelId="{7EEB19A9-42E2-49BE-BDD5-147D5CFD8FC9}" type="presOf" srcId="{E8B8F4BF-4CE5-46DB-B87C-8D4A37602DC5}" destId="{FCE56590-496D-4FD5-85DE-89534EF95893}" srcOrd="0" destOrd="0" presId="urn:microsoft.com/office/officeart/2005/8/layout/process1"/>
     <dgm:cxn modelId="{39ABA518-6C74-480F-9AD6-408EF200CA19}" type="presOf" srcId="{EE85D5C1-C6FB-4AEC-B47E-D0A2A4703B11}" destId="{DE7E2020-BC8C-4068-B211-B36C6BEAA0D2}" srcOrd="0" destOrd="0" presId="urn:microsoft.com/office/officeart/2005/8/layout/process1"/>
-    <dgm:cxn modelId="{7EEB19A9-42E2-49BE-BDD5-147D5CFD8FC9}" type="presOf" srcId="{E8B8F4BF-4CE5-46DB-B87C-8D4A37602DC5}" destId="{FCE56590-496D-4FD5-85DE-89534EF95893}" srcOrd="0" destOrd="0" presId="urn:microsoft.com/office/officeart/2005/8/layout/process1"/>
     <dgm:cxn modelId="{23FDD458-4A19-4F1C-ACB6-C88600D8DDD9}" srcId="{A0A53B87-62DC-4AED-9C5A-0B6E15C22349}" destId="{9B8F15FD-1359-4A00-8DE7-87C206811324}" srcOrd="1" destOrd="0" parTransId="{22C9A20C-9FE1-4342-9DB3-B1B2B7D57B5F}" sibTransId="{A93EF5DE-7609-4209-A000-05A3889A49DA}"/>
     <dgm:cxn modelId="{B5BCC51F-2064-45E5-AC88-1B962DBA40A6}" type="presOf" srcId="{06C86882-3F05-456E-83C0-D255BB878372}" destId="{A029C8C6-EF56-4045-8CFE-5D11E2107FF6}" srcOrd="0" destOrd="0" presId="urn:microsoft.com/office/officeart/2005/8/layout/process1"/>
     <dgm:cxn modelId="{566F7EAB-A72D-49BA-B645-C044FE0D1F15}" type="presOf" srcId="{8C0EA339-79F4-42E4-8F4B-3C64F43D8481}" destId="{0BE14009-EC52-49F6-BDA1-B1D769007F5F}" srcOrd="0" destOrd="0" presId="urn:microsoft.com/office/officeart/2005/8/layout/process1"/>
@@ -1561,861 +1561,6 @@
       <dsp:cNvGrpSpPr/>
     </dsp:nvGrpSpPr>
     <dsp:grpSpPr/>
-    <dsp:sp modelId="{0BE14009-EC52-49F6-BDA1-B1D769007F5F}">
-      <dsp:nvSpPr>
-        <dsp:cNvPr id="0" name=""/>
-        <dsp:cNvSpPr/>
-      </dsp:nvSpPr>
-      <dsp:spPr>
-        <a:xfrm>
-          <a:off x="101901" y="2161744"/>
-          <a:ext cx="2544776" cy="1282460"/>
-        </a:xfrm>
-        <a:prstGeom prst="roundRect">
-          <a:avLst>
-            <a:gd name="adj" fmla="val 10000"/>
-          </a:avLst>
-        </a:prstGeom>
-        <a:gradFill rotWithShape="0">
-          <a:gsLst>
-            <a:gs pos="0">
-              <a:srgbClr val="1376E3"/>
-            </a:gs>
-            <a:gs pos="100000">
-              <a:srgbClr val="002164"/>
-            </a:gs>
-          </a:gsLst>
-          <a:lin ang="5400000" scaled="0"/>
-        </a:gradFill>
-        <a:ln>
-          <a:noFill/>
-        </a:ln>
-        <a:effectLst/>
-        <a:scene3d>
-          <a:camera prst="orthographicFront"/>
-          <a:lightRig rig="threePt" dir="t">
-            <a:rot lat="0" lon="0" rev="7500000"/>
-          </a:lightRig>
-        </a:scene3d>
-        <a:sp3d prstMaterial="plastic">
-          <a:bevelT w="190500" h="190500" prst="relaxedInset"/>
-        </a:sp3d>
-      </dsp:spPr>
-      <dsp:style>
-        <a:lnRef idx="0">
-          <a:scrgbClr r="0" g="0" b="0"/>
-        </a:lnRef>
-        <a:fillRef idx="3">
-          <a:scrgbClr r="0" g="0" b="0"/>
-        </a:fillRef>
-        <a:effectRef idx="2">
-          <a:scrgbClr r="0" g="0" b="0"/>
-        </a:effectRef>
-        <a:fontRef idx="minor">
-          <a:schemeClr val="lt1"/>
-        </a:fontRef>
-      </dsp:style>
-      <dsp:txBody>
-        <a:bodyPr spcFirstLastPara="0" vert="horz" wrap="square" lIns="68580" tIns="68580" rIns="68580" bIns="68580" numCol="1" spcCol="1270" anchor="ctr" anchorCtr="0">
-          <a:noAutofit/>
-        </a:bodyPr>
-        <a:lstStyle/>
-        <a:p>
-          <a:pPr lvl="0" algn="ctr" defTabSz="800100">
-            <a:lnSpc>
-              <a:spcPct val="90000"/>
-            </a:lnSpc>
-            <a:spcBef>
-              <a:spcPct val="0"/>
-            </a:spcBef>
-            <a:spcAft>
-              <a:spcPct val="35000"/>
-            </a:spcAft>
-          </a:pPr>
-          <a:r>
-            <a:rPr lang="en-IN" sz="1800" b="1" kern="1200" spc="300" dirty="0" smtClean="0">
-              <a:solidFill>
-                <a:srgbClr val="FFFF99"/>
-              </a:solidFill>
-              <a:effectLst>
-                <a:outerShdw blurRad="38100" dist="38100" dir="2700000" algn="tl">
-                  <a:srgbClr val="000000">
-                    <a:alpha val="43137"/>
-                  </a:srgbClr>
-                </a:outerShdw>
-              </a:effectLst>
-              <a:latin typeface="Open Sans" panose="020B0606030504020204" pitchFamily="34" charset="0"/>
-              <a:ea typeface="Open Sans" panose="020B0606030504020204" pitchFamily="34" charset="0"/>
-              <a:cs typeface="Open Sans" panose="020B0606030504020204" pitchFamily="34" charset="0"/>
-            </a:rPr>
-            <a:t>Importing Log File</a:t>
-          </a:r>
-          <a:endParaRPr lang="en-IN" sz="1800" b="1" kern="1200" spc="300" dirty="0">
-            <a:solidFill>
-              <a:srgbClr val="FFFF99"/>
-            </a:solidFill>
-            <a:effectLst>
-              <a:outerShdw blurRad="38100" dist="38100" dir="2700000" algn="tl">
-                <a:srgbClr val="000000">
-                  <a:alpha val="43137"/>
-                </a:srgbClr>
-              </a:outerShdw>
-            </a:effectLst>
-            <a:latin typeface="Open Sans" panose="020B0606030504020204" pitchFamily="34" charset="0"/>
-            <a:ea typeface="Open Sans" panose="020B0606030504020204" pitchFamily="34" charset="0"/>
-            <a:cs typeface="Open Sans" panose="020B0606030504020204" pitchFamily="34" charset="0"/>
-          </a:endParaRPr>
-        </a:p>
-      </dsp:txBody>
-      <dsp:txXfrm>
-        <a:off x="139463" y="2199306"/>
-        <a:ext cx="2469652" cy="1207336"/>
-      </dsp:txXfrm>
-    </dsp:sp>
-    <dsp:sp modelId="{056207CF-9F58-405F-A833-F7586576B34E}">
-      <dsp:nvSpPr>
-        <dsp:cNvPr id="0" name=""/>
-        <dsp:cNvSpPr/>
-      </dsp:nvSpPr>
-      <dsp:spPr>
-        <a:xfrm rot="21577450">
-          <a:off x="2975417" y="2637147"/>
-          <a:ext cx="696958" cy="306077"/>
-        </a:xfrm>
-        <a:prstGeom prst="rightArrow">
-          <a:avLst>
-            <a:gd name="adj1" fmla="val 60000"/>
-            <a:gd name="adj2" fmla="val 50000"/>
-          </a:avLst>
-        </a:prstGeom>
-        <a:solidFill>
-          <a:srgbClr val="002164"/>
-        </a:solidFill>
-        <a:ln>
-          <a:noFill/>
-        </a:ln>
-        <a:effectLst/>
-        <a:scene3d>
-          <a:camera prst="orthographicFront"/>
-          <a:lightRig rig="threePt" dir="t">
-            <a:rot lat="0" lon="0" rev="7500000"/>
-          </a:lightRig>
-        </a:scene3d>
-        <a:sp3d z="-70000" extrusionH="63500" prstMaterial="matte">
-          <a:bevelT w="25400" h="6350" prst="relaxedInset"/>
-          <a:contourClr>
-            <a:schemeClr val="bg1"/>
-          </a:contourClr>
-        </a:sp3d>
-      </dsp:spPr>
-      <dsp:style>
-        <a:lnRef idx="0">
-          <a:scrgbClr r="0" g="0" b="0"/>
-        </a:lnRef>
-        <a:fillRef idx="1">
-          <a:scrgbClr r="0" g="0" b="0"/>
-        </a:fillRef>
-        <a:effectRef idx="2">
-          <a:scrgbClr r="0" g="0" b="0"/>
-        </a:effectRef>
-        <a:fontRef idx="minor">
-          <a:schemeClr val="lt1"/>
-        </a:fontRef>
-      </dsp:style>
-      <dsp:txBody>
-        <a:bodyPr spcFirstLastPara="0" vert="horz" wrap="square" lIns="0" tIns="0" rIns="0" bIns="0" numCol="1" spcCol="1270" anchor="ctr" anchorCtr="0">
-          <a:noAutofit/>
-        </a:bodyPr>
-        <a:lstStyle/>
-        <a:p>
-          <a:pPr lvl="0" algn="ctr" defTabSz="622300">
-            <a:lnSpc>
-              <a:spcPct val="90000"/>
-            </a:lnSpc>
-            <a:spcBef>
-              <a:spcPct val="0"/>
-            </a:spcBef>
-            <a:spcAft>
-              <a:spcPct val="35000"/>
-            </a:spcAft>
-          </a:pPr>
-          <a:endParaRPr lang="en-IN" sz="1400" kern="1200"/>
-        </a:p>
-      </dsp:txBody>
-      <dsp:txXfrm>
-        <a:off x="2975418" y="2698663"/>
-        <a:ext cx="605135" cy="183647"/>
-      </dsp:txXfrm>
-    </dsp:sp>
-    <dsp:sp modelId="{032A1E75-F9FC-4527-A250-D473AA4B5E5E}">
-      <dsp:nvSpPr>
-        <dsp:cNvPr id="0" name=""/>
-        <dsp:cNvSpPr/>
-      </dsp:nvSpPr>
-      <dsp:spPr>
-        <a:xfrm>
-          <a:off x="3961666" y="2134200"/>
-          <a:ext cx="2237711" cy="1288925"/>
-        </a:xfrm>
-        <a:prstGeom prst="roundRect">
-          <a:avLst>
-            <a:gd name="adj" fmla="val 10000"/>
-          </a:avLst>
-        </a:prstGeom>
-        <a:gradFill rotWithShape="0">
-          <a:gsLst>
-            <a:gs pos="0">
-              <a:srgbClr val="1376E3"/>
-            </a:gs>
-            <a:gs pos="100000">
-              <a:srgbClr val="002164"/>
-            </a:gs>
-          </a:gsLst>
-          <a:lin ang="5400000" scaled="0"/>
-        </a:gradFill>
-        <a:ln>
-          <a:noFill/>
-        </a:ln>
-        <a:effectLst/>
-        <a:scene3d>
-          <a:camera prst="orthographicFront"/>
-          <a:lightRig rig="threePt" dir="t">
-            <a:rot lat="0" lon="0" rev="7500000"/>
-          </a:lightRig>
-        </a:scene3d>
-        <a:sp3d prstMaterial="plastic">
-          <a:bevelT w="190500" h="190500" prst="relaxedInset"/>
-        </a:sp3d>
-      </dsp:spPr>
-      <dsp:style>
-        <a:lnRef idx="0">
-          <a:scrgbClr r="0" g="0" b="0"/>
-        </a:lnRef>
-        <a:fillRef idx="3">
-          <a:scrgbClr r="0" g="0" b="0"/>
-        </a:fillRef>
-        <a:effectRef idx="2">
-          <a:scrgbClr r="0" g="0" b="0"/>
-        </a:effectRef>
-        <a:fontRef idx="minor">
-          <a:schemeClr val="lt1"/>
-        </a:fontRef>
-      </dsp:style>
-      <dsp:txBody>
-        <a:bodyPr spcFirstLastPara="0" vert="horz" wrap="square" lIns="68580" tIns="68580" rIns="68580" bIns="68580" numCol="1" spcCol="1270" anchor="ctr" anchorCtr="0">
-          <a:noAutofit/>
-        </a:bodyPr>
-        <a:lstStyle/>
-        <a:p>
-          <a:pPr lvl="0" algn="ctr" defTabSz="800100">
-            <a:lnSpc>
-              <a:spcPct val="90000"/>
-            </a:lnSpc>
-            <a:spcBef>
-              <a:spcPct val="0"/>
-            </a:spcBef>
-            <a:spcAft>
-              <a:spcPct val="35000"/>
-            </a:spcAft>
-          </a:pPr>
-          <a:r>
-            <a:rPr lang="en-IN" sz="1800" b="1" kern="1200" spc="300" dirty="0" smtClean="0">
-              <a:solidFill>
-                <a:srgbClr val="FFFF99"/>
-              </a:solidFill>
-              <a:effectLst>
-                <a:outerShdw blurRad="38100" dist="38100" dir="2700000" algn="tl">
-                  <a:srgbClr val="000000">
-                    <a:alpha val="43137"/>
-                  </a:srgbClr>
-                </a:outerShdw>
-              </a:effectLst>
-              <a:latin typeface="Open Sans" panose="020B0606030504020204" pitchFamily="34" charset="0"/>
-              <a:ea typeface="Open Sans" panose="020B0606030504020204" pitchFamily="34" charset="0"/>
-              <a:cs typeface="Open Sans" panose="020B0606030504020204" pitchFamily="34" charset="0"/>
-            </a:rPr>
-            <a:t>Extracting Information</a:t>
-          </a:r>
-          <a:endParaRPr lang="en-IN" sz="1800" b="1" kern="1200" spc="300" dirty="0">
-            <a:solidFill>
-              <a:srgbClr val="FFFF99"/>
-            </a:solidFill>
-            <a:effectLst>
-              <a:outerShdw blurRad="38100" dist="38100" dir="2700000" algn="tl">
-                <a:srgbClr val="000000">
-                  <a:alpha val="43137"/>
-                </a:srgbClr>
-              </a:outerShdw>
-            </a:effectLst>
-            <a:latin typeface="Open Sans" panose="020B0606030504020204" pitchFamily="34" charset="0"/>
-            <a:ea typeface="Open Sans" panose="020B0606030504020204" pitchFamily="34" charset="0"/>
-            <a:cs typeface="Open Sans" panose="020B0606030504020204" pitchFamily="34" charset="0"/>
-          </a:endParaRPr>
-        </a:p>
-      </dsp:txBody>
-      <dsp:txXfrm>
-        <a:off x="3999417" y="2171951"/>
-        <a:ext cx="2162209" cy="1213423"/>
-      </dsp:txXfrm>
-    </dsp:sp>
-    <dsp:sp modelId="{10C5E952-AE32-4CFE-BA5A-7258D03A50EB}">
-      <dsp:nvSpPr>
-        <dsp:cNvPr id="0" name=""/>
-        <dsp:cNvSpPr/>
-      </dsp:nvSpPr>
-      <dsp:spPr>
-        <a:xfrm rot="5771">
-          <a:off x="6547914" y="2628708"/>
-          <a:ext cx="738900" cy="306077"/>
-        </a:xfrm>
-        <a:prstGeom prst="rightArrow">
-          <a:avLst>
-            <a:gd name="adj1" fmla="val 60000"/>
-            <a:gd name="adj2" fmla="val 50000"/>
-          </a:avLst>
-        </a:prstGeom>
-        <a:solidFill>
-          <a:srgbClr val="002164"/>
-        </a:solidFill>
-        <a:ln>
-          <a:noFill/>
-        </a:ln>
-        <a:effectLst/>
-        <a:scene3d>
-          <a:camera prst="orthographicFront"/>
-          <a:lightRig rig="threePt" dir="t">
-            <a:rot lat="0" lon="0" rev="7500000"/>
-          </a:lightRig>
-        </a:scene3d>
-        <a:sp3d z="-70000" extrusionH="63500" prstMaterial="matte">
-          <a:bevelT w="25400" h="6350" prst="relaxedInset"/>
-          <a:contourClr>
-            <a:schemeClr val="bg1"/>
-          </a:contourClr>
-        </a:sp3d>
-      </dsp:spPr>
-      <dsp:style>
-        <a:lnRef idx="0">
-          <a:scrgbClr r="0" g="0" b="0"/>
-        </a:lnRef>
-        <a:fillRef idx="1">
-          <a:scrgbClr r="0" g="0" b="0"/>
-        </a:fillRef>
-        <a:effectRef idx="2">
-          <a:scrgbClr r="0" g="0" b="0"/>
-        </a:effectRef>
-        <a:fontRef idx="minor">
-          <a:schemeClr val="lt1"/>
-        </a:fontRef>
-      </dsp:style>
-      <dsp:txBody>
-        <a:bodyPr spcFirstLastPara="0" vert="horz" wrap="square" lIns="0" tIns="0" rIns="0" bIns="0" numCol="1" spcCol="1270" anchor="ctr" anchorCtr="0">
-          <a:noAutofit/>
-        </a:bodyPr>
-        <a:lstStyle/>
-        <a:p>
-          <a:pPr lvl="0" algn="ctr" defTabSz="622300">
-            <a:lnSpc>
-              <a:spcPct val="90000"/>
-            </a:lnSpc>
-            <a:spcBef>
-              <a:spcPct val="0"/>
-            </a:spcBef>
-            <a:spcAft>
-              <a:spcPct val="35000"/>
-            </a:spcAft>
-          </a:pPr>
-          <a:endParaRPr lang="en-IN" sz="1400" kern="1200"/>
-        </a:p>
-      </dsp:txBody>
-      <dsp:txXfrm>
-        <a:off x="6547914" y="2689846"/>
-        <a:ext cx="647077" cy="183647"/>
-      </dsp:txXfrm>
-    </dsp:sp>
-    <dsp:sp modelId="{1F184332-3C60-4B1B-A973-3283C9A71795}">
-      <dsp:nvSpPr>
-        <dsp:cNvPr id="0" name=""/>
-        <dsp:cNvSpPr/>
-      </dsp:nvSpPr>
-      <dsp:spPr>
-        <a:xfrm>
-          <a:off x="7593527" y="2222003"/>
-          <a:ext cx="2428837" cy="1125835"/>
-        </a:xfrm>
-        <a:prstGeom prst="roundRect">
-          <a:avLst>
-            <a:gd name="adj" fmla="val 10000"/>
-          </a:avLst>
-        </a:prstGeom>
-        <a:gradFill rotWithShape="0">
-          <a:gsLst>
-            <a:gs pos="0">
-              <a:srgbClr val="1376E3"/>
-            </a:gs>
-            <a:gs pos="100000">
-              <a:srgbClr val="002164"/>
-            </a:gs>
-          </a:gsLst>
-          <a:lin ang="5400000" scaled="0"/>
-        </a:gradFill>
-        <a:ln>
-          <a:noFill/>
-        </a:ln>
-        <a:effectLst/>
-        <a:scene3d>
-          <a:camera prst="orthographicFront"/>
-          <a:lightRig rig="threePt" dir="t">
-            <a:rot lat="0" lon="0" rev="7500000"/>
-          </a:lightRig>
-        </a:scene3d>
-        <a:sp3d prstMaterial="plastic">
-          <a:bevelT w="190500" h="190500" prst="relaxedInset"/>
-        </a:sp3d>
-      </dsp:spPr>
-      <dsp:style>
-        <a:lnRef idx="0">
-          <a:scrgbClr r="0" g="0" b="0"/>
-        </a:lnRef>
-        <a:fillRef idx="3">
-          <a:scrgbClr r="0" g="0" b="0"/>
-        </a:fillRef>
-        <a:effectRef idx="2">
-          <a:scrgbClr r="0" g="0" b="0"/>
-        </a:effectRef>
-        <a:fontRef idx="minor">
-          <a:schemeClr val="lt1"/>
-        </a:fontRef>
-      </dsp:style>
-      <dsp:txBody>
-        <a:bodyPr spcFirstLastPara="0" vert="horz" wrap="square" lIns="68580" tIns="68580" rIns="68580" bIns="68580" numCol="1" spcCol="1270" anchor="ctr" anchorCtr="0">
-          <a:noAutofit/>
-        </a:bodyPr>
-        <a:lstStyle/>
-        <a:p>
-          <a:pPr lvl="0" algn="ctr" defTabSz="800100">
-            <a:lnSpc>
-              <a:spcPct val="90000"/>
-            </a:lnSpc>
-            <a:spcBef>
-              <a:spcPct val="0"/>
-            </a:spcBef>
-            <a:spcAft>
-              <a:spcPct val="35000"/>
-            </a:spcAft>
-          </a:pPr>
-          <a:r>
-            <a:rPr lang="en-IN" sz="1800" b="1" kern="1200" spc="300" dirty="0" smtClean="0">
-              <a:solidFill>
-                <a:srgbClr val="FFFF99"/>
-              </a:solidFill>
-              <a:effectLst>
-                <a:outerShdw blurRad="38100" dist="38100" dir="2700000" algn="tl">
-                  <a:srgbClr val="000000">
-                    <a:alpha val="43137"/>
-                  </a:srgbClr>
-                </a:outerShdw>
-              </a:effectLst>
-              <a:latin typeface="Open Sans" panose="020B0606030504020204" pitchFamily="34" charset="0"/>
-              <a:ea typeface="Open Sans" panose="020B0606030504020204" pitchFamily="34" charset="0"/>
-              <a:cs typeface="Open Sans" panose="020B0606030504020204" pitchFamily="34" charset="0"/>
-            </a:rPr>
-            <a:t>Analysing</a:t>
-          </a:r>
-          <a:endParaRPr lang="en-IN" sz="1800" b="1" kern="1200" spc="300" dirty="0">
-            <a:solidFill>
-              <a:srgbClr val="FFFF99"/>
-            </a:solidFill>
-            <a:effectLst>
-              <a:outerShdw blurRad="38100" dist="38100" dir="2700000" algn="tl">
-                <a:srgbClr val="000000">
-                  <a:alpha val="43137"/>
-                </a:srgbClr>
-              </a:outerShdw>
-            </a:effectLst>
-            <a:latin typeface="Open Sans" panose="020B0606030504020204" pitchFamily="34" charset="0"/>
-            <a:ea typeface="Open Sans" panose="020B0606030504020204" pitchFamily="34" charset="0"/>
-            <a:cs typeface="Open Sans" panose="020B0606030504020204" pitchFamily="34" charset="0"/>
-          </a:endParaRPr>
-        </a:p>
-      </dsp:txBody>
-      <dsp:txXfrm>
-        <a:off x="7626502" y="2254978"/>
-        <a:ext cx="2362887" cy="1059885"/>
-      </dsp:txXfrm>
-    </dsp:sp>
-    <dsp:sp modelId="{DE7E2020-BC8C-4068-B211-B36C6BEAA0D2}">
-      <dsp:nvSpPr>
-        <dsp:cNvPr id="0" name=""/>
-        <dsp:cNvSpPr/>
-      </dsp:nvSpPr>
-      <dsp:spPr>
-        <a:xfrm rot="8064985">
-          <a:off x="7525165" y="3624866"/>
-          <a:ext cx="619641" cy="306077"/>
-        </a:xfrm>
-        <a:prstGeom prst="rightArrow">
-          <a:avLst>
-            <a:gd name="adj1" fmla="val 60000"/>
-            <a:gd name="adj2" fmla="val 50000"/>
-          </a:avLst>
-        </a:prstGeom>
-        <a:solidFill>
-          <a:srgbClr val="002164"/>
-        </a:solidFill>
-        <a:ln>
-          <a:noFill/>
-        </a:ln>
-        <a:effectLst/>
-        <a:scene3d>
-          <a:camera prst="orthographicFront"/>
-          <a:lightRig rig="threePt" dir="t">
-            <a:rot lat="0" lon="0" rev="7500000"/>
-          </a:lightRig>
-        </a:scene3d>
-        <a:sp3d z="-70000" extrusionH="63500" prstMaterial="matte">
-          <a:bevelT w="25400" h="6350" prst="relaxedInset"/>
-          <a:contourClr>
-            <a:schemeClr val="bg1"/>
-          </a:contourClr>
-        </a:sp3d>
-      </dsp:spPr>
-      <dsp:style>
-        <a:lnRef idx="0">
-          <a:scrgbClr r="0" g="0" b="0"/>
-        </a:lnRef>
-        <a:fillRef idx="1">
-          <a:scrgbClr r="0" g="0" b="0"/>
-        </a:fillRef>
-        <a:effectRef idx="2">
-          <a:scrgbClr r="0" g="0" b="0"/>
-        </a:effectRef>
-        <a:fontRef idx="minor">
-          <a:schemeClr val="lt1"/>
-        </a:fontRef>
-      </dsp:style>
-      <dsp:txBody>
-        <a:bodyPr spcFirstLastPara="0" vert="horz" wrap="square" lIns="0" tIns="0" rIns="0" bIns="0" numCol="1" spcCol="1270" anchor="ctr" anchorCtr="0">
-          <a:noAutofit/>
-        </a:bodyPr>
-        <a:lstStyle/>
-        <a:p>
-          <a:pPr lvl="0" algn="ctr" defTabSz="622300">
-            <a:lnSpc>
-              <a:spcPct val="90000"/>
-            </a:lnSpc>
-            <a:spcBef>
-              <a:spcPct val="0"/>
-            </a:spcBef>
-            <a:spcAft>
-              <a:spcPct val="35000"/>
-            </a:spcAft>
-          </a:pPr>
-          <a:endParaRPr lang="en-IN" sz="1400" kern="1200"/>
-        </a:p>
-      </dsp:txBody>
-      <dsp:txXfrm rot="10800000">
-        <a:off x="7603208" y="3653288"/>
-        <a:ext cx="527818" cy="183647"/>
-      </dsp:txXfrm>
-    </dsp:sp>
-    <dsp:sp modelId="{63A1EDBC-80C2-4C39-8AB1-49894774D360}">
-      <dsp:nvSpPr>
-        <dsp:cNvPr id="0" name=""/>
-        <dsp:cNvSpPr/>
-      </dsp:nvSpPr>
-      <dsp:spPr>
-        <a:xfrm>
-          <a:off x="5428691" y="4182919"/>
-          <a:ext cx="2717216" cy="1328468"/>
-        </a:xfrm>
-        <a:prstGeom prst="roundRect">
-          <a:avLst>
-            <a:gd name="adj" fmla="val 10000"/>
-          </a:avLst>
-        </a:prstGeom>
-        <a:gradFill rotWithShape="0">
-          <a:gsLst>
-            <a:gs pos="0">
-              <a:srgbClr val="1376E3"/>
-            </a:gs>
-            <a:gs pos="100000">
-              <a:srgbClr val="002164"/>
-            </a:gs>
-          </a:gsLst>
-          <a:lin ang="5400000" scaled="0"/>
-        </a:gradFill>
-        <a:ln>
-          <a:noFill/>
-        </a:ln>
-        <a:effectLst/>
-        <a:scene3d>
-          <a:camera prst="orthographicFront"/>
-          <a:lightRig rig="threePt" dir="t">
-            <a:rot lat="0" lon="0" rev="7500000"/>
-          </a:lightRig>
-        </a:scene3d>
-        <a:sp3d prstMaterial="plastic">
-          <a:bevelT w="190500" h="190500" prst="relaxedInset"/>
-        </a:sp3d>
-      </dsp:spPr>
-      <dsp:style>
-        <a:lnRef idx="0">
-          <a:scrgbClr r="0" g="0" b="0"/>
-        </a:lnRef>
-        <a:fillRef idx="3">
-          <a:scrgbClr r="0" g="0" b="0"/>
-        </a:fillRef>
-        <a:effectRef idx="2">
-          <a:scrgbClr r="0" g="0" b="0"/>
-        </a:effectRef>
-        <a:fontRef idx="minor">
-          <a:schemeClr val="lt1"/>
-        </a:fontRef>
-      </dsp:style>
-      <dsp:txBody>
-        <a:bodyPr spcFirstLastPara="0" vert="horz" wrap="square" lIns="68580" tIns="68580" rIns="68580" bIns="68580" numCol="1" spcCol="1270" anchor="ctr" anchorCtr="0">
-          <a:noAutofit/>
-        </a:bodyPr>
-        <a:lstStyle/>
-        <a:p>
-          <a:pPr lvl="0" algn="ctr" defTabSz="800100">
-            <a:lnSpc>
-              <a:spcPct val="90000"/>
-            </a:lnSpc>
-            <a:spcBef>
-              <a:spcPct val="0"/>
-            </a:spcBef>
-            <a:spcAft>
-              <a:spcPct val="35000"/>
-            </a:spcAft>
-          </a:pPr>
-          <a:r>
-            <a:rPr lang="en-IN" sz="1800" b="1" kern="1200" spc="300" dirty="0" smtClean="0">
-              <a:solidFill>
-                <a:srgbClr val="FFFF99"/>
-              </a:solidFill>
-              <a:effectLst>
-                <a:outerShdw blurRad="38100" dist="38100" dir="2700000" algn="tl">
-                  <a:srgbClr val="000000">
-                    <a:alpha val="43137"/>
-                  </a:srgbClr>
-                </a:outerShdw>
-              </a:effectLst>
-              <a:latin typeface="Open Sans" panose="020B0606030504020204" pitchFamily="34" charset="0"/>
-              <a:ea typeface="Open Sans" panose="020B0606030504020204" pitchFamily="34" charset="0"/>
-              <a:cs typeface="Open Sans" panose="020B0606030504020204" pitchFamily="34" charset="0"/>
-            </a:rPr>
-            <a:t>Visualisation</a:t>
-          </a:r>
-          <a:endParaRPr lang="en-IN" sz="1800" b="1" kern="1200" spc="300" dirty="0">
-            <a:solidFill>
-              <a:srgbClr val="FFFF99"/>
-            </a:solidFill>
-            <a:effectLst>
-              <a:outerShdw blurRad="38100" dist="38100" dir="2700000" algn="tl">
-                <a:srgbClr val="000000">
-                  <a:alpha val="43137"/>
-                </a:srgbClr>
-              </a:outerShdw>
-            </a:effectLst>
-            <a:latin typeface="Open Sans" panose="020B0606030504020204" pitchFamily="34" charset="0"/>
-            <a:ea typeface="Open Sans" panose="020B0606030504020204" pitchFamily="34" charset="0"/>
-            <a:cs typeface="Open Sans" panose="020B0606030504020204" pitchFamily="34" charset="0"/>
-          </a:endParaRPr>
-        </a:p>
-      </dsp:txBody>
-      <dsp:txXfrm>
-        <a:off x="5467600" y="4221828"/>
-        <a:ext cx="2639398" cy="1250650"/>
-      </dsp:txXfrm>
-    </dsp:sp>
-    <dsp:sp modelId="{FCE56590-496D-4FD5-85DE-89534EF95893}">
-      <dsp:nvSpPr>
-        <dsp:cNvPr id="0" name=""/>
-        <dsp:cNvSpPr/>
-      </dsp:nvSpPr>
-      <dsp:spPr>
-        <a:xfrm rot="10817234">
-          <a:off x="4133576" y="4683017"/>
-          <a:ext cx="880021" cy="306077"/>
-        </a:xfrm>
-        <a:prstGeom prst="rightArrow">
-          <a:avLst>
-            <a:gd name="adj1" fmla="val 60000"/>
-            <a:gd name="adj2" fmla="val 50000"/>
-          </a:avLst>
-        </a:prstGeom>
-        <a:solidFill>
-          <a:srgbClr val="002164"/>
-        </a:solidFill>
-        <a:ln>
-          <a:noFill/>
-        </a:ln>
-        <a:effectLst/>
-        <a:scene3d>
-          <a:camera prst="orthographicFront"/>
-          <a:lightRig rig="threePt" dir="t">
-            <a:rot lat="0" lon="0" rev="7500000"/>
-          </a:lightRig>
-        </a:scene3d>
-        <a:sp3d z="-70000" extrusionH="63500" prstMaterial="matte">
-          <a:bevelT w="25400" h="6350" prst="relaxedInset"/>
-          <a:contourClr>
-            <a:schemeClr val="bg1"/>
-          </a:contourClr>
-        </a:sp3d>
-      </dsp:spPr>
-      <dsp:style>
-        <a:lnRef idx="0">
-          <a:scrgbClr r="0" g="0" b="0"/>
-        </a:lnRef>
-        <a:fillRef idx="1">
-          <a:scrgbClr r="0" g="0" b="0"/>
-        </a:fillRef>
-        <a:effectRef idx="2">
-          <a:scrgbClr r="0" g="0" b="0"/>
-        </a:effectRef>
-        <a:fontRef idx="minor">
-          <a:schemeClr val="lt1"/>
-        </a:fontRef>
-      </dsp:style>
-      <dsp:txBody>
-        <a:bodyPr spcFirstLastPara="0" vert="horz" wrap="square" lIns="0" tIns="0" rIns="0" bIns="0" numCol="1" spcCol="1270" anchor="ctr" anchorCtr="0">
-          <a:noAutofit/>
-        </a:bodyPr>
-        <a:lstStyle/>
-        <a:p>
-          <a:pPr lvl="0" algn="ctr" defTabSz="622300">
-            <a:lnSpc>
-              <a:spcPct val="90000"/>
-            </a:lnSpc>
-            <a:spcBef>
-              <a:spcPct val="0"/>
-            </a:spcBef>
-            <a:spcAft>
-              <a:spcPct val="35000"/>
-            </a:spcAft>
-          </a:pPr>
-          <a:endParaRPr lang="en-IN" sz="1400" kern="1200"/>
-        </a:p>
-      </dsp:txBody>
-      <dsp:txXfrm rot="10800000">
-        <a:off x="4225398" y="4744462"/>
-        <a:ext cx="788198" cy="183647"/>
-      </dsp:txXfrm>
-    </dsp:sp>
-    <dsp:sp modelId="{A029C8C6-EF56-4045-8CFE-5D11E2107FF6}">
-      <dsp:nvSpPr>
-        <dsp:cNvPr id="0" name=""/>
-        <dsp:cNvSpPr/>
-      </dsp:nvSpPr>
-      <dsp:spPr>
-        <a:xfrm>
-          <a:off x="1767669" y="4222525"/>
-          <a:ext cx="2000624" cy="1208957"/>
-        </a:xfrm>
-        <a:prstGeom prst="roundRect">
-          <a:avLst>
-            <a:gd name="adj" fmla="val 10000"/>
-          </a:avLst>
-        </a:prstGeom>
-        <a:gradFill rotWithShape="0">
-          <a:gsLst>
-            <a:gs pos="0">
-              <a:srgbClr val="1376E3"/>
-            </a:gs>
-            <a:gs pos="100000">
-              <a:srgbClr val="002164"/>
-            </a:gs>
-          </a:gsLst>
-          <a:lin ang="5400000" scaled="0"/>
-        </a:gradFill>
-        <a:ln>
-          <a:noFill/>
-        </a:ln>
-        <a:effectLst/>
-        <a:scene3d>
-          <a:camera prst="orthographicFront"/>
-          <a:lightRig rig="threePt" dir="t">
-            <a:rot lat="0" lon="0" rev="7500000"/>
-          </a:lightRig>
-        </a:scene3d>
-        <a:sp3d prstMaterial="plastic">
-          <a:bevelT w="190500" h="190500" prst="relaxedInset"/>
-        </a:sp3d>
-      </dsp:spPr>
-      <dsp:style>
-        <a:lnRef idx="0">
-          <a:scrgbClr r="0" g="0" b="0"/>
-        </a:lnRef>
-        <a:fillRef idx="3">
-          <a:scrgbClr r="0" g="0" b="0"/>
-        </a:fillRef>
-        <a:effectRef idx="2">
-          <a:scrgbClr r="0" g="0" b="0"/>
-        </a:effectRef>
-        <a:fontRef idx="minor">
-          <a:schemeClr val="lt1"/>
-        </a:fontRef>
-      </dsp:style>
-      <dsp:txBody>
-        <a:bodyPr spcFirstLastPara="0" vert="horz" wrap="square" lIns="68580" tIns="68580" rIns="68580" bIns="68580" numCol="1" spcCol="1270" anchor="ctr" anchorCtr="0">
-          <a:noAutofit/>
-        </a:bodyPr>
-        <a:lstStyle/>
-        <a:p>
-          <a:pPr lvl="0" algn="ctr" defTabSz="800100">
-            <a:lnSpc>
-              <a:spcPct val="90000"/>
-            </a:lnSpc>
-            <a:spcBef>
-              <a:spcPct val="0"/>
-            </a:spcBef>
-            <a:spcAft>
-              <a:spcPct val="35000"/>
-            </a:spcAft>
-          </a:pPr>
-          <a:r>
-            <a:rPr lang="en-IN" sz="1800" b="1" kern="1200" spc="300" dirty="0" smtClean="0">
-              <a:solidFill>
-                <a:srgbClr val="FFFF99"/>
-              </a:solidFill>
-              <a:effectLst>
-                <a:outerShdw blurRad="38100" dist="38100" dir="2700000" algn="tl">
-                  <a:srgbClr val="000000">
-                    <a:alpha val="43137"/>
-                  </a:srgbClr>
-                </a:outerShdw>
-              </a:effectLst>
-              <a:latin typeface="Open Sans" panose="020B0606030504020204" pitchFamily="34" charset="0"/>
-              <a:ea typeface="Open Sans" panose="020B0606030504020204" pitchFamily="34" charset="0"/>
-              <a:cs typeface="Open Sans" panose="020B0606030504020204" pitchFamily="34" charset="0"/>
-            </a:rPr>
-            <a:t>Results</a:t>
-          </a:r>
-          <a:endParaRPr lang="en-IN" sz="1800" b="1" kern="1200" spc="300" dirty="0">
-            <a:solidFill>
-              <a:srgbClr val="FFFF99"/>
-            </a:solidFill>
-            <a:effectLst>
-              <a:outerShdw blurRad="38100" dist="38100" dir="2700000" algn="tl">
-                <a:srgbClr val="000000">
-                  <a:alpha val="43137"/>
-                </a:srgbClr>
-              </a:outerShdw>
-            </a:effectLst>
-            <a:latin typeface="Open Sans" panose="020B0606030504020204" pitchFamily="34" charset="0"/>
-            <a:ea typeface="Open Sans" panose="020B0606030504020204" pitchFamily="34" charset="0"/>
-            <a:cs typeface="Open Sans" panose="020B0606030504020204" pitchFamily="34" charset="0"/>
-          </a:endParaRPr>
-        </a:p>
-      </dsp:txBody>
-      <dsp:txXfrm>
-        <a:off x="1803078" y="4257934"/>
-        <a:ext cx="1929806" cy="1138139"/>
-      </dsp:txXfrm>
-    </dsp:sp>
   </dsp:spTree>
 </dsp:drawing>
 </file>
@@ -4439,7 +3584,7 @@
           <a:noFill/>
           <a:extLst>
             <a:ext uri="{909E8E84-426E-40dd-AFC4-6F175D3DCCD1}">
-              <a14:hiddenFill xmlns:a14="http://schemas.microsoft.com/office/drawing/2010/main" xmlns="">
+              <a14:hiddenFill xmlns="" xmlns:a14="http://schemas.microsoft.com/office/drawing/2010/main">
                 <a:solidFill>
                   <a:srgbClr val="FFFFFF"/>
                 </a:solidFill>
@@ -4498,7 +3643,7 @@
             </a:ln>
             <a:extLst>
               <a:ext uri="{91240B29-F687-4f45-9708-019B960494DF}">
-                <a14:hiddenLine xmlns:a14="http://schemas.microsoft.com/office/drawing/2010/main" xmlns="" w="9525">
+                <a14:hiddenLine xmlns="" xmlns:a14="http://schemas.microsoft.com/office/drawing/2010/main" w="9525">
                   <a:solidFill>
                     <a:srgbClr val="000000"/>
                   </a:solidFill>
@@ -4588,7 +3733,7 @@
             </a:ln>
             <a:extLst>
               <a:ext uri="{91240B29-F687-4f45-9708-019B960494DF}">
-                <a14:hiddenLine xmlns:a14="http://schemas.microsoft.com/office/drawing/2010/main" xmlns="" w="9525">
+                <a14:hiddenLine xmlns="" xmlns:a14="http://schemas.microsoft.com/office/drawing/2010/main" w="9525">
                   <a:solidFill>
                     <a:srgbClr val="000000"/>
                   </a:solidFill>
@@ -4678,7 +3823,7 @@
             </a:ln>
             <a:extLst>
               <a:ext uri="{91240B29-F687-4f45-9708-019B960494DF}">
-                <a14:hiddenLine xmlns:a14="http://schemas.microsoft.com/office/drawing/2010/main" xmlns="" w="9525">
+                <a14:hiddenLine xmlns="" xmlns:a14="http://schemas.microsoft.com/office/drawing/2010/main" w="9525">
                   <a:solidFill>
                     <a:srgbClr val="000000"/>
                   </a:solidFill>
@@ -4712,7 +3857,7 @@
             </a:ln>
             <a:extLst>
               <a:ext uri="{91240B29-F687-4f45-9708-019B960494DF}">
-                <a14:hiddenLine xmlns:a14="http://schemas.microsoft.com/office/drawing/2010/main" xmlns="" w="9525">
+                <a14:hiddenLine xmlns="" xmlns:a14="http://schemas.microsoft.com/office/drawing/2010/main" w="9525">
                   <a:solidFill>
                     <a:srgbClr val="000000"/>
                   </a:solidFill>
@@ -4802,7 +3947,7 @@
             </a:ln>
             <a:extLst>
               <a:ext uri="{91240B29-F687-4f45-9708-019B960494DF}">
-                <a14:hiddenLine xmlns:a14="http://schemas.microsoft.com/office/drawing/2010/main" xmlns="" w="9525">
+                <a14:hiddenLine xmlns="" xmlns:a14="http://schemas.microsoft.com/office/drawing/2010/main" w="9525">
                   <a:solidFill>
                     <a:srgbClr val="000000"/>
                   </a:solidFill>
@@ -4864,7 +4009,7 @@
             </a:ln>
             <a:extLst>
               <a:ext uri="{91240B29-F687-4f45-9708-019B960494DF}">
-                <a14:hiddenLine xmlns:a14="http://schemas.microsoft.com/office/drawing/2010/main" xmlns="" w="9525">
+                <a14:hiddenLine xmlns="" xmlns:a14="http://schemas.microsoft.com/office/drawing/2010/main" w="9525">
                   <a:solidFill>
                     <a:srgbClr val="000000"/>
                   </a:solidFill>
@@ -4926,7 +4071,7 @@
             </a:ln>
             <a:extLst>
               <a:ext uri="{91240B29-F687-4f45-9708-019B960494DF}">
-                <a14:hiddenLine xmlns:a14="http://schemas.microsoft.com/office/drawing/2010/main" xmlns="" w="9525">
+                <a14:hiddenLine xmlns="" xmlns:a14="http://schemas.microsoft.com/office/drawing/2010/main" w="9525">
                   <a:solidFill>
                     <a:srgbClr val="000000"/>
                   </a:solidFill>
@@ -5016,7 +4161,7 @@
             </a:ln>
             <a:extLst>
               <a:ext uri="{91240B29-F687-4f45-9708-019B960494DF}">
-                <a14:hiddenLine xmlns:a14="http://schemas.microsoft.com/office/drawing/2010/main" xmlns="" w="9525">
+                <a14:hiddenLine xmlns="" xmlns:a14="http://schemas.microsoft.com/office/drawing/2010/main" w="9525">
                   <a:solidFill>
                     <a:srgbClr val="000000"/>
                   </a:solidFill>
@@ -5078,7 +4223,7 @@
             </a:ln>
             <a:extLst>
               <a:ext uri="{91240B29-F687-4f45-9708-019B960494DF}">
-                <a14:hiddenLine xmlns:a14="http://schemas.microsoft.com/office/drawing/2010/main" xmlns="" w="9525">
+                <a14:hiddenLine xmlns="" xmlns:a14="http://schemas.microsoft.com/office/drawing/2010/main" w="9525">
                   <a:solidFill>
                     <a:srgbClr val="000000"/>
                   </a:solidFill>
@@ -5140,7 +4285,7 @@
             </a:ln>
             <a:extLst>
               <a:ext uri="{91240B29-F687-4f45-9708-019B960494DF}">
-                <a14:hiddenLine xmlns:a14="http://schemas.microsoft.com/office/drawing/2010/main" xmlns="" w="9525">
+                <a14:hiddenLine xmlns="" xmlns:a14="http://schemas.microsoft.com/office/drawing/2010/main" w="9525">
                   <a:solidFill>
                     <a:srgbClr val="000000"/>
                   </a:solidFill>
@@ -5230,7 +4375,7 @@
             </a:ln>
             <a:extLst>
               <a:ext uri="{91240B29-F687-4f45-9708-019B960494DF}">
-                <a14:hiddenLine xmlns:a14="http://schemas.microsoft.com/office/drawing/2010/main" xmlns="" w="9525">
+                <a14:hiddenLine xmlns="" xmlns:a14="http://schemas.microsoft.com/office/drawing/2010/main" w="9525">
                   <a:solidFill>
                     <a:srgbClr val="000000"/>
                   </a:solidFill>
@@ -5320,7 +4465,7 @@
             </a:ln>
             <a:extLst>
               <a:ext uri="{91240B29-F687-4f45-9708-019B960494DF}">
-                <a14:hiddenLine xmlns:a14="http://schemas.microsoft.com/office/drawing/2010/main" xmlns="" w="9525">
+                <a14:hiddenLine xmlns="" xmlns:a14="http://schemas.microsoft.com/office/drawing/2010/main" w="9525">
                   <a:solidFill>
                     <a:srgbClr val="000000"/>
                   </a:solidFill>
@@ -5382,7 +4527,7 @@
             </a:ln>
             <a:extLst>
               <a:ext uri="{91240B29-F687-4f45-9708-019B960494DF}">
-                <a14:hiddenLine xmlns:a14="http://schemas.microsoft.com/office/drawing/2010/main" xmlns="" w="9525">
+                <a14:hiddenLine xmlns="" xmlns:a14="http://schemas.microsoft.com/office/drawing/2010/main" w="9525">
                   <a:solidFill>
                     <a:srgbClr val="000000"/>
                   </a:solidFill>
@@ -5492,7 +4637,7 @@
             </a:ln>
             <a:extLst>
               <a:ext uri="{91240B29-F687-4f45-9708-019B960494DF}">
-                <a14:hiddenLine xmlns:a14="http://schemas.microsoft.com/office/drawing/2010/main" xmlns="" w="9525">
+                <a14:hiddenLine xmlns="" xmlns:a14="http://schemas.microsoft.com/office/drawing/2010/main" w="9525">
                   <a:solidFill>
                     <a:srgbClr val="000000"/>
                   </a:solidFill>
@@ -5554,7 +4699,7 @@
             </a:ln>
             <a:extLst>
               <a:ext uri="{91240B29-F687-4f45-9708-019B960494DF}">
-                <a14:hiddenLine xmlns:a14="http://schemas.microsoft.com/office/drawing/2010/main" xmlns="" w="9525">
+                <a14:hiddenLine xmlns="" xmlns:a14="http://schemas.microsoft.com/office/drawing/2010/main" w="9525">
                   <a:solidFill>
                     <a:srgbClr val="000000"/>
                   </a:solidFill>
@@ -5644,7 +4789,7 @@
             </a:ln>
             <a:extLst>
               <a:ext uri="{91240B29-F687-4f45-9708-019B960494DF}">
-                <a14:hiddenLine xmlns:a14="http://schemas.microsoft.com/office/drawing/2010/main" xmlns="" w="9525">
+                <a14:hiddenLine xmlns="" xmlns:a14="http://schemas.microsoft.com/office/drawing/2010/main" w="9525">
                   <a:solidFill>
                     <a:srgbClr val="000000"/>
                   </a:solidFill>
@@ -5734,7 +4879,7 @@
             </a:ln>
             <a:extLst>
               <a:ext uri="{91240B29-F687-4f45-9708-019B960494DF}">
-                <a14:hiddenLine xmlns:a14="http://schemas.microsoft.com/office/drawing/2010/main" xmlns="" w="9525">
+                <a14:hiddenLine xmlns="" xmlns:a14="http://schemas.microsoft.com/office/drawing/2010/main" w="9525">
                   <a:solidFill>
                     <a:srgbClr val="000000"/>
                   </a:solidFill>
@@ -5796,7 +4941,7 @@
             </a:ln>
             <a:extLst>
               <a:ext uri="{91240B29-F687-4f45-9708-019B960494DF}">
-                <a14:hiddenLine xmlns:a14="http://schemas.microsoft.com/office/drawing/2010/main" xmlns="" w="9525">
+                <a14:hiddenLine xmlns="" xmlns:a14="http://schemas.microsoft.com/office/drawing/2010/main" w="9525">
                   <a:solidFill>
                     <a:srgbClr val="000000"/>
                   </a:solidFill>
@@ -5886,7 +5031,7 @@
             </a:ln>
             <a:extLst>
               <a:ext uri="{91240B29-F687-4f45-9708-019B960494DF}">
-                <a14:hiddenLine xmlns:a14="http://schemas.microsoft.com/office/drawing/2010/main" xmlns="" w="9525">
+                <a14:hiddenLine xmlns="" xmlns:a14="http://schemas.microsoft.com/office/drawing/2010/main" w="9525">
                   <a:solidFill>
                     <a:srgbClr val="000000"/>
                   </a:solidFill>
@@ -5976,7 +5121,7 @@
             </a:ln>
             <a:extLst>
               <a:ext uri="{91240B29-F687-4f45-9708-019B960494DF}">
-                <a14:hiddenLine xmlns:a14="http://schemas.microsoft.com/office/drawing/2010/main" xmlns="" w="9525">
+                <a14:hiddenLine xmlns="" xmlns:a14="http://schemas.microsoft.com/office/drawing/2010/main" w="9525">
                   <a:solidFill>
                     <a:srgbClr val="000000"/>
                   </a:solidFill>
@@ -6032,7 +5177,7 @@
             </a:ln>
             <a:extLst>
               <a:ext uri="{91240B29-F687-4f45-9708-019B960494DF}">
-                <a14:hiddenLine xmlns:a14="http://schemas.microsoft.com/office/drawing/2010/main" xmlns="" w="9525">
+                <a14:hiddenLine xmlns="" xmlns:a14="http://schemas.microsoft.com/office/drawing/2010/main" w="9525">
                   <a:solidFill>
                     <a:srgbClr val="000000"/>
                   </a:solidFill>
@@ -6122,7 +5267,7 @@
             </a:ln>
             <a:extLst>
               <a:ext uri="{91240B29-F687-4f45-9708-019B960494DF}">
-                <a14:hiddenLine xmlns:a14="http://schemas.microsoft.com/office/drawing/2010/main" xmlns="" w="9525">
+                <a14:hiddenLine xmlns="" xmlns:a14="http://schemas.microsoft.com/office/drawing/2010/main" w="9525">
                   <a:solidFill>
                     <a:srgbClr val="000000"/>
                   </a:solidFill>
@@ -6178,7 +5323,7 @@
             </a:ln>
             <a:extLst>
               <a:ext uri="{91240B29-F687-4f45-9708-019B960494DF}">
-                <a14:hiddenLine xmlns:a14="http://schemas.microsoft.com/office/drawing/2010/main" xmlns="" w="9525">
+                <a14:hiddenLine xmlns="" xmlns:a14="http://schemas.microsoft.com/office/drawing/2010/main" w="9525">
                   <a:solidFill>
                     <a:srgbClr val="000000"/>
                   </a:solidFill>
@@ -6268,7 +5413,7 @@
             </a:ln>
             <a:extLst>
               <a:ext uri="{91240B29-F687-4f45-9708-019B960494DF}">
-                <a14:hiddenLine xmlns:a14="http://schemas.microsoft.com/office/drawing/2010/main" xmlns="" w="9525">
+                <a14:hiddenLine xmlns="" xmlns:a14="http://schemas.microsoft.com/office/drawing/2010/main" w="9525">
                   <a:solidFill>
                     <a:srgbClr val="000000"/>
                   </a:solidFill>
@@ -6336,7 +5481,7 @@
             </a:ln>
             <a:extLst>
               <a:ext uri="{91240B29-F687-4f45-9708-019B960494DF}">
-                <a14:hiddenLine xmlns:a14="http://schemas.microsoft.com/office/drawing/2010/main" xmlns="" w="9525">
+                <a14:hiddenLine xmlns="" xmlns:a14="http://schemas.microsoft.com/office/drawing/2010/main" w="9525">
                   <a:solidFill>
                     <a:srgbClr val="000000"/>
                   </a:solidFill>
@@ -6426,7 +5571,7 @@
             </a:ln>
             <a:extLst>
               <a:ext uri="{91240B29-F687-4f45-9708-019B960494DF}">
-                <a14:hiddenLine xmlns:a14="http://schemas.microsoft.com/office/drawing/2010/main" xmlns="" w="9525">
+                <a14:hiddenLine xmlns="" xmlns:a14="http://schemas.microsoft.com/office/drawing/2010/main" w="9525">
                   <a:solidFill>
                     <a:srgbClr val="000000"/>
                   </a:solidFill>
@@ -6494,7 +5639,7 @@
             </a:ln>
             <a:extLst>
               <a:ext uri="{91240B29-F687-4f45-9708-019B960494DF}">
-                <a14:hiddenLine xmlns:a14="http://schemas.microsoft.com/office/drawing/2010/main" xmlns="" w="9525">
+                <a14:hiddenLine xmlns="" xmlns:a14="http://schemas.microsoft.com/office/drawing/2010/main" w="9525">
                   <a:solidFill>
                     <a:srgbClr val="000000"/>
                   </a:solidFill>
@@ -6584,7 +5729,7 @@
             </a:ln>
             <a:extLst>
               <a:ext uri="{91240B29-F687-4f45-9708-019B960494DF}">
-                <a14:hiddenLine xmlns:a14="http://schemas.microsoft.com/office/drawing/2010/main" xmlns="" w="9525">
+                <a14:hiddenLine xmlns="" xmlns:a14="http://schemas.microsoft.com/office/drawing/2010/main" w="9525">
                   <a:solidFill>
                     <a:srgbClr val="000000"/>
                   </a:solidFill>
@@ -6618,7 +5763,7 @@
             </a:ln>
             <a:extLst>
               <a:ext uri="{91240B29-F687-4f45-9708-019B960494DF}">
-                <a14:hiddenLine xmlns:a14="http://schemas.microsoft.com/office/drawing/2010/main" xmlns="" w="9525">
+                <a14:hiddenLine xmlns="" xmlns:a14="http://schemas.microsoft.com/office/drawing/2010/main" w="9525">
                   <a:solidFill>
                     <a:srgbClr val="000000"/>
                   </a:solidFill>
@@ -6708,7 +5853,7 @@
             </a:ln>
             <a:extLst>
               <a:ext uri="{91240B29-F687-4f45-9708-019B960494DF}">
-                <a14:hiddenLine xmlns:a14="http://schemas.microsoft.com/office/drawing/2010/main" xmlns="" w="9525">
+                <a14:hiddenLine xmlns="" xmlns:a14="http://schemas.microsoft.com/office/drawing/2010/main" w="9525">
                   <a:solidFill>
                     <a:srgbClr val="000000"/>
                   </a:solidFill>
@@ -6770,7 +5915,7 @@
             </a:ln>
             <a:extLst>
               <a:ext uri="{91240B29-F687-4f45-9708-019B960494DF}">
-                <a14:hiddenLine xmlns:a14="http://schemas.microsoft.com/office/drawing/2010/main" xmlns="" w="9525">
+                <a14:hiddenLine xmlns="" xmlns:a14="http://schemas.microsoft.com/office/drawing/2010/main" w="9525">
                   <a:solidFill>
                     <a:srgbClr val="000000"/>
                   </a:solidFill>
@@ -6832,7 +5977,7 @@
             </a:ln>
             <a:extLst>
               <a:ext uri="{91240B29-F687-4f45-9708-019B960494DF}">
-                <a14:hiddenLine xmlns:a14="http://schemas.microsoft.com/office/drawing/2010/main" xmlns="" w="9525">
+                <a14:hiddenLine xmlns="" xmlns:a14="http://schemas.microsoft.com/office/drawing/2010/main" w="9525">
                   <a:solidFill>
                     <a:srgbClr val="000000"/>
                   </a:solidFill>
@@ -6922,7 +6067,7 @@
             </a:ln>
             <a:extLst>
               <a:ext uri="{91240B29-F687-4f45-9708-019B960494DF}">
-                <a14:hiddenLine xmlns:a14="http://schemas.microsoft.com/office/drawing/2010/main" xmlns="" w="9525">
+                <a14:hiddenLine xmlns="" xmlns:a14="http://schemas.microsoft.com/office/drawing/2010/main" w="9525">
                   <a:solidFill>
                     <a:srgbClr val="000000"/>
                   </a:solidFill>
@@ -6990,7 +6135,7 @@
             </a:ln>
             <a:extLst>
               <a:ext uri="{91240B29-F687-4f45-9708-019B960494DF}">
-                <a14:hiddenLine xmlns:a14="http://schemas.microsoft.com/office/drawing/2010/main" xmlns="" w="9525">
+                <a14:hiddenLine xmlns="" xmlns:a14="http://schemas.microsoft.com/office/drawing/2010/main" w="9525">
                   <a:solidFill>
                     <a:srgbClr val="000000"/>
                   </a:solidFill>
@@ -7052,7 +6197,7 @@
             </a:ln>
             <a:extLst>
               <a:ext uri="{91240B29-F687-4f45-9708-019B960494DF}">
-                <a14:hiddenLine xmlns:a14="http://schemas.microsoft.com/office/drawing/2010/main" xmlns="" w="9525">
+                <a14:hiddenLine xmlns="" xmlns:a14="http://schemas.microsoft.com/office/drawing/2010/main" w="9525">
                   <a:solidFill>
                     <a:srgbClr val="000000"/>
                   </a:solidFill>
@@ -7142,7 +6287,7 @@
             </a:ln>
             <a:extLst>
               <a:ext uri="{91240B29-F687-4f45-9708-019B960494DF}">
-                <a14:hiddenLine xmlns:a14="http://schemas.microsoft.com/office/drawing/2010/main" xmlns="" w="9525">
+                <a14:hiddenLine xmlns="" xmlns:a14="http://schemas.microsoft.com/office/drawing/2010/main" w="9525">
                   <a:solidFill>
                     <a:srgbClr val="000000"/>
                   </a:solidFill>
@@ -7204,7 +6349,7 @@
             </a:ln>
             <a:extLst>
               <a:ext uri="{91240B29-F687-4f45-9708-019B960494DF}">
-                <a14:hiddenLine xmlns:a14="http://schemas.microsoft.com/office/drawing/2010/main" xmlns="" w="9525">
+                <a14:hiddenLine xmlns="" xmlns:a14="http://schemas.microsoft.com/office/drawing/2010/main" w="9525">
                   <a:solidFill>
                     <a:srgbClr val="000000"/>
                   </a:solidFill>
@@ -7294,7 +6439,7 @@
             </a:ln>
             <a:extLst>
               <a:ext uri="{91240B29-F687-4f45-9708-019B960494DF}">
-                <a14:hiddenLine xmlns:a14="http://schemas.microsoft.com/office/drawing/2010/main" xmlns="" w="9525">
+                <a14:hiddenLine xmlns="" xmlns:a14="http://schemas.microsoft.com/office/drawing/2010/main" w="9525">
                   <a:solidFill>
                     <a:srgbClr val="000000"/>
                   </a:solidFill>
@@ -7356,7 +6501,7 @@
             </a:ln>
             <a:extLst>
               <a:ext uri="{91240B29-F687-4f45-9708-019B960494DF}">
-                <a14:hiddenLine xmlns:a14="http://schemas.microsoft.com/office/drawing/2010/main" xmlns="" w="9525">
+                <a14:hiddenLine xmlns="" xmlns:a14="http://schemas.microsoft.com/office/drawing/2010/main" w="9525">
                   <a:solidFill>
                     <a:srgbClr val="000000"/>
                   </a:solidFill>
@@ -7446,7 +6591,7 @@
             </a:ln>
             <a:extLst>
               <a:ext uri="{91240B29-F687-4f45-9708-019B960494DF}">
-                <a14:hiddenLine xmlns:a14="http://schemas.microsoft.com/office/drawing/2010/main" xmlns="" w="9525">
+                <a14:hiddenLine xmlns="" xmlns:a14="http://schemas.microsoft.com/office/drawing/2010/main" w="9525">
                   <a:solidFill>
                     <a:srgbClr val="000000"/>
                   </a:solidFill>
@@ -7480,7 +6625,7 @@
             </a:ln>
             <a:extLst>
               <a:ext uri="{91240B29-F687-4f45-9708-019B960494DF}">
-                <a14:hiddenLine xmlns:a14="http://schemas.microsoft.com/office/drawing/2010/main" xmlns="" w="9525">
+                <a14:hiddenLine xmlns="" xmlns:a14="http://schemas.microsoft.com/office/drawing/2010/main" w="9525">
                   <a:solidFill>
                     <a:srgbClr val="000000"/>
                   </a:solidFill>
@@ -7545,7 +6690,7 @@
             </a:ln>
             <a:extLst>
               <a:ext uri="{91240B29-F687-4f45-9708-019B960494DF}">
-                <a14:hiddenLine xmlns:a14="http://schemas.microsoft.com/office/drawing/2010/main" xmlns="" w="9525">
+                <a14:hiddenLine xmlns="" xmlns:a14="http://schemas.microsoft.com/office/drawing/2010/main" w="9525">
                   <a:solidFill>
                     <a:srgbClr val="000000"/>
                   </a:solidFill>
@@ -7635,7 +6780,7 @@
             </a:ln>
             <a:extLst>
               <a:ext uri="{91240B29-F687-4f45-9708-019B960494DF}">
-                <a14:hiddenLine xmlns:a14="http://schemas.microsoft.com/office/drawing/2010/main" xmlns="" w="9525">
+                <a14:hiddenLine xmlns="" xmlns:a14="http://schemas.microsoft.com/office/drawing/2010/main" w="9525">
                   <a:solidFill>
                     <a:srgbClr val="000000"/>
                   </a:solidFill>
@@ -7697,7 +6842,7 @@
             </a:ln>
             <a:extLst>
               <a:ext uri="{91240B29-F687-4f45-9708-019B960494DF}">
-                <a14:hiddenLine xmlns:a14="http://schemas.microsoft.com/office/drawing/2010/main" xmlns="" w="9525">
+                <a14:hiddenLine xmlns="" xmlns:a14="http://schemas.microsoft.com/office/drawing/2010/main" w="9525">
                   <a:solidFill>
                     <a:srgbClr val="000000"/>
                   </a:solidFill>
@@ -7787,7 +6932,7 @@
             </a:ln>
             <a:extLst>
               <a:ext uri="{91240B29-F687-4f45-9708-019B960494DF}">
-                <a14:hiddenLine xmlns:a14="http://schemas.microsoft.com/office/drawing/2010/main" xmlns="" w="9525">
+                <a14:hiddenLine xmlns="" xmlns:a14="http://schemas.microsoft.com/office/drawing/2010/main" w="9525">
                   <a:solidFill>
                     <a:srgbClr val="000000"/>
                   </a:solidFill>
@@ -7877,7 +7022,7 @@
             </a:ln>
             <a:extLst>
               <a:ext uri="{91240B29-F687-4f45-9708-019B960494DF}">
-                <a14:hiddenLine xmlns:a14="http://schemas.microsoft.com/office/drawing/2010/main" xmlns="" w="9525">
+                <a14:hiddenLine xmlns="" xmlns:a14="http://schemas.microsoft.com/office/drawing/2010/main" w="9525">
                   <a:solidFill>
                     <a:srgbClr val="000000"/>
                   </a:solidFill>
@@ -7942,7 +7087,7 @@
             </a:ln>
             <a:extLst>
               <a:ext uri="{91240B29-F687-4f45-9708-019B960494DF}">
-                <a14:hiddenLine xmlns:a14="http://schemas.microsoft.com/office/drawing/2010/main" xmlns="" w="9525">
+                <a14:hiddenLine xmlns="" xmlns:a14="http://schemas.microsoft.com/office/drawing/2010/main" w="9525">
                   <a:solidFill>
                     <a:srgbClr val="000000"/>
                   </a:solidFill>
@@ -8004,7 +7149,7 @@
             </a:ln>
             <a:extLst>
               <a:ext uri="{91240B29-F687-4f45-9708-019B960494DF}">
-                <a14:hiddenLine xmlns:a14="http://schemas.microsoft.com/office/drawing/2010/main" xmlns="" w="9525">
+                <a14:hiddenLine xmlns="" xmlns:a14="http://schemas.microsoft.com/office/drawing/2010/main" w="9525">
                   <a:solidFill>
                     <a:srgbClr val="000000"/>
                   </a:solidFill>
@@ -8094,7 +7239,7 @@
             </a:ln>
             <a:extLst>
               <a:ext uri="{91240B29-F687-4f45-9708-019B960494DF}">
-                <a14:hiddenLine xmlns:a14="http://schemas.microsoft.com/office/drawing/2010/main" xmlns="" w="9525">
+                <a14:hiddenLine xmlns="" xmlns:a14="http://schemas.microsoft.com/office/drawing/2010/main" w="9525">
                   <a:solidFill>
                     <a:srgbClr val="000000"/>
                   </a:solidFill>
@@ -8184,7 +7329,7 @@
             </a:ln>
             <a:extLst>
               <a:ext uri="{91240B29-F687-4f45-9708-019B960494DF}">
-                <a14:hiddenLine xmlns:a14="http://schemas.microsoft.com/office/drawing/2010/main" xmlns="" w="9525">
+                <a14:hiddenLine xmlns="" xmlns:a14="http://schemas.microsoft.com/office/drawing/2010/main" w="9525">
                   <a:solidFill>
                     <a:srgbClr val="000000"/>
                   </a:solidFill>
@@ -8246,7 +7391,7 @@
             </a:ln>
             <a:extLst>
               <a:ext uri="{91240B29-F687-4f45-9708-019B960494DF}">
-                <a14:hiddenLine xmlns:a14="http://schemas.microsoft.com/office/drawing/2010/main" xmlns="" w="9525">
+                <a14:hiddenLine xmlns="" xmlns:a14="http://schemas.microsoft.com/office/drawing/2010/main" w="9525">
                   <a:solidFill>
                     <a:srgbClr val="000000"/>
                   </a:solidFill>
@@ -8366,7 +7511,7 @@
             </a:ln>
             <a:extLst>
               <a:ext uri="{91240B29-F687-4f45-9708-019B960494DF}">
-                <a14:hiddenLine xmlns:a14="http://schemas.microsoft.com/office/drawing/2010/main" xmlns="" w="9525">
+                <a14:hiddenLine xmlns="" xmlns:a14="http://schemas.microsoft.com/office/drawing/2010/main" w="9525">
                   <a:solidFill>
                     <a:srgbClr val="000000"/>
                   </a:solidFill>
@@ -8434,7 +7579,7 @@
             </a:ln>
             <a:extLst>
               <a:ext uri="{91240B29-F687-4f45-9708-019B960494DF}">
-                <a14:hiddenLine xmlns:a14="http://schemas.microsoft.com/office/drawing/2010/main" xmlns="" w="9525">
+                <a14:hiddenLine xmlns="" xmlns:a14="http://schemas.microsoft.com/office/drawing/2010/main" w="9525">
                   <a:solidFill>
                     <a:srgbClr val="000000"/>
                   </a:solidFill>
@@ -8524,7 +7669,7 @@
             </a:ln>
             <a:extLst>
               <a:ext uri="{91240B29-F687-4f45-9708-019B960494DF}">
-                <a14:hiddenLine xmlns:a14="http://schemas.microsoft.com/office/drawing/2010/main" xmlns="" w="9525">
+                <a14:hiddenLine xmlns="" xmlns:a14="http://schemas.microsoft.com/office/drawing/2010/main" w="9525">
                   <a:solidFill>
                     <a:srgbClr val="000000"/>
                   </a:solidFill>
@@ -13956,7 +13101,7 @@
           <a:noFill/>
           <a:extLst>
             <a:ext uri="{909E8E84-426E-40dd-AFC4-6F175D3DCCD1}">
-              <a14:hiddenFill xmlns:a14="http://schemas.microsoft.com/office/drawing/2010/main" xmlns="">
+              <a14:hiddenFill xmlns="" xmlns:a14="http://schemas.microsoft.com/office/drawing/2010/main">
                 <a:solidFill>
                   <a:srgbClr val="FFFFFF"/>
                 </a:solidFill>
@@ -14030,7 +13175,7 @@
               </a:ln>
               <a:extLst>
                 <a:ext uri="{91240B29-F687-4f45-9708-019B960494DF}">
-                  <a14:hiddenLine xmlns:a14="http://schemas.microsoft.com/office/drawing/2010/main" xmlns="" w="9525">
+                  <a14:hiddenLine xmlns="" xmlns:a14="http://schemas.microsoft.com/office/drawing/2010/main" w="9525">
                     <a:solidFill>
                       <a:srgbClr val="000000"/>
                     </a:solidFill>
@@ -14120,7 +13265,7 @@
               </a:ln>
               <a:extLst>
                 <a:ext uri="{91240B29-F687-4f45-9708-019B960494DF}">
-                  <a14:hiddenLine xmlns:a14="http://schemas.microsoft.com/office/drawing/2010/main" xmlns="" w="9525">
+                  <a14:hiddenLine xmlns="" xmlns:a14="http://schemas.microsoft.com/office/drawing/2010/main" w="9525">
                     <a:solidFill>
                       <a:srgbClr val="000000"/>
                     </a:solidFill>
@@ -14210,7 +13355,7 @@
               </a:ln>
               <a:extLst>
                 <a:ext uri="{91240B29-F687-4f45-9708-019B960494DF}">
-                  <a14:hiddenLine xmlns:a14="http://schemas.microsoft.com/office/drawing/2010/main" xmlns="" w="9525">
+                  <a14:hiddenLine xmlns="" xmlns:a14="http://schemas.microsoft.com/office/drawing/2010/main" w="9525">
                     <a:solidFill>
                       <a:srgbClr val="000000"/>
                     </a:solidFill>
@@ -14272,7 +13417,7 @@
               </a:ln>
               <a:extLst>
                 <a:ext uri="{91240B29-F687-4f45-9708-019B960494DF}">
-                  <a14:hiddenLine xmlns:a14="http://schemas.microsoft.com/office/drawing/2010/main" xmlns="" w="9525">
+                  <a14:hiddenLine xmlns="" xmlns:a14="http://schemas.microsoft.com/office/drawing/2010/main" w="9525">
                     <a:solidFill>
                       <a:srgbClr val="000000"/>
                     </a:solidFill>
@@ -14362,7 +13507,7 @@
               </a:ln>
               <a:extLst>
                 <a:ext uri="{91240B29-F687-4f45-9708-019B960494DF}">
-                  <a14:hiddenLine xmlns:a14="http://schemas.microsoft.com/office/drawing/2010/main" xmlns="" w="9525">
+                  <a14:hiddenLine xmlns="" xmlns:a14="http://schemas.microsoft.com/office/drawing/2010/main" w="9525">
                     <a:solidFill>
                       <a:srgbClr val="000000"/>
                     </a:solidFill>
@@ -14424,7 +13569,7 @@
               </a:ln>
               <a:extLst>
                 <a:ext uri="{91240B29-F687-4f45-9708-019B960494DF}">
-                  <a14:hiddenLine xmlns:a14="http://schemas.microsoft.com/office/drawing/2010/main" xmlns="" w="9525">
+                  <a14:hiddenLine xmlns="" xmlns:a14="http://schemas.microsoft.com/office/drawing/2010/main" w="9525">
                     <a:solidFill>
                       <a:srgbClr val="000000"/>
                     </a:solidFill>
@@ -14486,7 +13631,7 @@
               </a:ln>
               <a:extLst>
                 <a:ext uri="{91240B29-F687-4f45-9708-019B960494DF}">
-                  <a14:hiddenLine xmlns:a14="http://schemas.microsoft.com/office/drawing/2010/main" xmlns="" w="9525">
+                  <a14:hiddenLine xmlns="" xmlns:a14="http://schemas.microsoft.com/office/drawing/2010/main" w="9525">
                     <a:solidFill>
                       <a:srgbClr val="000000"/>
                     </a:solidFill>
@@ -14576,7 +13721,7 @@
               </a:ln>
               <a:extLst>
                 <a:ext uri="{91240B29-F687-4f45-9708-019B960494DF}">
-                  <a14:hiddenLine xmlns:a14="http://schemas.microsoft.com/office/drawing/2010/main" xmlns="" w="9525">
+                  <a14:hiddenLine xmlns="" xmlns:a14="http://schemas.microsoft.com/office/drawing/2010/main" w="9525">
                     <a:solidFill>
                       <a:srgbClr val="000000"/>
                     </a:solidFill>
@@ -14666,7 +13811,7 @@
               </a:ln>
               <a:extLst>
                 <a:ext uri="{91240B29-F687-4f45-9708-019B960494DF}">
-                  <a14:hiddenLine xmlns:a14="http://schemas.microsoft.com/office/drawing/2010/main" xmlns="" w="9525">
+                  <a14:hiddenLine xmlns="" xmlns:a14="http://schemas.microsoft.com/office/drawing/2010/main" w="9525">
                     <a:solidFill>
                       <a:srgbClr val="000000"/>
                     </a:solidFill>
@@ -14728,7 +13873,7 @@
               </a:ln>
               <a:extLst>
                 <a:ext uri="{91240B29-F687-4f45-9708-019B960494DF}">
-                  <a14:hiddenLine xmlns:a14="http://schemas.microsoft.com/office/drawing/2010/main" xmlns="" w="9525">
+                  <a14:hiddenLine xmlns="" xmlns:a14="http://schemas.microsoft.com/office/drawing/2010/main" w="9525">
                     <a:solidFill>
                       <a:srgbClr val="000000"/>
                     </a:solidFill>
@@ -14838,7 +13983,7 @@
               </a:ln>
               <a:extLst>
                 <a:ext uri="{91240B29-F687-4f45-9708-019B960494DF}">
-                  <a14:hiddenLine xmlns:a14="http://schemas.microsoft.com/office/drawing/2010/main" xmlns="" w="9525">
+                  <a14:hiddenLine xmlns="" xmlns:a14="http://schemas.microsoft.com/office/drawing/2010/main" w="9525">
                     <a:solidFill>
                       <a:srgbClr val="000000"/>
                     </a:solidFill>
@@ -14922,7 +14067,7 @@
               </a:ln>
               <a:extLst>
                 <a:ext uri="{91240B29-F687-4f45-9708-019B960494DF}">
-                  <a14:hiddenLine xmlns:a14="http://schemas.microsoft.com/office/drawing/2010/main" xmlns="" w="9525">
+                  <a14:hiddenLine xmlns="" xmlns:a14="http://schemas.microsoft.com/office/drawing/2010/main" w="9525">
                     <a:solidFill>
                       <a:srgbClr val="000000"/>
                     </a:solidFill>
@@ -14984,7 +14129,7 @@
               </a:ln>
               <a:extLst>
                 <a:ext uri="{91240B29-F687-4f45-9708-019B960494DF}">
-                  <a14:hiddenLine xmlns:a14="http://schemas.microsoft.com/office/drawing/2010/main" xmlns="" w="9525">
+                  <a14:hiddenLine xmlns="" xmlns:a14="http://schemas.microsoft.com/office/drawing/2010/main" w="9525">
                     <a:solidFill>
                       <a:srgbClr val="000000"/>
                     </a:solidFill>
@@ -15046,7 +14191,7 @@
               </a:ln>
               <a:extLst>
                 <a:ext uri="{91240B29-F687-4f45-9708-019B960494DF}">
-                  <a14:hiddenLine xmlns:a14="http://schemas.microsoft.com/office/drawing/2010/main" xmlns="" w="9525">
+                  <a14:hiddenLine xmlns="" xmlns:a14="http://schemas.microsoft.com/office/drawing/2010/main" w="9525">
                     <a:solidFill>
                       <a:srgbClr val="000000"/>
                     </a:solidFill>
@@ -15136,7 +14281,7 @@
               </a:ln>
               <a:extLst>
                 <a:ext uri="{91240B29-F687-4f45-9708-019B960494DF}">
-                  <a14:hiddenLine xmlns:a14="http://schemas.microsoft.com/office/drawing/2010/main" xmlns="" w="9525">
+                  <a14:hiddenLine xmlns="" xmlns:a14="http://schemas.microsoft.com/office/drawing/2010/main" w="9525">
                     <a:solidFill>
                       <a:srgbClr val="000000"/>
                     </a:solidFill>
@@ -15170,7 +14315,7 @@
               </a:ln>
               <a:extLst>
                 <a:ext uri="{91240B29-F687-4f45-9708-019B960494DF}">
-                  <a14:hiddenLine xmlns:a14="http://schemas.microsoft.com/office/drawing/2010/main" xmlns="" w="9525">
+                  <a14:hiddenLine xmlns="" xmlns:a14="http://schemas.microsoft.com/office/drawing/2010/main" w="9525">
                     <a:solidFill>
                       <a:srgbClr val="000000"/>
                     </a:solidFill>
@@ -15235,7 +14380,7 @@
               </a:ln>
               <a:extLst>
                 <a:ext uri="{91240B29-F687-4f45-9708-019B960494DF}">
-                  <a14:hiddenLine xmlns:a14="http://schemas.microsoft.com/office/drawing/2010/main" xmlns="" w="9525">
+                  <a14:hiddenLine xmlns="" xmlns:a14="http://schemas.microsoft.com/office/drawing/2010/main" w="9525">
                     <a:solidFill>
                       <a:srgbClr val="000000"/>
                     </a:solidFill>
@@ -15325,7 +14470,7 @@
               </a:ln>
               <a:extLst>
                 <a:ext uri="{91240B29-F687-4f45-9708-019B960494DF}">
-                  <a14:hiddenLine xmlns:a14="http://schemas.microsoft.com/office/drawing/2010/main" xmlns="" w="9525">
+                  <a14:hiddenLine xmlns="" xmlns:a14="http://schemas.microsoft.com/office/drawing/2010/main" w="9525">
                     <a:solidFill>
                       <a:srgbClr val="000000"/>
                     </a:solidFill>
@@ -15387,7 +14532,7 @@
               </a:ln>
               <a:extLst>
                 <a:ext uri="{91240B29-F687-4f45-9708-019B960494DF}">
-                  <a14:hiddenLine xmlns:a14="http://schemas.microsoft.com/office/drawing/2010/main" xmlns="" w="9525">
+                  <a14:hiddenLine xmlns="" xmlns:a14="http://schemas.microsoft.com/office/drawing/2010/main" w="9525">
                     <a:solidFill>
                       <a:srgbClr val="000000"/>
                     </a:solidFill>
@@ -15477,7 +14622,7 @@
               </a:ln>
               <a:extLst>
                 <a:ext uri="{91240B29-F687-4f45-9708-019B960494DF}">
-                  <a14:hiddenLine xmlns:a14="http://schemas.microsoft.com/office/drawing/2010/main" xmlns="" w="9525">
+                  <a14:hiddenLine xmlns="" xmlns:a14="http://schemas.microsoft.com/office/drawing/2010/main" w="9525">
                     <a:solidFill>
                       <a:srgbClr val="000000"/>
                     </a:solidFill>
@@ -15542,7 +14687,7 @@
               </a:ln>
               <a:extLst>
                 <a:ext uri="{91240B29-F687-4f45-9708-019B960494DF}">
-                  <a14:hiddenLine xmlns:a14="http://schemas.microsoft.com/office/drawing/2010/main" xmlns="" w="9525">
+                  <a14:hiddenLine xmlns="" xmlns:a14="http://schemas.microsoft.com/office/drawing/2010/main" w="9525">
                     <a:solidFill>
                       <a:srgbClr val="000000"/>
                     </a:solidFill>
@@ -15604,7 +14749,7 @@
               </a:ln>
               <a:extLst>
                 <a:ext uri="{91240B29-F687-4f45-9708-019B960494DF}">
-                  <a14:hiddenLine xmlns:a14="http://schemas.microsoft.com/office/drawing/2010/main" xmlns="" w="9525">
+                  <a14:hiddenLine xmlns="" xmlns:a14="http://schemas.microsoft.com/office/drawing/2010/main" w="9525">
                     <a:solidFill>
                       <a:srgbClr val="000000"/>
                     </a:solidFill>
@@ -15694,7 +14839,7 @@
               </a:ln>
               <a:extLst>
                 <a:ext uri="{91240B29-F687-4f45-9708-019B960494DF}">
-                  <a14:hiddenLine xmlns:a14="http://schemas.microsoft.com/office/drawing/2010/main" xmlns="" w="9525">
+                  <a14:hiddenLine xmlns="" xmlns:a14="http://schemas.microsoft.com/office/drawing/2010/main" w="9525">
                     <a:solidFill>
                       <a:srgbClr val="000000"/>
                     </a:solidFill>
@@ -15784,7 +14929,7 @@
               </a:ln>
               <a:extLst>
                 <a:ext uri="{91240B29-F687-4f45-9708-019B960494DF}">
-                  <a14:hiddenLine xmlns:a14="http://schemas.microsoft.com/office/drawing/2010/main" xmlns="" w="9525">
+                  <a14:hiddenLine xmlns="" xmlns:a14="http://schemas.microsoft.com/office/drawing/2010/main" w="9525">
                     <a:solidFill>
                       <a:srgbClr val="000000"/>
                     </a:solidFill>
@@ -15849,7 +14994,7 @@
               </a:ln>
               <a:extLst>
                 <a:ext uri="{91240B29-F687-4f45-9708-019B960494DF}">
-                  <a14:hiddenLine xmlns:a14="http://schemas.microsoft.com/office/drawing/2010/main" xmlns="" w="9525">
+                  <a14:hiddenLine xmlns="" xmlns:a14="http://schemas.microsoft.com/office/drawing/2010/main" w="9525">
                     <a:solidFill>
                       <a:srgbClr val="000000"/>
                     </a:solidFill>
@@ -15969,7 +15114,7 @@
               </a:ln>
               <a:extLst>
                 <a:ext uri="{91240B29-F687-4f45-9708-019B960494DF}">
-                  <a14:hiddenLine xmlns:a14="http://schemas.microsoft.com/office/drawing/2010/main" xmlns="" w="9525">
+                  <a14:hiddenLine xmlns="" xmlns:a14="http://schemas.microsoft.com/office/drawing/2010/main" w="9525">
                     <a:solidFill>
                       <a:srgbClr val="000000"/>
                     </a:solidFill>
@@ -16050,7 +15195,7 @@
               </a:ln>
               <a:extLst>
                 <a:ext uri="{91240B29-F687-4f45-9708-019B960494DF}">
-                  <a14:hiddenLine xmlns:a14="http://schemas.microsoft.com/office/drawing/2010/main" xmlns="" w="9525">
+                  <a14:hiddenLine xmlns="" xmlns:a14="http://schemas.microsoft.com/office/drawing/2010/main" w="9525">
                     <a:solidFill>
                       <a:srgbClr val="000000"/>
                     </a:solidFill>
@@ -16165,7 +15310,7 @@
               </a:ln>
               <a:extLst>
                 <a:ext uri="{91240B29-F687-4f45-9708-019B960494DF}">
-                  <a14:hiddenLine xmlns:a14="http://schemas.microsoft.com/office/drawing/2010/main" xmlns="" w="9525">
+                  <a14:hiddenLine xmlns="" xmlns:a14="http://schemas.microsoft.com/office/drawing/2010/main" w="9525">
                     <a:solidFill>
                       <a:srgbClr val="000000"/>
                     </a:solidFill>
@@ -16255,7 +15400,7 @@
               </a:ln>
               <a:extLst>
                 <a:ext uri="{91240B29-F687-4f45-9708-019B960494DF}">
-                  <a14:hiddenLine xmlns:a14="http://schemas.microsoft.com/office/drawing/2010/main" xmlns="" w="9525">
+                  <a14:hiddenLine xmlns="" xmlns:a14="http://schemas.microsoft.com/office/drawing/2010/main" w="9525">
                     <a:solidFill>
                       <a:srgbClr val="000000"/>
                     </a:solidFill>
@@ -16320,7 +15465,7 @@
               </a:ln>
               <a:extLst>
                 <a:ext uri="{91240B29-F687-4f45-9708-019B960494DF}">
-                  <a14:hiddenLine xmlns:a14="http://schemas.microsoft.com/office/drawing/2010/main" xmlns="" w="9525">
+                  <a14:hiddenLine xmlns="" xmlns:a14="http://schemas.microsoft.com/office/drawing/2010/main" w="9525">
                     <a:solidFill>
                       <a:srgbClr val="000000"/>
                     </a:solidFill>
@@ -16410,7 +15555,7 @@
               </a:ln>
               <a:extLst>
                 <a:ext uri="{91240B29-F687-4f45-9708-019B960494DF}">
-                  <a14:hiddenLine xmlns:a14="http://schemas.microsoft.com/office/drawing/2010/main" xmlns="" w="9525">
+                  <a14:hiddenLine xmlns="" xmlns:a14="http://schemas.microsoft.com/office/drawing/2010/main" w="9525">
                     <a:solidFill>
                       <a:srgbClr val="000000"/>
                     </a:solidFill>
@@ -16478,7 +15623,7 @@
               </a:ln>
               <a:extLst>
                 <a:ext uri="{91240B29-F687-4f45-9708-019B960494DF}">
-                  <a14:hiddenLine xmlns:a14="http://schemas.microsoft.com/office/drawing/2010/main" xmlns="" w="9525">
+                  <a14:hiddenLine xmlns="" xmlns:a14="http://schemas.microsoft.com/office/drawing/2010/main" w="9525">
                     <a:solidFill>
                       <a:srgbClr val="000000"/>
                     </a:solidFill>
@@ -16568,7 +15713,7 @@
               </a:ln>
               <a:extLst>
                 <a:ext uri="{91240B29-F687-4f45-9708-019B960494DF}">
-                  <a14:hiddenLine xmlns:a14="http://schemas.microsoft.com/office/drawing/2010/main" xmlns="" w="9525">
+                  <a14:hiddenLine xmlns="" xmlns:a14="http://schemas.microsoft.com/office/drawing/2010/main" w="9525">
                     <a:solidFill>
                       <a:srgbClr val="000000"/>
                     </a:solidFill>
@@ -16636,7 +15781,7 @@
               </a:ln>
               <a:extLst>
                 <a:ext uri="{91240B29-F687-4f45-9708-019B960494DF}">
-                  <a14:hiddenLine xmlns:a14="http://schemas.microsoft.com/office/drawing/2010/main" xmlns="" w="9525">
+                  <a14:hiddenLine xmlns="" xmlns:a14="http://schemas.microsoft.com/office/drawing/2010/main" w="9525">
                     <a:solidFill>
                       <a:srgbClr val="000000"/>
                     </a:solidFill>
@@ -16726,7 +15871,7 @@
               </a:ln>
               <a:extLst>
                 <a:ext uri="{91240B29-F687-4f45-9708-019B960494DF}">
-                  <a14:hiddenLine xmlns:a14="http://schemas.microsoft.com/office/drawing/2010/main" xmlns="" w="9525">
+                  <a14:hiddenLine xmlns="" xmlns:a14="http://schemas.microsoft.com/office/drawing/2010/main" w="9525">
                     <a:solidFill>
                       <a:srgbClr val="000000"/>
                     </a:solidFill>
@@ -16760,7 +15905,7 @@
               </a:ln>
               <a:extLst>
                 <a:ext uri="{91240B29-F687-4f45-9708-019B960494DF}">
-                  <a14:hiddenLine xmlns:a14="http://schemas.microsoft.com/office/drawing/2010/main" xmlns="" w="9525">
+                  <a14:hiddenLine xmlns="" xmlns:a14="http://schemas.microsoft.com/office/drawing/2010/main" w="9525">
                     <a:solidFill>
                       <a:srgbClr val="000000"/>
                     </a:solidFill>
@@ -18580,7 +17725,7 @@
     <mc:Choice Requires="p14">
       <p:transition spd="slow" p14:dur="2000"/>
     </mc:Choice>
-    <mc:Fallback xmlns:p15="http://schemas.microsoft.com/office/powerpoint/2012/main" xmlns="">
+    <mc:Fallback xmlns="" xmlns:p15="http://schemas.microsoft.com/office/powerpoint/2012/main">
       <p:transition spd="slow"/>
     </mc:Fallback>
   </mc:AlternateContent>
@@ -23143,6 +22288,88 @@
           </a:fontRef>
         </p:style>
       </p:cxnSp>
+      <p:cxnSp>
+        <p:nvCxnSpPr>
+          <p:cNvPr id="11" name="Elbow Connector 10"/>
+          <p:cNvCxnSpPr>
+            <a:stCxn id="64" idx="0"/>
+            <a:endCxn id="25" idx="2"/>
+          </p:cNvCxnSpPr>
+          <p:nvPr/>
+        </p:nvCxnSpPr>
+        <p:spPr>
+          <a:xfrm rot="5400000" flipH="1" flipV="1">
+            <a:off x="4725613" y="1638712"/>
+            <a:ext cx="1176419" cy="3211223"/>
+          </a:xfrm>
+          <a:prstGeom prst="bentConnector3">
+            <a:avLst>
+              <a:gd name="adj1" fmla="val 75504"/>
+            </a:avLst>
+          </a:prstGeom>
+          <a:ln>
+            <a:solidFill>
+              <a:schemeClr val="bg1"/>
+            </a:solidFill>
+            <a:tailEnd type="triangle" w="lg" len="lg"/>
+          </a:ln>
+        </p:spPr>
+        <p:style>
+          <a:lnRef idx="1">
+            <a:schemeClr val="accent1"/>
+          </a:lnRef>
+          <a:fillRef idx="0">
+            <a:schemeClr val="accent1"/>
+          </a:fillRef>
+          <a:effectRef idx="0">
+            <a:schemeClr val="accent1"/>
+          </a:effectRef>
+          <a:fontRef idx="minor">
+            <a:schemeClr val="tx1"/>
+          </a:fontRef>
+        </p:style>
+      </p:cxnSp>
+      <p:cxnSp>
+        <p:nvCxnSpPr>
+          <p:cNvPr id="41" name="Elbow Connector 40"/>
+          <p:cNvCxnSpPr>
+            <a:stCxn id="48" idx="2"/>
+            <a:endCxn id="70" idx="4"/>
+          </p:cNvCxnSpPr>
+          <p:nvPr/>
+        </p:nvCxnSpPr>
+        <p:spPr>
+          <a:xfrm rot="5400000" flipH="1">
+            <a:off x="4043535" y="1607313"/>
+            <a:ext cx="102111" cy="5649684"/>
+          </a:xfrm>
+          <a:prstGeom prst="bentConnector3">
+            <a:avLst>
+              <a:gd name="adj1" fmla="val -536589"/>
+            </a:avLst>
+          </a:prstGeom>
+          <a:ln>
+            <a:solidFill>
+              <a:schemeClr val="bg1"/>
+            </a:solidFill>
+            <a:tailEnd type="triangle" w="lg" len="lg"/>
+          </a:ln>
+        </p:spPr>
+        <p:style>
+          <a:lnRef idx="1">
+            <a:schemeClr val="accent1"/>
+          </a:lnRef>
+          <a:fillRef idx="0">
+            <a:schemeClr val="accent1"/>
+          </a:fillRef>
+          <a:effectRef idx="0">
+            <a:schemeClr val="accent1"/>
+          </a:effectRef>
+          <a:fontRef idx="minor">
+            <a:schemeClr val="tx1"/>
+          </a:fontRef>
+        </p:style>
+      </p:cxnSp>
     </p:spTree>
     <p:extLst>
       <p:ext uri="{BB962C8B-B14F-4D97-AF65-F5344CB8AC3E}">
@@ -23611,61 +22838,7 @@
                 <a:ea typeface="Open Sans" panose="020B0606030504020204" pitchFamily="34" charset="0"/>
                 <a:cs typeface="Open Sans" panose="020B0606030504020204" pitchFamily="34" charset="0"/>
               </a:rPr>
-              <a:t>The </a:t>
-            </a:r>
-            <a:r>
-              <a:rPr lang="en-US" b="1" u="sng" spc="-1" dirty="0" smtClean="0">
-                <a:solidFill>
-                  <a:schemeClr val="bg1"/>
-                </a:solidFill>
-                <a:effectLst>
-                  <a:outerShdw blurRad="38100" dist="38100" dir="2700000" algn="tl">
-                    <a:srgbClr val="000000">
-                      <a:alpha val="43137"/>
-                    </a:srgbClr>
-                  </a:outerShdw>
-                </a:effectLst>
-                <a:latin typeface="Open Sans" panose="020B0606030504020204" pitchFamily="34" charset="0"/>
-                <a:ea typeface="Open Sans" panose="020B0606030504020204" pitchFamily="34" charset="0"/>
-                <a:cs typeface="Open Sans" panose="020B0606030504020204" pitchFamily="34" charset="0"/>
-              </a:rPr>
-              <a:t>Output</a:t>
-            </a:r>
-            <a:r>
-              <a:rPr lang="en-US" b="1" u="sng" spc="-1" dirty="0" smtClean="0">
-                <a:solidFill>
-                  <a:schemeClr val="bg1"/>
-                </a:solidFill>
-                <a:effectLst>
-                  <a:outerShdw blurRad="38100" dist="38100" dir="2700000" algn="tl">
-                    <a:srgbClr val="000000">
-                      <a:alpha val="43137"/>
-                    </a:srgbClr>
-                  </a:outerShdw>
-                </a:effectLst>
-                <a:latin typeface="Open Sans" panose="020B0606030504020204" pitchFamily="34" charset="0"/>
-                <a:ea typeface="Open Sans" panose="020B0606030504020204" pitchFamily="34" charset="0"/>
-                <a:cs typeface="Open Sans" panose="020B0606030504020204" pitchFamily="34" charset="0"/>
-              </a:rPr>
-              <a:t> </a:t>
-            </a:r>
-            <a:r>
-              <a:rPr lang="en-US" b="1" u="sng" spc="-1" dirty="0" smtClean="0">
-                <a:solidFill>
-                  <a:schemeClr val="bg1"/>
-                </a:solidFill>
-                <a:effectLst>
-                  <a:outerShdw blurRad="38100" dist="38100" dir="2700000" algn="tl">
-                    <a:srgbClr val="000000">
-                      <a:alpha val="43137"/>
-                    </a:srgbClr>
-                  </a:outerShdw>
-                </a:effectLst>
-                <a:latin typeface="Open Sans" panose="020B0606030504020204" pitchFamily="34" charset="0"/>
-                <a:ea typeface="Open Sans" panose="020B0606030504020204" pitchFamily="34" charset="0"/>
-                <a:cs typeface="Open Sans" panose="020B0606030504020204" pitchFamily="34" charset="0"/>
-              </a:rPr>
-              <a:t>Generator Module: </a:t>
+              <a:t>The Output Generator Module: </a:t>
             </a:r>
           </a:p>
           <a:p>
@@ -23701,25 +22874,7 @@
                 <a:ea typeface="Open Sans" panose="020B0606030504020204" pitchFamily="34" charset="0"/>
                 <a:cs typeface="Open Sans" panose="020B0606030504020204" pitchFamily="34" charset="0"/>
               </a:rPr>
-              <a:t>Lastly, the Graph Generator module helps visualize the segregated data with help of graphs. </a:t>
-            </a:r>
-            <a:r>
-              <a:rPr lang="en-US" sz="1900" spc="-1" dirty="0" smtClean="0">
-                <a:solidFill>
-                  <a:schemeClr val="bg1"/>
-                </a:solidFill>
-                <a:effectLst>
-                  <a:outerShdw blurRad="38100" dist="38100" dir="2700000" algn="tl">
-                    <a:srgbClr val="000000">
-                      <a:alpha val="43137"/>
-                    </a:srgbClr>
-                  </a:outerShdw>
-                </a:effectLst>
-                <a:latin typeface="Open Sans" panose="020B0606030504020204" pitchFamily="34" charset="0"/>
-                <a:ea typeface="Open Sans" panose="020B0606030504020204" pitchFamily="34" charset="0"/>
-                <a:cs typeface="Open Sans" panose="020B0606030504020204" pitchFamily="34" charset="0"/>
-              </a:rPr>
-              <a:t>(</a:t>
+              <a:t>Lastly, the Graph Generator module helps visualize the segregated data with help of graphs. (</a:t>
             </a:r>
             <a:r>
               <a:rPr lang="en-US" sz="1900" b="1" spc="-1" dirty="0" smtClean="0">
@@ -23737,25 +22892,7 @@
                 <a:ea typeface="Open Sans" panose="020B0606030504020204" pitchFamily="34" charset="0"/>
                 <a:cs typeface="Open Sans" panose="020B0606030504020204" pitchFamily="34" charset="0"/>
               </a:rPr>
-              <a:t>output</a:t>
-            </a:r>
-            <a:r>
-              <a:rPr lang="en-US" sz="1900" b="1" spc="-1" dirty="0" smtClean="0">
-                <a:solidFill>
-                  <a:schemeClr val="bg1"/>
-                </a:solidFill>
-                <a:effectLst>
-                  <a:outerShdw blurRad="38100" dist="38100" dir="2700000" algn="tl">
-                    <a:srgbClr val="000000">
-                      <a:alpha val="43137"/>
-                    </a:srgbClr>
-                  </a:outerShdw>
-                </a:effectLst>
-                <a:latin typeface="Open Sans" panose="020B0606030504020204" pitchFamily="34" charset="0"/>
-                <a:ea typeface="Open Sans" panose="020B0606030504020204" pitchFamily="34" charset="0"/>
-                <a:cs typeface="Open Sans" panose="020B0606030504020204" pitchFamily="34" charset="0"/>
-              </a:rPr>
-              <a:t>Generator.py</a:t>
+              <a:t>outputGenerator.py</a:t>
             </a:r>
             <a:r>
               <a:rPr lang="en-US" sz="1900" spc="-1" dirty="0" smtClean="0">

</xml_diff>

<commit_message>
Updated UML Diagrams and PPT
</commit_message>
<xml_diff>
--- a/Review/review3.pptx
+++ b/Review/review3.pptx
@@ -1561,6 +1561,861 @@
       <dsp:cNvGrpSpPr/>
     </dsp:nvGrpSpPr>
     <dsp:grpSpPr/>
+    <dsp:sp modelId="{0BE14009-EC52-49F6-BDA1-B1D769007F5F}">
+      <dsp:nvSpPr>
+        <dsp:cNvPr id="0" name=""/>
+        <dsp:cNvSpPr/>
+      </dsp:nvSpPr>
+      <dsp:spPr>
+        <a:xfrm>
+          <a:off x="101901" y="2161744"/>
+          <a:ext cx="2544776" cy="1282460"/>
+        </a:xfrm>
+        <a:prstGeom prst="roundRect">
+          <a:avLst>
+            <a:gd name="adj" fmla="val 10000"/>
+          </a:avLst>
+        </a:prstGeom>
+        <a:gradFill rotWithShape="0">
+          <a:gsLst>
+            <a:gs pos="0">
+              <a:srgbClr val="1376E3"/>
+            </a:gs>
+            <a:gs pos="100000">
+              <a:srgbClr val="002164"/>
+            </a:gs>
+          </a:gsLst>
+          <a:lin ang="5400000" scaled="0"/>
+        </a:gradFill>
+        <a:ln>
+          <a:noFill/>
+        </a:ln>
+        <a:effectLst/>
+        <a:scene3d>
+          <a:camera prst="orthographicFront"/>
+          <a:lightRig rig="threePt" dir="t">
+            <a:rot lat="0" lon="0" rev="7500000"/>
+          </a:lightRig>
+        </a:scene3d>
+        <a:sp3d prstMaterial="plastic">
+          <a:bevelT w="190500" h="190500" prst="relaxedInset"/>
+        </a:sp3d>
+      </dsp:spPr>
+      <dsp:style>
+        <a:lnRef idx="0">
+          <a:scrgbClr r="0" g="0" b="0"/>
+        </a:lnRef>
+        <a:fillRef idx="3">
+          <a:scrgbClr r="0" g="0" b="0"/>
+        </a:fillRef>
+        <a:effectRef idx="2">
+          <a:scrgbClr r="0" g="0" b="0"/>
+        </a:effectRef>
+        <a:fontRef idx="minor">
+          <a:schemeClr val="lt1"/>
+        </a:fontRef>
+      </dsp:style>
+      <dsp:txBody>
+        <a:bodyPr spcFirstLastPara="0" vert="horz" wrap="square" lIns="68580" tIns="68580" rIns="68580" bIns="68580" numCol="1" spcCol="1270" anchor="ctr" anchorCtr="0">
+          <a:noAutofit/>
+        </a:bodyPr>
+        <a:lstStyle/>
+        <a:p>
+          <a:pPr lvl="0" algn="ctr" defTabSz="800100">
+            <a:lnSpc>
+              <a:spcPct val="90000"/>
+            </a:lnSpc>
+            <a:spcBef>
+              <a:spcPct val="0"/>
+            </a:spcBef>
+            <a:spcAft>
+              <a:spcPct val="35000"/>
+            </a:spcAft>
+          </a:pPr>
+          <a:r>
+            <a:rPr lang="en-IN" sz="1800" b="1" kern="1200" spc="300" dirty="0" smtClean="0">
+              <a:solidFill>
+                <a:srgbClr val="FFFF99"/>
+              </a:solidFill>
+              <a:effectLst>
+                <a:outerShdw blurRad="38100" dist="38100" dir="2700000" algn="tl">
+                  <a:srgbClr val="000000">
+                    <a:alpha val="43137"/>
+                  </a:srgbClr>
+                </a:outerShdw>
+              </a:effectLst>
+              <a:latin typeface="Open Sans" panose="020B0606030504020204" pitchFamily="34" charset="0"/>
+              <a:ea typeface="Open Sans" panose="020B0606030504020204" pitchFamily="34" charset="0"/>
+              <a:cs typeface="Open Sans" panose="020B0606030504020204" pitchFamily="34" charset="0"/>
+            </a:rPr>
+            <a:t>Importing Log File</a:t>
+          </a:r>
+          <a:endParaRPr lang="en-IN" sz="1800" b="1" kern="1200" spc="300" dirty="0">
+            <a:solidFill>
+              <a:srgbClr val="FFFF99"/>
+            </a:solidFill>
+            <a:effectLst>
+              <a:outerShdw blurRad="38100" dist="38100" dir="2700000" algn="tl">
+                <a:srgbClr val="000000">
+                  <a:alpha val="43137"/>
+                </a:srgbClr>
+              </a:outerShdw>
+            </a:effectLst>
+            <a:latin typeface="Open Sans" panose="020B0606030504020204" pitchFamily="34" charset="0"/>
+            <a:ea typeface="Open Sans" panose="020B0606030504020204" pitchFamily="34" charset="0"/>
+            <a:cs typeface="Open Sans" panose="020B0606030504020204" pitchFamily="34" charset="0"/>
+          </a:endParaRPr>
+        </a:p>
+      </dsp:txBody>
+      <dsp:txXfrm>
+        <a:off x="139463" y="2199306"/>
+        <a:ext cx="2469652" cy="1207336"/>
+      </dsp:txXfrm>
+    </dsp:sp>
+    <dsp:sp modelId="{056207CF-9F58-405F-A833-F7586576B34E}">
+      <dsp:nvSpPr>
+        <dsp:cNvPr id="0" name=""/>
+        <dsp:cNvSpPr/>
+      </dsp:nvSpPr>
+      <dsp:spPr>
+        <a:xfrm rot="21577450">
+          <a:off x="2975417" y="2637147"/>
+          <a:ext cx="696958" cy="306077"/>
+        </a:xfrm>
+        <a:prstGeom prst="rightArrow">
+          <a:avLst>
+            <a:gd name="adj1" fmla="val 60000"/>
+            <a:gd name="adj2" fmla="val 50000"/>
+          </a:avLst>
+        </a:prstGeom>
+        <a:solidFill>
+          <a:srgbClr val="002164"/>
+        </a:solidFill>
+        <a:ln>
+          <a:noFill/>
+        </a:ln>
+        <a:effectLst/>
+        <a:scene3d>
+          <a:camera prst="orthographicFront"/>
+          <a:lightRig rig="threePt" dir="t">
+            <a:rot lat="0" lon="0" rev="7500000"/>
+          </a:lightRig>
+        </a:scene3d>
+        <a:sp3d z="-70000" extrusionH="63500" prstMaterial="matte">
+          <a:bevelT w="25400" h="6350" prst="relaxedInset"/>
+          <a:contourClr>
+            <a:schemeClr val="bg1"/>
+          </a:contourClr>
+        </a:sp3d>
+      </dsp:spPr>
+      <dsp:style>
+        <a:lnRef idx="0">
+          <a:scrgbClr r="0" g="0" b="0"/>
+        </a:lnRef>
+        <a:fillRef idx="1">
+          <a:scrgbClr r="0" g="0" b="0"/>
+        </a:fillRef>
+        <a:effectRef idx="2">
+          <a:scrgbClr r="0" g="0" b="0"/>
+        </a:effectRef>
+        <a:fontRef idx="minor">
+          <a:schemeClr val="lt1"/>
+        </a:fontRef>
+      </dsp:style>
+      <dsp:txBody>
+        <a:bodyPr spcFirstLastPara="0" vert="horz" wrap="square" lIns="0" tIns="0" rIns="0" bIns="0" numCol="1" spcCol="1270" anchor="ctr" anchorCtr="0">
+          <a:noAutofit/>
+        </a:bodyPr>
+        <a:lstStyle/>
+        <a:p>
+          <a:pPr lvl="0" algn="ctr" defTabSz="622300">
+            <a:lnSpc>
+              <a:spcPct val="90000"/>
+            </a:lnSpc>
+            <a:spcBef>
+              <a:spcPct val="0"/>
+            </a:spcBef>
+            <a:spcAft>
+              <a:spcPct val="35000"/>
+            </a:spcAft>
+          </a:pPr>
+          <a:endParaRPr lang="en-IN" sz="1400" kern="1200"/>
+        </a:p>
+      </dsp:txBody>
+      <dsp:txXfrm>
+        <a:off x="2975418" y="2698663"/>
+        <a:ext cx="605135" cy="183647"/>
+      </dsp:txXfrm>
+    </dsp:sp>
+    <dsp:sp modelId="{032A1E75-F9FC-4527-A250-D473AA4B5E5E}">
+      <dsp:nvSpPr>
+        <dsp:cNvPr id="0" name=""/>
+        <dsp:cNvSpPr/>
+      </dsp:nvSpPr>
+      <dsp:spPr>
+        <a:xfrm>
+          <a:off x="3961666" y="2134200"/>
+          <a:ext cx="2237711" cy="1288925"/>
+        </a:xfrm>
+        <a:prstGeom prst="roundRect">
+          <a:avLst>
+            <a:gd name="adj" fmla="val 10000"/>
+          </a:avLst>
+        </a:prstGeom>
+        <a:gradFill rotWithShape="0">
+          <a:gsLst>
+            <a:gs pos="0">
+              <a:srgbClr val="1376E3"/>
+            </a:gs>
+            <a:gs pos="100000">
+              <a:srgbClr val="002164"/>
+            </a:gs>
+          </a:gsLst>
+          <a:lin ang="5400000" scaled="0"/>
+        </a:gradFill>
+        <a:ln>
+          <a:noFill/>
+        </a:ln>
+        <a:effectLst/>
+        <a:scene3d>
+          <a:camera prst="orthographicFront"/>
+          <a:lightRig rig="threePt" dir="t">
+            <a:rot lat="0" lon="0" rev="7500000"/>
+          </a:lightRig>
+        </a:scene3d>
+        <a:sp3d prstMaterial="plastic">
+          <a:bevelT w="190500" h="190500" prst="relaxedInset"/>
+        </a:sp3d>
+      </dsp:spPr>
+      <dsp:style>
+        <a:lnRef idx="0">
+          <a:scrgbClr r="0" g="0" b="0"/>
+        </a:lnRef>
+        <a:fillRef idx="3">
+          <a:scrgbClr r="0" g="0" b="0"/>
+        </a:fillRef>
+        <a:effectRef idx="2">
+          <a:scrgbClr r="0" g="0" b="0"/>
+        </a:effectRef>
+        <a:fontRef idx="minor">
+          <a:schemeClr val="lt1"/>
+        </a:fontRef>
+      </dsp:style>
+      <dsp:txBody>
+        <a:bodyPr spcFirstLastPara="0" vert="horz" wrap="square" lIns="68580" tIns="68580" rIns="68580" bIns="68580" numCol="1" spcCol="1270" anchor="ctr" anchorCtr="0">
+          <a:noAutofit/>
+        </a:bodyPr>
+        <a:lstStyle/>
+        <a:p>
+          <a:pPr lvl="0" algn="ctr" defTabSz="800100">
+            <a:lnSpc>
+              <a:spcPct val="90000"/>
+            </a:lnSpc>
+            <a:spcBef>
+              <a:spcPct val="0"/>
+            </a:spcBef>
+            <a:spcAft>
+              <a:spcPct val="35000"/>
+            </a:spcAft>
+          </a:pPr>
+          <a:r>
+            <a:rPr lang="en-IN" sz="1800" b="1" kern="1200" spc="300" dirty="0" smtClean="0">
+              <a:solidFill>
+                <a:srgbClr val="FFFF99"/>
+              </a:solidFill>
+              <a:effectLst>
+                <a:outerShdw blurRad="38100" dist="38100" dir="2700000" algn="tl">
+                  <a:srgbClr val="000000">
+                    <a:alpha val="43137"/>
+                  </a:srgbClr>
+                </a:outerShdw>
+              </a:effectLst>
+              <a:latin typeface="Open Sans" panose="020B0606030504020204" pitchFamily="34" charset="0"/>
+              <a:ea typeface="Open Sans" panose="020B0606030504020204" pitchFamily="34" charset="0"/>
+              <a:cs typeface="Open Sans" panose="020B0606030504020204" pitchFamily="34" charset="0"/>
+            </a:rPr>
+            <a:t>Extracting Information</a:t>
+          </a:r>
+          <a:endParaRPr lang="en-IN" sz="1800" b="1" kern="1200" spc="300" dirty="0">
+            <a:solidFill>
+              <a:srgbClr val="FFFF99"/>
+            </a:solidFill>
+            <a:effectLst>
+              <a:outerShdw blurRad="38100" dist="38100" dir="2700000" algn="tl">
+                <a:srgbClr val="000000">
+                  <a:alpha val="43137"/>
+                </a:srgbClr>
+              </a:outerShdw>
+            </a:effectLst>
+            <a:latin typeface="Open Sans" panose="020B0606030504020204" pitchFamily="34" charset="0"/>
+            <a:ea typeface="Open Sans" panose="020B0606030504020204" pitchFamily="34" charset="0"/>
+            <a:cs typeface="Open Sans" panose="020B0606030504020204" pitchFamily="34" charset="0"/>
+          </a:endParaRPr>
+        </a:p>
+      </dsp:txBody>
+      <dsp:txXfrm>
+        <a:off x="3999417" y="2171951"/>
+        <a:ext cx="2162209" cy="1213423"/>
+      </dsp:txXfrm>
+    </dsp:sp>
+    <dsp:sp modelId="{10C5E952-AE32-4CFE-BA5A-7258D03A50EB}">
+      <dsp:nvSpPr>
+        <dsp:cNvPr id="0" name=""/>
+        <dsp:cNvSpPr/>
+      </dsp:nvSpPr>
+      <dsp:spPr>
+        <a:xfrm rot="5771">
+          <a:off x="6547914" y="2628708"/>
+          <a:ext cx="738900" cy="306077"/>
+        </a:xfrm>
+        <a:prstGeom prst="rightArrow">
+          <a:avLst>
+            <a:gd name="adj1" fmla="val 60000"/>
+            <a:gd name="adj2" fmla="val 50000"/>
+          </a:avLst>
+        </a:prstGeom>
+        <a:solidFill>
+          <a:srgbClr val="002164"/>
+        </a:solidFill>
+        <a:ln>
+          <a:noFill/>
+        </a:ln>
+        <a:effectLst/>
+        <a:scene3d>
+          <a:camera prst="orthographicFront"/>
+          <a:lightRig rig="threePt" dir="t">
+            <a:rot lat="0" lon="0" rev="7500000"/>
+          </a:lightRig>
+        </a:scene3d>
+        <a:sp3d z="-70000" extrusionH="63500" prstMaterial="matte">
+          <a:bevelT w="25400" h="6350" prst="relaxedInset"/>
+          <a:contourClr>
+            <a:schemeClr val="bg1"/>
+          </a:contourClr>
+        </a:sp3d>
+      </dsp:spPr>
+      <dsp:style>
+        <a:lnRef idx="0">
+          <a:scrgbClr r="0" g="0" b="0"/>
+        </a:lnRef>
+        <a:fillRef idx="1">
+          <a:scrgbClr r="0" g="0" b="0"/>
+        </a:fillRef>
+        <a:effectRef idx="2">
+          <a:scrgbClr r="0" g="0" b="0"/>
+        </a:effectRef>
+        <a:fontRef idx="minor">
+          <a:schemeClr val="lt1"/>
+        </a:fontRef>
+      </dsp:style>
+      <dsp:txBody>
+        <a:bodyPr spcFirstLastPara="0" vert="horz" wrap="square" lIns="0" tIns="0" rIns="0" bIns="0" numCol="1" spcCol="1270" anchor="ctr" anchorCtr="0">
+          <a:noAutofit/>
+        </a:bodyPr>
+        <a:lstStyle/>
+        <a:p>
+          <a:pPr lvl="0" algn="ctr" defTabSz="622300">
+            <a:lnSpc>
+              <a:spcPct val="90000"/>
+            </a:lnSpc>
+            <a:spcBef>
+              <a:spcPct val="0"/>
+            </a:spcBef>
+            <a:spcAft>
+              <a:spcPct val="35000"/>
+            </a:spcAft>
+          </a:pPr>
+          <a:endParaRPr lang="en-IN" sz="1400" kern="1200"/>
+        </a:p>
+      </dsp:txBody>
+      <dsp:txXfrm>
+        <a:off x="6547914" y="2689846"/>
+        <a:ext cx="647077" cy="183647"/>
+      </dsp:txXfrm>
+    </dsp:sp>
+    <dsp:sp modelId="{1F184332-3C60-4B1B-A973-3283C9A71795}">
+      <dsp:nvSpPr>
+        <dsp:cNvPr id="0" name=""/>
+        <dsp:cNvSpPr/>
+      </dsp:nvSpPr>
+      <dsp:spPr>
+        <a:xfrm>
+          <a:off x="7593527" y="2222003"/>
+          <a:ext cx="2428837" cy="1125835"/>
+        </a:xfrm>
+        <a:prstGeom prst="roundRect">
+          <a:avLst>
+            <a:gd name="adj" fmla="val 10000"/>
+          </a:avLst>
+        </a:prstGeom>
+        <a:gradFill rotWithShape="0">
+          <a:gsLst>
+            <a:gs pos="0">
+              <a:srgbClr val="1376E3"/>
+            </a:gs>
+            <a:gs pos="100000">
+              <a:srgbClr val="002164"/>
+            </a:gs>
+          </a:gsLst>
+          <a:lin ang="5400000" scaled="0"/>
+        </a:gradFill>
+        <a:ln>
+          <a:noFill/>
+        </a:ln>
+        <a:effectLst/>
+        <a:scene3d>
+          <a:camera prst="orthographicFront"/>
+          <a:lightRig rig="threePt" dir="t">
+            <a:rot lat="0" lon="0" rev="7500000"/>
+          </a:lightRig>
+        </a:scene3d>
+        <a:sp3d prstMaterial="plastic">
+          <a:bevelT w="190500" h="190500" prst="relaxedInset"/>
+        </a:sp3d>
+      </dsp:spPr>
+      <dsp:style>
+        <a:lnRef idx="0">
+          <a:scrgbClr r="0" g="0" b="0"/>
+        </a:lnRef>
+        <a:fillRef idx="3">
+          <a:scrgbClr r="0" g="0" b="0"/>
+        </a:fillRef>
+        <a:effectRef idx="2">
+          <a:scrgbClr r="0" g="0" b="0"/>
+        </a:effectRef>
+        <a:fontRef idx="minor">
+          <a:schemeClr val="lt1"/>
+        </a:fontRef>
+      </dsp:style>
+      <dsp:txBody>
+        <a:bodyPr spcFirstLastPara="0" vert="horz" wrap="square" lIns="68580" tIns="68580" rIns="68580" bIns="68580" numCol="1" spcCol="1270" anchor="ctr" anchorCtr="0">
+          <a:noAutofit/>
+        </a:bodyPr>
+        <a:lstStyle/>
+        <a:p>
+          <a:pPr lvl="0" algn="ctr" defTabSz="800100">
+            <a:lnSpc>
+              <a:spcPct val="90000"/>
+            </a:lnSpc>
+            <a:spcBef>
+              <a:spcPct val="0"/>
+            </a:spcBef>
+            <a:spcAft>
+              <a:spcPct val="35000"/>
+            </a:spcAft>
+          </a:pPr>
+          <a:r>
+            <a:rPr lang="en-IN" sz="1800" b="1" kern="1200" spc="300" dirty="0" smtClean="0">
+              <a:solidFill>
+                <a:srgbClr val="FFFF99"/>
+              </a:solidFill>
+              <a:effectLst>
+                <a:outerShdw blurRad="38100" dist="38100" dir="2700000" algn="tl">
+                  <a:srgbClr val="000000">
+                    <a:alpha val="43137"/>
+                  </a:srgbClr>
+                </a:outerShdw>
+              </a:effectLst>
+              <a:latin typeface="Open Sans" panose="020B0606030504020204" pitchFamily="34" charset="0"/>
+              <a:ea typeface="Open Sans" panose="020B0606030504020204" pitchFamily="34" charset="0"/>
+              <a:cs typeface="Open Sans" panose="020B0606030504020204" pitchFamily="34" charset="0"/>
+            </a:rPr>
+            <a:t>Analysing</a:t>
+          </a:r>
+          <a:endParaRPr lang="en-IN" sz="1800" b="1" kern="1200" spc="300" dirty="0">
+            <a:solidFill>
+              <a:srgbClr val="FFFF99"/>
+            </a:solidFill>
+            <a:effectLst>
+              <a:outerShdw blurRad="38100" dist="38100" dir="2700000" algn="tl">
+                <a:srgbClr val="000000">
+                  <a:alpha val="43137"/>
+                </a:srgbClr>
+              </a:outerShdw>
+            </a:effectLst>
+            <a:latin typeface="Open Sans" panose="020B0606030504020204" pitchFamily="34" charset="0"/>
+            <a:ea typeface="Open Sans" panose="020B0606030504020204" pitchFamily="34" charset="0"/>
+            <a:cs typeface="Open Sans" panose="020B0606030504020204" pitchFamily="34" charset="0"/>
+          </a:endParaRPr>
+        </a:p>
+      </dsp:txBody>
+      <dsp:txXfrm>
+        <a:off x="7626502" y="2254978"/>
+        <a:ext cx="2362887" cy="1059885"/>
+      </dsp:txXfrm>
+    </dsp:sp>
+    <dsp:sp modelId="{DE7E2020-BC8C-4068-B211-B36C6BEAA0D2}">
+      <dsp:nvSpPr>
+        <dsp:cNvPr id="0" name=""/>
+        <dsp:cNvSpPr/>
+      </dsp:nvSpPr>
+      <dsp:spPr>
+        <a:xfrm rot="8064985">
+          <a:off x="7525165" y="3624866"/>
+          <a:ext cx="619641" cy="306077"/>
+        </a:xfrm>
+        <a:prstGeom prst="rightArrow">
+          <a:avLst>
+            <a:gd name="adj1" fmla="val 60000"/>
+            <a:gd name="adj2" fmla="val 50000"/>
+          </a:avLst>
+        </a:prstGeom>
+        <a:solidFill>
+          <a:srgbClr val="002164"/>
+        </a:solidFill>
+        <a:ln>
+          <a:noFill/>
+        </a:ln>
+        <a:effectLst/>
+        <a:scene3d>
+          <a:camera prst="orthographicFront"/>
+          <a:lightRig rig="threePt" dir="t">
+            <a:rot lat="0" lon="0" rev="7500000"/>
+          </a:lightRig>
+        </a:scene3d>
+        <a:sp3d z="-70000" extrusionH="63500" prstMaterial="matte">
+          <a:bevelT w="25400" h="6350" prst="relaxedInset"/>
+          <a:contourClr>
+            <a:schemeClr val="bg1"/>
+          </a:contourClr>
+        </a:sp3d>
+      </dsp:spPr>
+      <dsp:style>
+        <a:lnRef idx="0">
+          <a:scrgbClr r="0" g="0" b="0"/>
+        </a:lnRef>
+        <a:fillRef idx="1">
+          <a:scrgbClr r="0" g="0" b="0"/>
+        </a:fillRef>
+        <a:effectRef idx="2">
+          <a:scrgbClr r="0" g="0" b="0"/>
+        </a:effectRef>
+        <a:fontRef idx="minor">
+          <a:schemeClr val="lt1"/>
+        </a:fontRef>
+      </dsp:style>
+      <dsp:txBody>
+        <a:bodyPr spcFirstLastPara="0" vert="horz" wrap="square" lIns="0" tIns="0" rIns="0" bIns="0" numCol="1" spcCol="1270" anchor="ctr" anchorCtr="0">
+          <a:noAutofit/>
+        </a:bodyPr>
+        <a:lstStyle/>
+        <a:p>
+          <a:pPr lvl="0" algn="ctr" defTabSz="622300">
+            <a:lnSpc>
+              <a:spcPct val="90000"/>
+            </a:lnSpc>
+            <a:spcBef>
+              <a:spcPct val="0"/>
+            </a:spcBef>
+            <a:spcAft>
+              <a:spcPct val="35000"/>
+            </a:spcAft>
+          </a:pPr>
+          <a:endParaRPr lang="en-IN" sz="1400" kern="1200"/>
+        </a:p>
+      </dsp:txBody>
+      <dsp:txXfrm rot="10800000">
+        <a:off x="7603208" y="3653288"/>
+        <a:ext cx="527818" cy="183647"/>
+      </dsp:txXfrm>
+    </dsp:sp>
+    <dsp:sp modelId="{63A1EDBC-80C2-4C39-8AB1-49894774D360}">
+      <dsp:nvSpPr>
+        <dsp:cNvPr id="0" name=""/>
+        <dsp:cNvSpPr/>
+      </dsp:nvSpPr>
+      <dsp:spPr>
+        <a:xfrm>
+          <a:off x="5428691" y="4182919"/>
+          <a:ext cx="2717216" cy="1328468"/>
+        </a:xfrm>
+        <a:prstGeom prst="roundRect">
+          <a:avLst>
+            <a:gd name="adj" fmla="val 10000"/>
+          </a:avLst>
+        </a:prstGeom>
+        <a:gradFill rotWithShape="0">
+          <a:gsLst>
+            <a:gs pos="0">
+              <a:srgbClr val="1376E3"/>
+            </a:gs>
+            <a:gs pos="100000">
+              <a:srgbClr val="002164"/>
+            </a:gs>
+          </a:gsLst>
+          <a:lin ang="5400000" scaled="0"/>
+        </a:gradFill>
+        <a:ln>
+          <a:noFill/>
+        </a:ln>
+        <a:effectLst/>
+        <a:scene3d>
+          <a:camera prst="orthographicFront"/>
+          <a:lightRig rig="threePt" dir="t">
+            <a:rot lat="0" lon="0" rev="7500000"/>
+          </a:lightRig>
+        </a:scene3d>
+        <a:sp3d prstMaterial="plastic">
+          <a:bevelT w="190500" h="190500" prst="relaxedInset"/>
+        </a:sp3d>
+      </dsp:spPr>
+      <dsp:style>
+        <a:lnRef idx="0">
+          <a:scrgbClr r="0" g="0" b="0"/>
+        </a:lnRef>
+        <a:fillRef idx="3">
+          <a:scrgbClr r="0" g="0" b="0"/>
+        </a:fillRef>
+        <a:effectRef idx="2">
+          <a:scrgbClr r="0" g="0" b="0"/>
+        </a:effectRef>
+        <a:fontRef idx="minor">
+          <a:schemeClr val="lt1"/>
+        </a:fontRef>
+      </dsp:style>
+      <dsp:txBody>
+        <a:bodyPr spcFirstLastPara="0" vert="horz" wrap="square" lIns="68580" tIns="68580" rIns="68580" bIns="68580" numCol="1" spcCol="1270" anchor="ctr" anchorCtr="0">
+          <a:noAutofit/>
+        </a:bodyPr>
+        <a:lstStyle/>
+        <a:p>
+          <a:pPr lvl="0" algn="ctr" defTabSz="800100">
+            <a:lnSpc>
+              <a:spcPct val="90000"/>
+            </a:lnSpc>
+            <a:spcBef>
+              <a:spcPct val="0"/>
+            </a:spcBef>
+            <a:spcAft>
+              <a:spcPct val="35000"/>
+            </a:spcAft>
+          </a:pPr>
+          <a:r>
+            <a:rPr lang="en-IN" sz="1800" b="1" kern="1200" spc="300" dirty="0" smtClean="0">
+              <a:solidFill>
+                <a:srgbClr val="FFFF99"/>
+              </a:solidFill>
+              <a:effectLst>
+                <a:outerShdw blurRad="38100" dist="38100" dir="2700000" algn="tl">
+                  <a:srgbClr val="000000">
+                    <a:alpha val="43137"/>
+                  </a:srgbClr>
+                </a:outerShdw>
+              </a:effectLst>
+              <a:latin typeface="Open Sans" panose="020B0606030504020204" pitchFamily="34" charset="0"/>
+              <a:ea typeface="Open Sans" panose="020B0606030504020204" pitchFamily="34" charset="0"/>
+              <a:cs typeface="Open Sans" panose="020B0606030504020204" pitchFamily="34" charset="0"/>
+            </a:rPr>
+            <a:t>Visualisation</a:t>
+          </a:r>
+          <a:endParaRPr lang="en-IN" sz="1800" b="1" kern="1200" spc="300" dirty="0">
+            <a:solidFill>
+              <a:srgbClr val="FFFF99"/>
+            </a:solidFill>
+            <a:effectLst>
+              <a:outerShdw blurRad="38100" dist="38100" dir="2700000" algn="tl">
+                <a:srgbClr val="000000">
+                  <a:alpha val="43137"/>
+                </a:srgbClr>
+              </a:outerShdw>
+            </a:effectLst>
+            <a:latin typeface="Open Sans" panose="020B0606030504020204" pitchFamily="34" charset="0"/>
+            <a:ea typeface="Open Sans" panose="020B0606030504020204" pitchFamily="34" charset="0"/>
+            <a:cs typeface="Open Sans" panose="020B0606030504020204" pitchFamily="34" charset="0"/>
+          </a:endParaRPr>
+        </a:p>
+      </dsp:txBody>
+      <dsp:txXfrm>
+        <a:off x="5467600" y="4221828"/>
+        <a:ext cx="2639398" cy="1250650"/>
+      </dsp:txXfrm>
+    </dsp:sp>
+    <dsp:sp modelId="{FCE56590-496D-4FD5-85DE-89534EF95893}">
+      <dsp:nvSpPr>
+        <dsp:cNvPr id="0" name=""/>
+        <dsp:cNvSpPr/>
+      </dsp:nvSpPr>
+      <dsp:spPr>
+        <a:xfrm rot="10817234">
+          <a:off x="4133576" y="4683017"/>
+          <a:ext cx="880021" cy="306077"/>
+        </a:xfrm>
+        <a:prstGeom prst="rightArrow">
+          <a:avLst>
+            <a:gd name="adj1" fmla="val 60000"/>
+            <a:gd name="adj2" fmla="val 50000"/>
+          </a:avLst>
+        </a:prstGeom>
+        <a:solidFill>
+          <a:srgbClr val="002164"/>
+        </a:solidFill>
+        <a:ln>
+          <a:noFill/>
+        </a:ln>
+        <a:effectLst/>
+        <a:scene3d>
+          <a:camera prst="orthographicFront"/>
+          <a:lightRig rig="threePt" dir="t">
+            <a:rot lat="0" lon="0" rev="7500000"/>
+          </a:lightRig>
+        </a:scene3d>
+        <a:sp3d z="-70000" extrusionH="63500" prstMaterial="matte">
+          <a:bevelT w="25400" h="6350" prst="relaxedInset"/>
+          <a:contourClr>
+            <a:schemeClr val="bg1"/>
+          </a:contourClr>
+        </a:sp3d>
+      </dsp:spPr>
+      <dsp:style>
+        <a:lnRef idx="0">
+          <a:scrgbClr r="0" g="0" b="0"/>
+        </a:lnRef>
+        <a:fillRef idx="1">
+          <a:scrgbClr r="0" g="0" b="0"/>
+        </a:fillRef>
+        <a:effectRef idx="2">
+          <a:scrgbClr r="0" g="0" b="0"/>
+        </a:effectRef>
+        <a:fontRef idx="minor">
+          <a:schemeClr val="lt1"/>
+        </a:fontRef>
+      </dsp:style>
+      <dsp:txBody>
+        <a:bodyPr spcFirstLastPara="0" vert="horz" wrap="square" lIns="0" tIns="0" rIns="0" bIns="0" numCol="1" spcCol="1270" anchor="ctr" anchorCtr="0">
+          <a:noAutofit/>
+        </a:bodyPr>
+        <a:lstStyle/>
+        <a:p>
+          <a:pPr lvl="0" algn="ctr" defTabSz="622300">
+            <a:lnSpc>
+              <a:spcPct val="90000"/>
+            </a:lnSpc>
+            <a:spcBef>
+              <a:spcPct val="0"/>
+            </a:spcBef>
+            <a:spcAft>
+              <a:spcPct val="35000"/>
+            </a:spcAft>
+          </a:pPr>
+          <a:endParaRPr lang="en-IN" sz="1400" kern="1200"/>
+        </a:p>
+      </dsp:txBody>
+      <dsp:txXfrm rot="10800000">
+        <a:off x="4225398" y="4744462"/>
+        <a:ext cx="788198" cy="183647"/>
+      </dsp:txXfrm>
+    </dsp:sp>
+    <dsp:sp modelId="{A029C8C6-EF56-4045-8CFE-5D11E2107FF6}">
+      <dsp:nvSpPr>
+        <dsp:cNvPr id="0" name=""/>
+        <dsp:cNvSpPr/>
+      </dsp:nvSpPr>
+      <dsp:spPr>
+        <a:xfrm>
+          <a:off x="1767669" y="4222525"/>
+          <a:ext cx="2000624" cy="1208957"/>
+        </a:xfrm>
+        <a:prstGeom prst="roundRect">
+          <a:avLst>
+            <a:gd name="adj" fmla="val 10000"/>
+          </a:avLst>
+        </a:prstGeom>
+        <a:gradFill rotWithShape="0">
+          <a:gsLst>
+            <a:gs pos="0">
+              <a:srgbClr val="1376E3"/>
+            </a:gs>
+            <a:gs pos="100000">
+              <a:srgbClr val="002164"/>
+            </a:gs>
+          </a:gsLst>
+          <a:lin ang="5400000" scaled="0"/>
+        </a:gradFill>
+        <a:ln>
+          <a:noFill/>
+        </a:ln>
+        <a:effectLst/>
+        <a:scene3d>
+          <a:camera prst="orthographicFront"/>
+          <a:lightRig rig="threePt" dir="t">
+            <a:rot lat="0" lon="0" rev="7500000"/>
+          </a:lightRig>
+        </a:scene3d>
+        <a:sp3d prstMaterial="plastic">
+          <a:bevelT w="190500" h="190500" prst="relaxedInset"/>
+        </a:sp3d>
+      </dsp:spPr>
+      <dsp:style>
+        <a:lnRef idx="0">
+          <a:scrgbClr r="0" g="0" b="0"/>
+        </a:lnRef>
+        <a:fillRef idx="3">
+          <a:scrgbClr r="0" g="0" b="0"/>
+        </a:fillRef>
+        <a:effectRef idx="2">
+          <a:scrgbClr r="0" g="0" b="0"/>
+        </a:effectRef>
+        <a:fontRef idx="minor">
+          <a:schemeClr val="lt1"/>
+        </a:fontRef>
+      </dsp:style>
+      <dsp:txBody>
+        <a:bodyPr spcFirstLastPara="0" vert="horz" wrap="square" lIns="68580" tIns="68580" rIns="68580" bIns="68580" numCol="1" spcCol="1270" anchor="ctr" anchorCtr="0">
+          <a:noAutofit/>
+        </a:bodyPr>
+        <a:lstStyle/>
+        <a:p>
+          <a:pPr lvl="0" algn="ctr" defTabSz="800100">
+            <a:lnSpc>
+              <a:spcPct val="90000"/>
+            </a:lnSpc>
+            <a:spcBef>
+              <a:spcPct val="0"/>
+            </a:spcBef>
+            <a:spcAft>
+              <a:spcPct val="35000"/>
+            </a:spcAft>
+          </a:pPr>
+          <a:r>
+            <a:rPr lang="en-IN" sz="1800" b="1" kern="1200" spc="300" dirty="0" smtClean="0">
+              <a:solidFill>
+                <a:srgbClr val="FFFF99"/>
+              </a:solidFill>
+              <a:effectLst>
+                <a:outerShdw blurRad="38100" dist="38100" dir="2700000" algn="tl">
+                  <a:srgbClr val="000000">
+                    <a:alpha val="43137"/>
+                  </a:srgbClr>
+                </a:outerShdw>
+              </a:effectLst>
+              <a:latin typeface="Open Sans" panose="020B0606030504020204" pitchFamily="34" charset="0"/>
+              <a:ea typeface="Open Sans" panose="020B0606030504020204" pitchFamily="34" charset="0"/>
+              <a:cs typeface="Open Sans" panose="020B0606030504020204" pitchFamily="34" charset="0"/>
+            </a:rPr>
+            <a:t>Results</a:t>
+          </a:r>
+          <a:endParaRPr lang="en-IN" sz="1800" b="1" kern="1200" spc="300" dirty="0">
+            <a:solidFill>
+              <a:srgbClr val="FFFF99"/>
+            </a:solidFill>
+            <a:effectLst>
+              <a:outerShdw blurRad="38100" dist="38100" dir="2700000" algn="tl">
+                <a:srgbClr val="000000">
+                  <a:alpha val="43137"/>
+                </a:srgbClr>
+              </a:outerShdw>
+            </a:effectLst>
+            <a:latin typeface="Open Sans" panose="020B0606030504020204" pitchFamily="34" charset="0"/>
+            <a:ea typeface="Open Sans" panose="020B0606030504020204" pitchFamily="34" charset="0"/>
+            <a:cs typeface="Open Sans" panose="020B0606030504020204" pitchFamily="34" charset="0"/>
+          </a:endParaRPr>
+        </a:p>
+      </dsp:txBody>
+      <dsp:txXfrm>
+        <a:off x="1803078" y="4257934"/>
+        <a:ext cx="1929806" cy="1138139"/>
+      </dsp:txXfrm>
+    </dsp:sp>
   </dsp:spTree>
 </dsp:drawing>
 </file>
@@ -3584,7 +4439,7 @@
           <a:noFill/>
           <a:extLst>
             <a:ext uri="{909E8E84-426E-40dd-AFC4-6F175D3DCCD1}">
-              <a14:hiddenFill xmlns="" xmlns:a14="http://schemas.microsoft.com/office/drawing/2010/main">
+              <a14:hiddenFill xmlns:a14="http://schemas.microsoft.com/office/drawing/2010/main" xmlns="">
                 <a:solidFill>
                   <a:srgbClr val="FFFFFF"/>
                 </a:solidFill>
@@ -3643,7 +4498,7 @@
             </a:ln>
             <a:extLst>
               <a:ext uri="{91240B29-F687-4f45-9708-019B960494DF}">
-                <a14:hiddenLine xmlns="" xmlns:a14="http://schemas.microsoft.com/office/drawing/2010/main" w="9525">
+                <a14:hiddenLine xmlns:a14="http://schemas.microsoft.com/office/drawing/2010/main" xmlns="" w="9525">
                   <a:solidFill>
                     <a:srgbClr val="000000"/>
                   </a:solidFill>
@@ -3733,7 +4588,7 @@
             </a:ln>
             <a:extLst>
               <a:ext uri="{91240B29-F687-4f45-9708-019B960494DF}">
-                <a14:hiddenLine xmlns="" xmlns:a14="http://schemas.microsoft.com/office/drawing/2010/main" w="9525">
+                <a14:hiddenLine xmlns:a14="http://schemas.microsoft.com/office/drawing/2010/main" xmlns="" w="9525">
                   <a:solidFill>
                     <a:srgbClr val="000000"/>
                   </a:solidFill>
@@ -3823,7 +4678,7 @@
             </a:ln>
             <a:extLst>
               <a:ext uri="{91240B29-F687-4f45-9708-019B960494DF}">
-                <a14:hiddenLine xmlns="" xmlns:a14="http://schemas.microsoft.com/office/drawing/2010/main" w="9525">
+                <a14:hiddenLine xmlns:a14="http://schemas.microsoft.com/office/drawing/2010/main" xmlns="" w="9525">
                   <a:solidFill>
                     <a:srgbClr val="000000"/>
                   </a:solidFill>
@@ -3857,7 +4712,7 @@
             </a:ln>
             <a:extLst>
               <a:ext uri="{91240B29-F687-4f45-9708-019B960494DF}">
-                <a14:hiddenLine xmlns="" xmlns:a14="http://schemas.microsoft.com/office/drawing/2010/main" w="9525">
+                <a14:hiddenLine xmlns:a14="http://schemas.microsoft.com/office/drawing/2010/main" xmlns="" w="9525">
                   <a:solidFill>
                     <a:srgbClr val="000000"/>
                   </a:solidFill>
@@ -3947,7 +4802,7 @@
             </a:ln>
             <a:extLst>
               <a:ext uri="{91240B29-F687-4f45-9708-019B960494DF}">
-                <a14:hiddenLine xmlns="" xmlns:a14="http://schemas.microsoft.com/office/drawing/2010/main" w="9525">
+                <a14:hiddenLine xmlns:a14="http://schemas.microsoft.com/office/drawing/2010/main" xmlns="" w="9525">
                   <a:solidFill>
                     <a:srgbClr val="000000"/>
                   </a:solidFill>
@@ -4009,7 +4864,7 @@
             </a:ln>
             <a:extLst>
               <a:ext uri="{91240B29-F687-4f45-9708-019B960494DF}">
-                <a14:hiddenLine xmlns="" xmlns:a14="http://schemas.microsoft.com/office/drawing/2010/main" w="9525">
+                <a14:hiddenLine xmlns:a14="http://schemas.microsoft.com/office/drawing/2010/main" xmlns="" w="9525">
                   <a:solidFill>
                     <a:srgbClr val="000000"/>
                   </a:solidFill>
@@ -4071,7 +4926,7 @@
             </a:ln>
             <a:extLst>
               <a:ext uri="{91240B29-F687-4f45-9708-019B960494DF}">
-                <a14:hiddenLine xmlns="" xmlns:a14="http://schemas.microsoft.com/office/drawing/2010/main" w="9525">
+                <a14:hiddenLine xmlns:a14="http://schemas.microsoft.com/office/drawing/2010/main" xmlns="" w="9525">
                   <a:solidFill>
                     <a:srgbClr val="000000"/>
                   </a:solidFill>
@@ -4161,7 +5016,7 @@
             </a:ln>
             <a:extLst>
               <a:ext uri="{91240B29-F687-4f45-9708-019B960494DF}">
-                <a14:hiddenLine xmlns="" xmlns:a14="http://schemas.microsoft.com/office/drawing/2010/main" w="9525">
+                <a14:hiddenLine xmlns:a14="http://schemas.microsoft.com/office/drawing/2010/main" xmlns="" w="9525">
                   <a:solidFill>
                     <a:srgbClr val="000000"/>
                   </a:solidFill>
@@ -4223,7 +5078,7 @@
             </a:ln>
             <a:extLst>
               <a:ext uri="{91240B29-F687-4f45-9708-019B960494DF}">
-                <a14:hiddenLine xmlns="" xmlns:a14="http://schemas.microsoft.com/office/drawing/2010/main" w="9525">
+                <a14:hiddenLine xmlns:a14="http://schemas.microsoft.com/office/drawing/2010/main" xmlns="" w="9525">
                   <a:solidFill>
                     <a:srgbClr val="000000"/>
                   </a:solidFill>
@@ -4285,7 +5140,7 @@
             </a:ln>
             <a:extLst>
               <a:ext uri="{91240B29-F687-4f45-9708-019B960494DF}">
-                <a14:hiddenLine xmlns="" xmlns:a14="http://schemas.microsoft.com/office/drawing/2010/main" w="9525">
+                <a14:hiddenLine xmlns:a14="http://schemas.microsoft.com/office/drawing/2010/main" xmlns="" w="9525">
                   <a:solidFill>
                     <a:srgbClr val="000000"/>
                   </a:solidFill>
@@ -4375,7 +5230,7 @@
             </a:ln>
             <a:extLst>
               <a:ext uri="{91240B29-F687-4f45-9708-019B960494DF}">
-                <a14:hiddenLine xmlns="" xmlns:a14="http://schemas.microsoft.com/office/drawing/2010/main" w="9525">
+                <a14:hiddenLine xmlns:a14="http://schemas.microsoft.com/office/drawing/2010/main" xmlns="" w="9525">
                   <a:solidFill>
                     <a:srgbClr val="000000"/>
                   </a:solidFill>
@@ -4465,7 +5320,7 @@
             </a:ln>
             <a:extLst>
               <a:ext uri="{91240B29-F687-4f45-9708-019B960494DF}">
-                <a14:hiddenLine xmlns="" xmlns:a14="http://schemas.microsoft.com/office/drawing/2010/main" w="9525">
+                <a14:hiddenLine xmlns:a14="http://schemas.microsoft.com/office/drawing/2010/main" xmlns="" w="9525">
                   <a:solidFill>
                     <a:srgbClr val="000000"/>
                   </a:solidFill>
@@ -4527,7 +5382,7 @@
             </a:ln>
             <a:extLst>
               <a:ext uri="{91240B29-F687-4f45-9708-019B960494DF}">
-                <a14:hiddenLine xmlns="" xmlns:a14="http://schemas.microsoft.com/office/drawing/2010/main" w="9525">
+                <a14:hiddenLine xmlns:a14="http://schemas.microsoft.com/office/drawing/2010/main" xmlns="" w="9525">
                   <a:solidFill>
                     <a:srgbClr val="000000"/>
                   </a:solidFill>
@@ -4637,7 +5492,7 @@
             </a:ln>
             <a:extLst>
               <a:ext uri="{91240B29-F687-4f45-9708-019B960494DF}">
-                <a14:hiddenLine xmlns="" xmlns:a14="http://schemas.microsoft.com/office/drawing/2010/main" w="9525">
+                <a14:hiddenLine xmlns:a14="http://schemas.microsoft.com/office/drawing/2010/main" xmlns="" w="9525">
                   <a:solidFill>
                     <a:srgbClr val="000000"/>
                   </a:solidFill>
@@ -4699,7 +5554,7 @@
             </a:ln>
             <a:extLst>
               <a:ext uri="{91240B29-F687-4f45-9708-019B960494DF}">
-                <a14:hiddenLine xmlns="" xmlns:a14="http://schemas.microsoft.com/office/drawing/2010/main" w="9525">
+                <a14:hiddenLine xmlns:a14="http://schemas.microsoft.com/office/drawing/2010/main" xmlns="" w="9525">
                   <a:solidFill>
                     <a:srgbClr val="000000"/>
                   </a:solidFill>
@@ -4789,7 +5644,7 @@
             </a:ln>
             <a:extLst>
               <a:ext uri="{91240B29-F687-4f45-9708-019B960494DF}">
-                <a14:hiddenLine xmlns="" xmlns:a14="http://schemas.microsoft.com/office/drawing/2010/main" w="9525">
+                <a14:hiddenLine xmlns:a14="http://schemas.microsoft.com/office/drawing/2010/main" xmlns="" w="9525">
                   <a:solidFill>
                     <a:srgbClr val="000000"/>
                   </a:solidFill>
@@ -4879,7 +5734,7 @@
             </a:ln>
             <a:extLst>
               <a:ext uri="{91240B29-F687-4f45-9708-019B960494DF}">
-                <a14:hiddenLine xmlns="" xmlns:a14="http://schemas.microsoft.com/office/drawing/2010/main" w="9525">
+                <a14:hiddenLine xmlns:a14="http://schemas.microsoft.com/office/drawing/2010/main" xmlns="" w="9525">
                   <a:solidFill>
                     <a:srgbClr val="000000"/>
                   </a:solidFill>
@@ -4941,7 +5796,7 @@
             </a:ln>
             <a:extLst>
               <a:ext uri="{91240B29-F687-4f45-9708-019B960494DF}">
-                <a14:hiddenLine xmlns="" xmlns:a14="http://schemas.microsoft.com/office/drawing/2010/main" w="9525">
+                <a14:hiddenLine xmlns:a14="http://schemas.microsoft.com/office/drawing/2010/main" xmlns="" w="9525">
                   <a:solidFill>
                     <a:srgbClr val="000000"/>
                   </a:solidFill>
@@ -5031,7 +5886,7 @@
             </a:ln>
             <a:extLst>
               <a:ext uri="{91240B29-F687-4f45-9708-019B960494DF}">
-                <a14:hiddenLine xmlns="" xmlns:a14="http://schemas.microsoft.com/office/drawing/2010/main" w="9525">
+                <a14:hiddenLine xmlns:a14="http://schemas.microsoft.com/office/drawing/2010/main" xmlns="" w="9525">
                   <a:solidFill>
                     <a:srgbClr val="000000"/>
                   </a:solidFill>
@@ -5121,7 +5976,7 @@
             </a:ln>
             <a:extLst>
               <a:ext uri="{91240B29-F687-4f45-9708-019B960494DF}">
-                <a14:hiddenLine xmlns="" xmlns:a14="http://schemas.microsoft.com/office/drawing/2010/main" w="9525">
+                <a14:hiddenLine xmlns:a14="http://schemas.microsoft.com/office/drawing/2010/main" xmlns="" w="9525">
                   <a:solidFill>
                     <a:srgbClr val="000000"/>
                   </a:solidFill>
@@ -5177,7 +6032,7 @@
             </a:ln>
             <a:extLst>
               <a:ext uri="{91240B29-F687-4f45-9708-019B960494DF}">
-                <a14:hiddenLine xmlns="" xmlns:a14="http://schemas.microsoft.com/office/drawing/2010/main" w="9525">
+                <a14:hiddenLine xmlns:a14="http://schemas.microsoft.com/office/drawing/2010/main" xmlns="" w="9525">
                   <a:solidFill>
                     <a:srgbClr val="000000"/>
                   </a:solidFill>
@@ -5267,7 +6122,7 @@
             </a:ln>
             <a:extLst>
               <a:ext uri="{91240B29-F687-4f45-9708-019B960494DF}">
-                <a14:hiddenLine xmlns="" xmlns:a14="http://schemas.microsoft.com/office/drawing/2010/main" w="9525">
+                <a14:hiddenLine xmlns:a14="http://schemas.microsoft.com/office/drawing/2010/main" xmlns="" w="9525">
                   <a:solidFill>
                     <a:srgbClr val="000000"/>
                   </a:solidFill>
@@ -5323,7 +6178,7 @@
             </a:ln>
             <a:extLst>
               <a:ext uri="{91240B29-F687-4f45-9708-019B960494DF}">
-                <a14:hiddenLine xmlns="" xmlns:a14="http://schemas.microsoft.com/office/drawing/2010/main" w="9525">
+                <a14:hiddenLine xmlns:a14="http://schemas.microsoft.com/office/drawing/2010/main" xmlns="" w="9525">
                   <a:solidFill>
                     <a:srgbClr val="000000"/>
                   </a:solidFill>
@@ -5413,7 +6268,7 @@
             </a:ln>
             <a:extLst>
               <a:ext uri="{91240B29-F687-4f45-9708-019B960494DF}">
-                <a14:hiddenLine xmlns="" xmlns:a14="http://schemas.microsoft.com/office/drawing/2010/main" w="9525">
+                <a14:hiddenLine xmlns:a14="http://schemas.microsoft.com/office/drawing/2010/main" xmlns="" w="9525">
                   <a:solidFill>
                     <a:srgbClr val="000000"/>
                   </a:solidFill>
@@ -5481,7 +6336,7 @@
             </a:ln>
             <a:extLst>
               <a:ext uri="{91240B29-F687-4f45-9708-019B960494DF}">
-                <a14:hiddenLine xmlns="" xmlns:a14="http://schemas.microsoft.com/office/drawing/2010/main" w="9525">
+                <a14:hiddenLine xmlns:a14="http://schemas.microsoft.com/office/drawing/2010/main" xmlns="" w="9525">
                   <a:solidFill>
                     <a:srgbClr val="000000"/>
                   </a:solidFill>
@@ -5571,7 +6426,7 @@
             </a:ln>
             <a:extLst>
               <a:ext uri="{91240B29-F687-4f45-9708-019B960494DF}">
-                <a14:hiddenLine xmlns="" xmlns:a14="http://schemas.microsoft.com/office/drawing/2010/main" w="9525">
+                <a14:hiddenLine xmlns:a14="http://schemas.microsoft.com/office/drawing/2010/main" xmlns="" w="9525">
                   <a:solidFill>
                     <a:srgbClr val="000000"/>
                   </a:solidFill>
@@ -5639,7 +6494,7 @@
             </a:ln>
             <a:extLst>
               <a:ext uri="{91240B29-F687-4f45-9708-019B960494DF}">
-                <a14:hiddenLine xmlns="" xmlns:a14="http://schemas.microsoft.com/office/drawing/2010/main" w="9525">
+                <a14:hiddenLine xmlns:a14="http://schemas.microsoft.com/office/drawing/2010/main" xmlns="" w="9525">
                   <a:solidFill>
                     <a:srgbClr val="000000"/>
                   </a:solidFill>
@@ -5729,7 +6584,7 @@
             </a:ln>
             <a:extLst>
               <a:ext uri="{91240B29-F687-4f45-9708-019B960494DF}">
-                <a14:hiddenLine xmlns="" xmlns:a14="http://schemas.microsoft.com/office/drawing/2010/main" w="9525">
+                <a14:hiddenLine xmlns:a14="http://schemas.microsoft.com/office/drawing/2010/main" xmlns="" w="9525">
                   <a:solidFill>
                     <a:srgbClr val="000000"/>
                   </a:solidFill>
@@ -5763,7 +6618,7 @@
             </a:ln>
             <a:extLst>
               <a:ext uri="{91240B29-F687-4f45-9708-019B960494DF}">
-                <a14:hiddenLine xmlns="" xmlns:a14="http://schemas.microsoft.com/office/drawing/2010/main" w="9525">
+                <a14:hiddenLine xmlns:a14="http://schemas.microsoft.com/office/drawing/2010/main" xmlns="" w="9525">
                   <a:solidFill>
                     <a:srgbClr val="000000"/>
                   </a:solidFill>
@@ -5853,7 +6708,7 @@
             </a:ln>
             <a:extLst>
               <a:ext uri="{91240B29-F687-4f45-9708-019B960494DF}">
-                <a14:hiddenLine xmlns="" xmlns:a14="http://schemas.microsoft.com/office/drawing/2010/main" w="9525">
+                <a14:hiddenLine xmlns:a14="http://schemas.microsoft.com/office/drawing/2010/main" xmlns="" w="9525">
                   <a:solidFill>
                     <a:srgbClr val="000000"/>
                   </a:solidFill>
@@ -5915,7 +6770,7 @@
             </a:ln>
             <a:extLst>
               <a:ext uri="{91240B29-F687-4f45-9708-019B960494DF}">
-                <a14:hiddenLine xmlns="" xmlns:a14="http://schemas.microsoft.com/office/drawing/2010/main" w="9525">
+                <a14:hiddenLine xmlns:a14="http://schemas.microsoft.com/office/drawing/2010/main" xmlns="" w="9525">
                   <a:solidFill>
                     <a:srgbClr val="000000"/>
                   </a:solidFill>
@@ -5977,7 +6832,7 @@
             </a:ln>
             <a:extLst>
               <a:ext uri="{91240B29-F687-4f45-9708-019B960494DF}">
-                <a14:hiddenLine xmlns="" xmlns:a14="http://schemas.microsoft.com/office/drawing/2010/main" w="9525">
+                <a14:hiddenLine xmlns:a14="http://schemas.microsoft.com/office/drawing/2010/main" xmlns="" w="9525">
                   <a:solidFill>
                     <a:srgbClr val="000000"/>
                   </a:solidFill>
@@ -6067,7 +6922,7 @@
             </a:ln>
             <a:extLst>
               <a:ext uri="{91240B29-F687-4f45-9708-019B960494DF}">
-                <a14:hiddenLine xmlns="" xmlns:a14="http://schemas.microsoft.com/office/drawing/2010/main" w="9525">
+                <a14:hiddenLine xmlns:a14="http://schemas.microsoft.com/office/drawing/2010/main" xmlns="" w="9525">
                   <a:solidFill>
                     <a:srgbClr val="000000"/>
                   </a:solidFill>
@@ -6135,7 +6990,7 @@
             </a:ln>
             <a:extLst>
               <a:ext uri="{91240B29-F687-4f45-9708-019B960494DF}">
-                <a14:hiddenLine xmlns="" xmlns:a14="http://schemas.microsoft.com/office/drawing/2010/main" w="9525">
+                <a14:hiddenLine xmlns:a14="http://schemas.microsoft.com/office/drawing/2010/main" xmlns="" w="9525">
                   <a:solidFill>
                     <a:srgbClr val="000000"/>
                   </a:solidFill>
@@ -6197,7 +7052,7 @@
             </a:ln>
             <a:extLst>
               <a:ext uri="{91240B29-F687-4f45-9708-019B960494DF}">
-                <a14:hiddenLine xmlns="" xmlns:a14="http://schemas.microsoft.com/office/drawing/2010/main" w="9525">
+                <a14:hiddenLine xmlns:a14="http://schemas.microsoft.com/office/drawing/2010/main" xmlns="" w="9525">
                   <a:solidFill>
                     <a:srgbClr val="000000"/>
                   </a:solidFill>
@@ -6287,7 +7142,7 @@
             </a:ln>
             <a:extLst>
               <a:ext uri="{91240B29-F687-4f45-9708-019B960494DF}">
-                <a14:hiddenLine xmlns="" xmlns:a14="http://schemas.microsoft.com/office/drawing/2010/main" w="9525">
+                <a14:hiddenLine xmlns:a14="http://schemas.microsoft.com/office/drawing/2010/main" xmlns="" w="9525">
                   <a:solidFill>
                     <a:srgbClr val="000000"/>
                   </a:solidFill>
@@ -6349,7 +7204,7 @@
             </a:ln>
             <a:extLst>
               <a:ext uri="{91240B29-F687-4f45-9708-019B960494DF}">
-                <a14:hiddenLine xmlns="" xmlns:a14="http://schemas.microsoft.com/office/drawing/2010/main" w="9525">
+                <a14:hiddenLine xmlns:a14="http://schemas.microsoft.com/office/drawing/2010/main" xmlns="" w="9525">
                   <a:solidFill>
                     <a:srgbClr val="000000"/>
                   </a:solidFill>
@@ -6439,7 +7294,7 @@
             </a:ln>
             <a:extLst>
               <a:ext uri="{91240B29-F687-4f45-9708-019B960494DF}">
-                <a14:hiddenLine xmlns="" xmlns:a14="http://schemas.microsoft.com/office/drawing/2010/main" w="9525">
+                <a14:hiddenLine xmlns:a14="http://schemas.microsoft.com/office/drawing/2010/main" xmlns="" w="9525">
                   <a:solidFill>
                     <a:srgbClr val="000000"/>
                   </a:solidFill>
@@ -6501,7 +7356,7 @@
             </a:ln>
             <a:extLst>
               <a:ext uri="{91240B29-F687-4f45-9708-019B960494DF}">
-                <a14:hiddenLine xmlns="" xmlns:a14="http://schemas.microsoft.com/office/drawing/2010/main" w="9525">
+                <a14:hiddenLine xmlns:a14="http://schemas.microsoft.com/office/drawing/2010/main" xmlns="" w="9525">
                   <a:solidFill>
                     <a:srgbClr val="000000"/>
                   </a:solidFill>
@@ -6591,7 +7446,7 @@
             </a:ln>
             <a:extLst>
               <a:ext uri="{91240B29-F687-4f45-9708-019B960494DF}">
-                <a14:hiddenLine xmlns="" xmlns:a14="http://schemas.microsoft.com/office/drawing/2010/main" w="9525">
+                <a14:hiddenLine xmlns:a14="http://schemas.microsoft.com/office/drawing/2010/main" xmlns="" w="9525">
                   <a:solidFill>
                     <a:srgbClr val="000000"/>
                   </a:solidFill>
@@ -6625,7 +7480,7 @@
             </a:ln>
             <a:extLst>
               <a:ext uri="{91240B29-F687-4f45-9708-019B960494DF}">
-                <a14:hiddenLine xmlns="" xmlns:a14="http://schemas.microsoft.com/office/drawing/2010/main" w="9525">
+                <a14:hiddenLine xmlns:a14="http://schemas.microsoft.com/office/drawing/2010/main" xmlns="" w="9525">
                   <a:solidFill>
                     <a:srgbClr val="000000"/>
                   </a:solidFill>
@@ -6690,7 +7545,7 @@
             </a:ln>
             <a:extLst>
               <a:ext uri="{91240B29-F687-4f45-9708-019B960494DF}">
-                <a14:hiddenLine xmlns="" xmlns:a14="http://schemas.microsoft.com/office/drawing/2010/main" w="9525">
+                <a14:hiddenLine xmlns:a14="http://schemas.microsoft.com/office/drawing/2010/main" xmlns="" w="9525">
                   <a:solidFill>
                     <a:srgbClr val="000000"/>
                   </a:solidFill>
@@ -6780,7 +7635,7 @@
             </a:ln>
             <a:extLst>
               <a:ext uri="{91240B29-F687-4f45-9708-019B960494DF}">
-                <a14:hiddenLine xmlns="" xmlns:a14="http://schemas.microsoft.com/office/drawing/2010/main" w="9525">
+                <a14:hiddenLine xmlns:a14="http://schemas.microsoft.com/office/drawing/2010/main" xmlns="" w="9525">
                   <a:solidFill>
                     <a:srgbClr val="000000"/>
                   </a:solidFill>
@@ -6842,7 +7697,7 @@
             </a:ln>
             <a:extLst>
               <a:ext uri="{91240B29-F687-4f45-9708-019B960494DF}">
-                <a14:hiddenLine xmlns="" xmlns:a14="http://schemas.microsoft.com/office/drawing/2010/main" w="9525">
+                <a14:hiddenLine xmlns:a14="http://schemas.microsoft.com/office/drawing/2010/main" xmlns="" w="9525">
                   <a:solidFill>
                     <a:srgbClr val="000000"/>
                   </a:solidFill>
@@ -6932,7 +7787,7 @@
             </a:ln>
             <a:extLst>
               <a:ext uri="{91240B29-F687-4f45-9708-019B960494DF}">
-                <a14:hiddenLine xmlns="" xmlns:a14="http://schemas.microsoft.com/office/drawing/2010/main" w="9525">
+                <a14:hiddenLine xmlns:a14="http://schemas.microsoft.com/office/drawing/2010/main" xmlns="" w="9525">
                   <a:solidFill>
                     <a:srgbClr val="000000"/>
                   </a:solidFill>
@@ -7022,7 +7877,7 @@
             </a:ln>
             <a:extLst>
               <a:ext uri="{91240B29-F687-4f45-9708-019B960494DF}">
-                <a14:hiddenLine xmlns="" xmlns:a14="http://schemas.microsoft.com/office/drawing/2010/main" w="9525">
+                <a14:hiddenLine xmlns:a14="http://schemas.microsoft.com/office/drawing/2010/main" xmlns="" w="9525">
                   <a:solidFill>
                     <a:srgbClr val="000000"/>
                   </a:solidFill>
@@ -7087,7 +7942,7 @@
             </a:ln>
             <a:extLst>
               <a:ext uri="{91240B29-F687-4f45-9708-019B960494DF}">
-                <a14:hiddenLine xmlns="" xmlns:a14="http://schemas.microsoft.com/office/drawing/2010/main" w="9525">
+                <a14:hiddenLine xmlns:a14="http://schemas.microsoft.com/office/drawing/2010/main" xmlns="" w="9525">
                   <a:solidFill>
                     <a:srgbClr val="000000"/>
                   </a:solidFill>
@@ -7149,7 +8004,7 @@
             </a:ln>
             <a:extLst>
               <a:ext uri="{91240B29-F687-4f45-9708-019B960494DF}">
-                <a14:hiddenLine xmlns="" xmlns:a14="http://schemas.microsoft.com/office/drawing/2010/main" w="9525">
+                <a14:hiddenLine xmlns:a14="http://schemas.microsoft.com/office/drawing/2010/main" xmlns="" w="9525">
                   <a:solidFill>
                     <a:srgbClr val="000000"/>
                   </a:solidFill>
@@ -7239,7 +8094,7 @@
             </a:ln>
             <a:extLst>
               <a:ext uri="{91240B29-F687-4f45-9708-019B960494DF}">
-                <a14:hiddenLine xmlns="" xmlns:a14="http://schemas.microsoft.com/office/drawing/2010/main" w="9525">
+                <a14:hiddenLine xmlns:a14="http://schemas.microsoft.com/office/drawing/2010/main" xmlns="" w="9525">
                   <a:solidFill>
                     <a:srgbClr val="000000"/>
                   </a:solidFill>
@@ -7329,7 +8184,7 @@
             </a:ln>
             <a:extLst>
               <a:ext uri="{91240B29-F687-4f45-9708-019B960494DF}">
-                <a14:hiddenLine xmlns="" xmlns:a14="http://schemas.microsoft.com/office/drawing/2010/main" w="9525">
+                <a14:hiddenLine xmlns:a14="http://schemas.microsoft.com/office/drawing/2010/main" xmlns="" w="9525">
                   <a:solidFill>
                     <a:srgbClr val="000000"/>
                   </a:solidFill>
@@ -7391,7 +8246,7 @@
             </a:ln>
             <a:extLst>
               <a:ext uri="{91240B29-F687-4f45-9708-019B960494DF}">
-                <a14:hiddenLine xmlns="" xmlns:a14="http://schemas.microsoft.com/office/drawing/2010/main" w="9525">
+                <a14:hiddenLine xmlns:a14="http://schemas.microsoft.com/office/drawing/2010/main" xmlns="" w="9525">
                   <a:solidFill>
                     <a:srgbClr val="000000"/>
                   </a:solidFill>
@@ -7511,7 +8366,7 @@
             </a:ln>
             <a:extLst>
               <a:ext uri="{91240B29-F687-4f45-9708-019B960494DF}">
-                <a14:hiddenLine xmlns="" xmlns:a14="http://schemas.microsoft.com/office/drawing/2010/main" w="9525">
+                <a14:hiddenLine xmlns:a14="http://schemas.microsoft.com/office/drawing/2010/main" xmlns="" w="9525">
                   <a:solidFill>
                     <a:srgbClr val="000000"/>
                   </a:solidFill>
@@ -7579,7 +8434,7 @@
             </a:ln>
             <a:extLst>
               <a:ext uri="{91240B29-F687-4f45-9708-019B960494DF}">
-                <a14:hiddenLine xmlns="" xmlns:a14="http://schemas.microsoft.com/office/drawing/2010/main" w="9525">
+                <a14:hiddenLine xmlns:a14="http://schemas.microsoft.com/office/drawing/2010/main" xmlns="" w="9525">
                   <a:solidFill>
                     <a:srgbClr val="000000"/>
                   </a:solidFill>
@@ -7669,7 +8524,7 @@
             </a:ln>
             <a:extLst>
               <a:ext uri="{91240B29-F687-4f45-9708-019B960494DF}">
-                <a14:hiddenLine xmlns="" xmlns:a14="http://schemas.microsoft.com/office/drawing/2010/main" w="9525">
+                <a14:hiddenLine xmlns:a14="http://schemas.microsoft.com/office/drawing/2010/main" xmlns="" w="9525">
                   <a:solidFill>
                     <a:srgbClr val="000000"/>
                   </a:solidFill>
@@ -13101,7 +13956,7 @@
           <a:noFill/>
           <a:extLst>
             <a:ext uri="{909E8E84-426E-40dd-AFC4-6F175D3DCCD1}">
-              <a14:hiddenFill xmlns="" xmlns:a14="http://schemas.microsoft.com/office/drawing/2010/main">
+              <a14:hiddenFill xmlns:a14="http://schemas.microsoft.com/office/drawing/2010/main" xmlns="">
                 <a:solidFill>
                   <a:srgbClr val="FFFFFF"/>
                 </a:solidFill>
@@ -13175,7 +14030,7 @@
               </a:ln>
               <a:extLst>
                 <a:ext uri="{91240B29-F687-4f45-9708-019B960494DF}">
-                  <a14:hiddenLine xmlns="" xmlns:a14="http://schemas.microsoft.com/office/drawing/2010/main" w="9525">
+                  <a14:hiddenLine xmlns:a14="http://schemas.microsoft.com/office/drawing/2010/main" xmlns="" w="9525">
                     <a:solidFill>
                       <a:srgbClr val="000000"/>
                     </a:solidFill>
@@ -13265,7 +14120,7 @@
               </a:ln>
               <a:extLst>
                 <a:ext uri="{91240B29-F687-4f45-9708-019B960494DF}">
-                  <a14:hiddenLine xmlns="" xmlns:a14="http://schemas.microsoft.com/office/drawing/2010/main" w="9525">
+                  <a14:hiddenLine xmlns:a14="http://schemas.microsoft.com/office/drawing/2010/main" xmlns="" w="9525">
                     <a:solidFill>
                       <a:srgbClr val="000000"/>
                     </a:solidFill>
@@ -13355,7 +14210,7 @@
               </a:ln>
               <a:extLst>
                 <a:ext uri="{91240B29-F687-4f45-9708-019B960494DF}">
-                  <a14:hiddenLine xmlns="" xmlns:a14="http://schemas.microsoft.com/office/drawing/2010/main" w="9525">
+                  <a14:hiddenLine xmlns:a14="http://schemas.microsoft.com/office/drawing/2010/main" xmlns="" w="9525">
                     <a:solidFill>
                       <a:srgbClr val="000000"/>
                     </a:solidFill>
@@ -13417,7 +14272,7 @@
               </a:ln>
               <a:extLst>
                 <a:ext uri="{91240B29-F687-4f45-9708-019B960494DF}">
-                  <a14:hiddenLine xmlns="" xmlns:a14="http://schemas.microsoft.com/office/drawing/2010/main" w="9525">
+                  <a14:hiddenLine xmlns:a14="http://schemas.microsoft.com/office/drawing/2010/main" xmlns="" w="9525">
                     <a:solidFill>
                       <a:srgbClr val="000000"/>
                     </a:solidFill>
@@ -13507,7 +14362,7 @@
               </a:ln>
               <a:extLst>
                 <a:ext uri="{91240B29-F687-4f45-9708-019B960494DF}">
-                  <a14:hiddenLine xmlns="" xmlns:a14="http://schemas.microsoft.com/office/drawing/2010/main" w="9525">
+                  <a14:hiddenLine xmlns:a14="http://schemas.microsoft.com/office/drawing/2010/main" xmlns="" w="9525">
                     <a:solidFill>
                       <a:srgbClr val="000000"/>
                     </a:solidFill>
@@ -13569,7 +14424,7 @@
               </a:ln>
               <a:extLst>
                 <a:ext uri="{91240B29-F687-4f45-9708-019B960494DF}">
-                  <a14:hiddenLine xmlns="" xmlns:a14="http://schemas.microsoft.com/office/drawing/2010/main" w="9525">
+                  <a14:hiddenLine xmlns:a14="http://schemas.microsoft.com/office/drawing/2010/main" xmlns="" w="9525">
                     <a:solidFill>
                       <a:srgbClr val="000000"/>
                     </a:solidFill>
@@ -13631,7 +14486,7 @@
               </a:ln>
               <a:extLst>
                 <a:ext uri="{91240B29-F687-4f45-9708-019B960494DF}">
-                  <a14:hiddenLine xmlns="" xmlns:a14="http://schemas.microsoft.com/office/drawing/2010/main" w="9525">
+                  <a14:hiddenLine xmlns:a14="http://schemas.microsoft.com/office/drawing/2010/main" xmlns="" w="9525">
                     <a:solidFill>
                       <a:srgbClr val="000000"/>
                     </a:solidFill>
@@ -13721,7 +14576,7 @@
               </a:ln>
               <a:extLst>
                 <a:ext uri="{91240B29-F687-4f45-9708-019B960494DF}">
-                  <a14:hiddenLine xmlns="" xmlns:a14="http://schemas.microsoft.com/office/drawing/2010/main" w="9525">
+                  <a14:hiddenLine xmlns:a14="http://schemas.microsoft.com/office/drawing/2010/main" xmlns="" w="9525">
                     <a:solidFill>
                       <a:srgbClr val="000000"/>
                     </a:solidFill>
@@ -13811,7 +14666,7 @@
               </a:ln>
               <a:extLst>
                 <a:ext uri="{91240B29-F687-4f45-9708-019B960494DF}">
-                  <a14:hiddenLine xmlns="" xmlns:a14="http://schemas.microsoft.com/office/drawing/2010/main" w="9525">
+                  <a14:hiddenLine xmlns:a14="http://schemas.microsoft.com/office/drawing/2010/main" xmlns="" w="9525">
                     <a:solidFill>
                       <a:srgbClr val="000000"/>
                     </a:solidFill>
@@ -13873,7 +14728,7 @@
               </a:ln>
               <a:extLst>
                 <a:ext uri="{91240B29-F687-4f45-9708-019B960494DF}">
-                  <a14:hiddenLine xmlns="" xmlns:a14="http://schemas.microsoft.com/office/drawing/2010/main" w="9525">
+                  <a14:hiddenLine xmlns:a14="http://schemas.microsoft.com/office/drawing/2010/main" xmlns="" w="9525">
                     <a:solidFill>
                       <a:srgbClr val="000000"/>
                     </a:solidFill>
@@ -13983,7 +14838,7 @@
               </a:ln>
               <a:extLst>
                 <a:ext uri="{91240B29-F687-4f45-9708-019B960494DF}">
-                  <a14:hiddenLine xmlns="" xmlns:a14="http://schemas.microsoft.com/office/drawing/2010/main" w="9525">
+                  <a14:hiddenLine xmlns:a14="http://schemas.microsoft.com/office/drawing/2010/main" xmlns="" w="9525">
                     <a:solidFill>
                       <a:srgbClr val="000000"/>
                     </a:solidFill>
@@ -14067,7 +14922,7 @@
               </a:ln>
               <a:extLst>
                 <a:ext uri="{91240B29-F687-4f45-9708-019B960494DF}">
-                  <a14:hiddenLine xmlns="" xmlns:a14="http://schemas.microsoft.com/office/drawing/2010/main" w="9525">
+                  <a14:hiddenLine xmlns:a14="http://schemas.microsoft.com/office/drawing/2010/main" xmlns="" w="9525">
                     <a:solidFill>
                       <a:srgbClr val="000000"/>
                     </a:solidFill>
@@ -14129,7 +14984,7 @@
               </a:ln>
               <a:extLst>
                 <a:ext uri="{91240B29-F687-4f45-9708-019B960494DF}">
-                  <a14:hiddenLine xmlns="" xmlns:a14="http://schemas.microsoft.com/office/drawing/2010/main" w="9525">
+                  <a14:hiddenLine xmlns:a14="http://schemas.microsoft.com/office/drawing/2010/main" xmlns="" w="9525">
                     <a:solidFill>
                       <a:srgbClr val="000000"/>
                     </a:solidFill>
@@ -14191,7 +15046,7 @@
               </a:ln>
               <a:extLst>
                 <a:ext uri="{91240B29-F687-4f45-9708-019B960494DF}">
-                  <a14:hiddenLine xmlns="" xmlns:a14="http://schemas.microsoft.com/office/drawing/2010/main" w="9525">
+                  <a14:hiddenLine xmlns:a14="http://schemas.microsoft.com/office/drawing/2010/main" xmlns="" w="9525">
                     <a:solidFill>
                       <a:srgbClr val="000000"/>
                     </a:solidFill>
@@ -14281,7 +15136,7 @@
               </a:ln>
               <a:extLst>
                 <a:ext uri="{91240B29-F687-4f45-9708-019B960494DF}">
-                  <a14:hiddenLine xmlns="" xmlns:a14="http://schemas.microsoft.com/office/drawing/2010/main" w="9525">
+                  <a14:hiddenLine xmlns:a14="http://schemas.microsoft.com/office/drawing/2010/main" xmlns="" w="9525">
                     <a:solidFill>
                       <a:srgbClr val="000000"/>
                     </a:solidFill>
@@ -14315,7 +15170,7 @@
               </a:ln>
               <a:extLst>
                 <a:ext uri="{91240B29-F687-4f45-9708-019B960494DF}">
-                  <a14:hiddenLine xmlns="" xmlns:a14="http://schemas.microsoft.com/office/drawing/2010/main" w="9525">
+                  <a14:hiddenLine xmlns:a14="http://schemas.microsoft.com/office/drawing/2010/main" xmlns="" w="9525">
                     <a:solidFill>
                       <a:srgbClr val="000000"/>
                     </a:solidFill>
@@ -14380,7 +15235,7 @@
               </a:ln>
               <a:extLst>
                 <a:ext uri="{91240B29-F687-4f45-9708-019B960494DF}">
-                  <a14:hiddenLine xmlns="" xmlns:a14="http://schemas.microsoft.com/office/drawing/2010/main" w="9525">
+                  <a14:hiddenLine xmlns:a14="http://schemas.microsoft.com/office/drawing/2010/main" xmlns="" w="9525">
                     <a:solidFill>
                       <a:srgbClr val="000000"/>
                     </a:solidFill>
@@ -14470,7 +15325,7 @@
               </a:ln>
               <a:extLst>
                 <a:ext uri="{91240B29-F687-4f45-9708-019B960494DF}">
-                  <a14:hiddenLine xmlns="" xmlns:a14="http://schemas.microsoft.com/office/drawing/2010/main" w="9525">
+                  <a14:hiddenLine xmlns:a14="http://schemas.microsoft.com/office/drawing/2010/main" xmlns="" w="9525">
                     <a:solidFill>
                       <a:srgbClr val="000000"/>
                     </a:solidFill>
@@ -14532,7 +15387,7 @@
               </a:ln>
               <a:extLst>
                 <a:ext uri="{91240B29-F687-4f45-9708-019B960494DF}">
-                  <a14:hiddenLine xmlns="" xmlns:a14="http://schemas.microsoft.com/office/drawing/2010/main" w="9525">
+                  <a14:hiddenLine xmlns:a14="http://schemas.microsoft.com/office/drawing/2010/main" xmlns="" w="9525">
                     <a:solidFill>
                       <a:srgbClr val="000000"/>
                     </a:solidFill>
@@ -14622,7 +15477,7 @@
               </a:ln>
               <a:extLst>
                 <a:ext uri="{91240B29-F687-4f45-9708-019B960494DF}">
-                  <a14:hiddenLine xmlns="" xmlns:a14="http://schemas.microsoft.com/office/drawing/2010/main" w="9525">
+                  <a14:hiddenLine xmlns:a14="http://schemas.microsoft.com/office/drawing/2010/main" xmlns="" w="9525">
                     <a:solidFill>
                       <a:srgbClr val="000000"/>
                     </a:solidFill>
@@ -14687,7 +15542,7 @@
               </a:ln>
               <a:extLst>
                 <a:ext uri="{91240B29-F687-4f45-9708-019B960494DF}">
-                  <a14:hiddenLine xmlns="" xmlns:a14="http://schemas.microsoft.com/office/drawing/2010/main" w="9525">
+                  <a14:hiddenLine xmlns:a14="http://schemas.microsoft.com/office/drawing/2010/main" xmlns="" w="9525">
                     <a:solidFill>
                       <a:srgbClr val="000000"/>
                     </a:solidFill>
@@ -14749,7 +15604,7 @@
               </a:ln>
               <a:extLst>
                 <a:ext uri="{91240B29-F687-4f45-9708-019B960494DF}">
-                  <a14:hiddenLine xmlns="" xmlns:a14="http://schemas.microsoft.com/office/drawing/2010/main" w="9525">
+                  <a14:hiddenLine xmlns:a14="http://schemas.microsoft.com/office/drawing/2010/main" xmlns="" w="9525">
                     <a:solidFill>
                       <a:srgbClr val="000000"/>
                     </a:solidFill>
@@ -14839,7 +15694,7 @@
               </a:ln>
               <a:extLst>
                 <a:ext uri="{91240B29-F687-4f45-9708-019B960494DF}">
-                  <a14:hiddenLine xmlns="" xmlns:a14="http://schemas.microsoft.com/office/drawing/2010/main" w="9525">
+                  <a14:hiddenLine xmlns:a14="http://schemas.microsoft.com/office/drawing/2010/main" xmlns="" w="9525">
                     <a:solidFill>
                       <a:srgbClr val="000000"/>
                     </a:solidFill>
@@ -14929,7 +15784,7 @@
               </a:ln>
               <a:extLst>
                 <a:ext uri="{91240B29-F687-4f45-9708-019B960494DF}">
-                  <a14:hiddenLine xmlns="" xmlns:a14="http://schemas.microsoft.com/office/drawing/2010/main" w="9525">
+                  <a14:hiddenLine xmlns:a14="http://schemas.microsoft.com/office/drawing/2010/main" xmlns="" w="9525">
                     <a:solidFill>
                       <a:srgbClr val="000000"/>
                     </a:solidFill>
@@ -14994,7 +15849,7 @@
               </a:ln>
               <a:extLst>
                 <a:ext uri="{91240B29-F687-4f45-9708-019B960494DF}">
-                  <a14:hiddenLine xmlns="" xmlns:a14="http://schemas.microsoft.com/office/drawing/2010/main" w="9525">
+                  <a14:hiddenLine xmlns:a14="http://schemas.microsoft.com/office/drawing/2010/main" xmlns="" w="9525">
                     <a:solidFill>
                       <a:srgbClr val="000000"/>
                     </a:solidFill>
@@ -15114,7 +15969,7 @@
               </a:ln>
               <a:extLst>
                 <a:ext uri="{91240B29-F687-4f45-9708-019B960494DF}">
-                  <a14:hiddenLine xmlns="" xmlns:a14="http://schemas.microsoft.com/office/drawing/2010/main" w="9525">
+                  <a14:hiddenLine xmlns:a14="http://schemas.microsoft.com/office/drawing/2010/main" xmlns="" w="9525">
                     <a:solidFill>
                       <a:srgbClr val="000000"/>
                     </a:solidFill>
@@ -15195,7 +16050,7 @@
               </a:ln>
               <a:extLst>
                 <a:ext uri="{91240B29-F687-4f45-9708-019B960494DF}">
-                  <a14:hiddenLine xmlns="" xmlns:a14="http://schemas.microsoft.com/office/drawing/2010/main" w="9525">
+                  <a14:hiddenLine xmlns:a14="http://schemas.microsoft.com/office/drawing/2010/main" xmlns="" w="9525">
                     <a:solidFill>
                       <a:srgbClr val="000000"/>
                     </a:solidFill>
@@ -15310,7 +16165,7 @@
               </a:ln>
               <a:extLst>
                 <a:ext uri="{91240B29-F687-4f45-9708-019B960494DF}">
-                  <a14:hiddenLine xmlns="" xmlns:a14="http://schemas.microsoft.com/office/drawing/2010/main" w="9525">
+                  <a14:hiddenLine xmlns:a14="http://schemas.microsoft.com/office/drawing/2010/main" xmlns="" w="9525">
                     <a:solidFill>
                       <a:srgbClr val="000000"/>
                     </a:solidFill>
@@ -15400,7 +16255,7 @@
               </a:ln>
               <a:extLst>
                 <a:ext uri="{91240B29-F687-4f45-9708-019B960494DF}">
-                  <a14:hiddenLine xmlns="" xmlns:a14="http://schemas.microsoft.com/office/drawing/2010/main" w="9525">
+                  <a14:hiddenLine xmlns:a14="http://schemas.microsoft.com/office/drawing/2010/main" xmlns="" w="9525">
                     <a:solidFill>
                       <a:srgbClr val="000000"/>
                     </a:solidFill>
@@ -15465,7 +16320,7 @@
               </a:ln>
               <a:extLst>
                 <a:ext uri="{91240B29-F687-4f45-9708-019B960494DF}">
-                  <a14:hiddenLine xmlns="" xmlns:a14="http://schemas.microsoft.com/office/drawing/2010/main" w="9525">
+                  <a14:hiddenLine xmlns:a14="http://schemas.microsoft.com/office/drawing/2010/main" xmlns="" w="9525">
                     <a:solidFill>
                       <a:srgbClr val="000000"/>
                     </a:solidFill>
@@ -15555,7 +16410,7 @@
               </a:ln>
               <a:extLst>
                 <a:ext uri="{91240B29-F687-4f45-9708-019B960494DF}">
-                  <a14:hiddenLine xmlns="" xmlns:a14="http://schemas.microsoft.com/office/drawing/2010/main" w="9525">
+                  <a14:hiddenLine xmlns:a14="http://schemas.microsoft.com/office/drawing/2010/main" xmlns="" w="9525">
                     <a:solidFill>
                       <a:srgbClr val="000000"/>
                     </a:solidFill>
@@ -15623,7 +16478,7 @@
               </a:ln>
               <a:extLst>
                 <a:ext uri="{91240B29-F687-4f45-9708-019B960494DF}">
-                  <a14:hiddenLine xmlns="" xmlns:a14="http://schemas.microsoft.com/office/drawing/2010/main" w="9525">
+                  <a14:hiddenLine xmlns:a14="http://schemas.microsoft.com/office/drawing/2010/main" xmlns="" w="9525">
                     <a:solidFill>
                       <a:srgbClr val="000000"/>
                     </a:solidFill>
@@ -15713,7 +16568,7 @@
               </a:ln>
               <a:extLst>
                 <a:ext uri="{91240B29-F687-4f45-9708-019B960494DF}">
-                  <a14:hiddenLine xmlns="" xmlns:a14="http://schemas.microsoft.com/office/drawing/2010/main" w="9525">
+                  <a14:hiddenLine xmlns:a14="http://schemas.microsoft.com/office/drawing/2010/main" xmlns="" w="9525">
                     <a:solidFill>
                       <a:srgbClr val="000000"/>
                     </a:solidFill>
@@ -15781,7 +16636,7 @@
               </a:ln>
               <a:extLst>
                 <a:ext uri="{91240B29-F687-4f45-9708-019B960494DF}">
-                  <a14:hiddenLine xmlns="" xmlns:a14="http://schemas.microsoft.com/office/drawing/2010/main" w="9525">
+                  <a14:hiddenLine xmlns:a14="http://schemas.microsoft.com/office/drawing/2010/main" xmlns="" w="9525">
                     <a:solidFill>
                       <a:srgbClr val="000000"/>
                     </a:solidFill>
@@ -15871,7 +16726,7 @@
               </a:ln>
               <a:extLst>
                 <a:ext uri="{91240B29-F687-4f45-9708-019B960494DF}">
-                  <a14:hiddenLine xmlns="" xmlns:a14="http://schemas.microsoft.com/office/drawing/2010/main" w="9525">
+                  <a14:hiddenLine xmlns:a14="http://schemas.microsoft.com/office/drawing/2010/main" xmlns="" w="9525">
                     <a:solidFill>
                       <a:srgbClr val="000000"/>
                     </a:solidFill>
@@ -15905,7 +16760,7 @@
               </a:ln>
               <a:extLst>
                 <a:ext uri="{91240B29-F687-4f45-9708-019B960494DF}">
-                  <a14:hiddenLine xmlns="" xmlns:a14="http://schemas.microsoft.com/office/drawing/2010/main" w="9525">
+                  <a14:hiddenLine xmlns:a14="http://schemas.microsoft.com/office/drawing/2010/main" xmlns="" w="9525">
                     <a:solidFill>
                       <a:srgbClr val="000000"/>
                     </a:solidFill>
@@ -17725,7 +18580,7 @@
     <mc:Choice Requires="p14">
       <p:transition spd="slow" p14:dur="2000"/>
     </mc:Choice>
-    <mc:Fallback xmlns="" xmlns:p15="http://schemas.microsoft.com/office/powerpoint/2012/main">
+    <mc:Fallback xmlns:p15="http://schemas.microsoft.com/office/powerpoint/2012/main" xmlns="">
       <p:transition spd="slow"/>
     </mc:Fallback>
   </mc:AlternateContent>
@@ -21339,1037 +22194,1030 @@
           </a:p>
         </p:txBody>
       </p:sp>
-      <p:sp>
-        <p:nvSpPr>
-          <p:cNvPr id="7" name="Oval 6"/>
-          <p:cNvSpPr/>
+      <p:grpSp>
+        <p:nvGrpSpPr>
+          <p:cNvPr id="36" name="Group 35"/>
+          <p:cNvGrpSpPr/>
           <p:nvPr/>
-        </p:nvSpPr>
-        <p:spPr>
+        </p:nvGrpSpPr>
+        <p:grpSpPr>
           <a:xfrm>
-            <a:off x="1055538" y="2114548"/>
-            <a:ext cx="428422" cy="425450"/>
+            <a:off x="1055538" y="1998434"/>
+            <a:ext cx="10091118" cy="2562747"/>
+            <a:chOff x="1055538" y="1998434"/>
+            <a:chExt cx="10091118" cy="2562747"/>
           </a:xfrm>
-          <a:prstGeom prst="ellipse">
-            <a:avLst/>
-          </a:prstGeom>
-          <a:solidFill>
-            <a:schemeClr val="bg1"/>
-          </a:solidFill>
-          <a:ln>
-            <a:noFill/>
-          </a:ln>
-        </p:spPr>
-        <p:style>
-          <a:lnRef idx="2">
-            <a:schemeClr val="accent1">
-              <a:shade val="50000"/>
-            </a:schemeClr>
-          </a:lnRef>
-          <a:fillRef idx="1">
-            <a:schemeClr val="accent1"/>
-          </a:fillRef>
-          <a:effectRef idx="0">
-            <a:schemeClr val="accent1"/>
-          </a:effectRef>
-          <a:fontRef idx="minor">
-            <a:schemeClr val="lt1"/>
-          </a:fontRef>
-        </p:style>
-        <p:txBody>
-          <a:bodyPr rtlCol="0" anchor="ctr"/>
-          <a:lstStyle/>
-          <a:p>
-            <a:pPr algn="ctr"/>
-            <a:endParaRPr lang="en-IN"/>
-          </a:p>
-        </p:txBody>
-      </p:sp>
-      <p:cxnSp>
-        <p:nvCxnSpPr>
-          <p:cNvPr id="16" name="Straight Arrow Connector 15"/>
-          <p:cNvCxnSpPr>
-            <a:stCxn id="7" idx="6"/>
-            <a:endCxn id="18" idx="1"/>
-          </p:cNvCxnSpPr>
-          <p:nvPr/>
-        </p:nvCxnSpPr>
-        <p:spPr>
-          <a:xfrm>
-            <a:off x="1483960" y="2327273"/>
-            <a:ext cx="1266308" cy="1"/>
-          </a:xfrm>
-          <a:prstGeom prst="straightConnector1">
-            <a:avLst/>
-          </a:prstGeom>
-          <a:ln>
-            <a:solidFill>
-              <a:schemeClr val="bg1"/>
-            </a:solidFill>
-            <a:tailEnd type="triangle" w="lg" len="lg"/>
-          </a:ln>
-        </p:spPr>
-        <p:style>
-          <a:lnRef idx="1">
-            <a:schemeClr val="accent1"/>
-          </a:lnRef>
-          <a:fillRef idx="0">
-            <a:schemeClr val="accent1"/>
-          </a:fillRef>
-          <a:effectRef idx="0">
-            <a:schemeClr val="accent1"/>
-          </a:effectRef>
-          <a:fontRef idx="minor">
-            <a:schemeClr val="tx1"/>
-          </a:fontRef>
-        </p:style>
-      </p:cxnSp>
-      <p:sp>
-        <p:nvSpPr>
-          <p:cNvPr id="18" name="Rounded Rectangle 17"/>
-          <p:cNvSpPr/>
-          <p:nvPr/>
-        </p:nvSpPr>
-        <p:spPr>
-          <a:xfrm>
-            <a:off x="2750268" y="1998434"/>
-            <a:ext cx="1915886" cy="657679"/>
-          </a:xfrm>
-          <a:prstGeom prst="roundRect">
-            <a:avLst>
-              <a:gd name="adj" fmla="val 29908"/>
-            </a:avLst>
-          </a:prstGeom>
-          <a:solidFill>
-            <a:schemeClr val="tx1"/>
-          </a:solidFill>
-          <a:ln>
-            <a:solidFill>
-              <a:schemeClr val="bg1"/>
-            </a:solidFill>
-          </a:ln>
-        </p:spPr>
-        <p:style>
-          <a:lnRef idx="2">
-            <a:schemeClr val="accent1">
-              <a:shade val="50000"/>
-            </a:schemeClr>
-          </a:lnRef>
-          <a:fillRef idx="1">
-            <a:schemeClr val="accent1"/>
-          </a:fillRef>
-          <a:effectRef idx="0">
-            <a:schemeClr val="accent1"/>
-          </a:effectRef>
-          <a:fontRef idx="minor">
-            <a:schemeClr val="lt1"/>
-          </a:fontRef>
-        </p:style>
-        <p:txBody>
-          <a:bodyPr rtlCol="0" anchor="ctr"/>
-          <a:lstStyle/>
-          <a:p>
-            <a:pPr algn="ctr"/>
-            <a:r>
-              <a:rPr lang="en-IN" b="1" dirty="0" smtClean="0">
+        </p:grpSpPr>
+        <p:grpSp>
+          <p:nvGrpSpPr>
+            <p:cNvPr id="32" name="Group 31"/>
+            <p:cNvGrpSpPr/>
+            <p:nvPr/>
+          </p:nvGrpSpPr>
+          <p:grpSpPr>
+            <a:xfrm>
+              <a:off x="1055538" y="1998434"/>
+              <a:ext cx="10091118" cy="2562747"/>
+              <a:chOff x="1055538" y="1998434"/>
+              <a:chExt cx="10091118" cy="2562747"/>
+            </a:xfrm>
+          </p:grpSpPr>
+          <p:sp>
+            <p:nvSpPr>
+              <p:cNvPr id="7" name="Oval 6"/>
+              <p:cNvSpPr/>
+              <p:nvPr/>
+            </p:nvSpPr>
+            <p:spPr>
+              <a:xfrm>
+                <a:off x="1055538" y="2114548"/>
+                <a:ext cx="428422" cy="425450"/>
+              </a:xfrm>
+              <a:prstGeom prst="ellipse">
+                <a:avLst/>
+              </a:prstGeom>
+              <a:solidFill>
+                <a:schemeClr val="bg1"/>
+              </a:solidFill>
+              <a:ln>
+                <a:noFill/>
+              </a:ln>
+            </p:spPr>
+            <p:style>
+              <a:lnRef idx="2">
+                <a:schemeClr val="accent1">
+                  <a:shade val="50000"/>
+                </a:schemeClr>
+              </a:lnRef>
+              <a:fillRef idx="1">
+                <a:schemeClr val="accent1"/>
+              </a:fillRef>
+              <a:effectRef idx="0">
+                <a:schemeClr val="accent1"/>
+              </a:effectRef>
+              <a:fontRef idx="minor">
+                <a:schemeClr val="lt1"/>
+              </a:fontRef>
+            </p:style>
+            <p:txBody>
+              <a:bodyPr rtlCol="0" anchor="ctr"/>
+              <a:lstStyle/>
+              <a:p>
+                <a:pPr algn="ctr"/>
+                <a:endParaRPr lang="en-IN"/>
+              </a:p>
+            </p:txBody>
+          </p:sp>
+          <p:cxnSp>
+            <p:nvCxnSpPr>
+              <p:cNvPr id="16" name="Straight Arrow Connector 15"/>
+              <p:cNvCxnSpPr>
+                <a:stCxn id="7" idx="6"/>
+                <a:endCxn id="18" idx="1"/>
+              </p:cNvCxnSpPr>
+              <p:nvPr/>
+            </p:nvCxnSpPr>
+            <p:spPr>
+              <a:xfrm>
+                <a:off x="1483960" y="2327273"/>
+                <a:ext cx="1266308" cy="1"/>
+              </a:xfrm>
+              <a:prstGeom prst="straightConnector1">
+                <a:avLst/>
+              </a:prstGeom>
+              <a:ln>
                 <a:solidFill>
                   <a:schemeClr val="bg1"/>
                 </a:solidFill>
-                <a:latin typeface="Open Sans" panose="020B0606030504020204" pitchFamily="34" charset="0"/>
-                <a:ea typeface="Open Sans" panose="020B0606030504020204" pitchFamily="34" charset="0"/>
-                <a:cs typeface="Open Sans" panose="020B0606030504020204" pitchFamily="34" charset="0"/>
-              </a:rPr>
-              <a:t>Launch App</a:t>
-            </a:r>
-            <a:endParaRPr lang="en-IN" b="1" dirty="0">
+                <a:tailEnd type="triangle" w="lg" len="lg"/>
+              </a:ln>
+            </p:spPr>
+            <p:style>
+              <a:lnRef idx="1">
+                <a:schemeClr val="accent1"/>
+              </a:lnRef>
+              <a:fillRef idx="0">
+                <a:schemeClr val="accent1"/>
+              </a:fillRef>
+              <a:effectRef idx="0">
+                <a:schemeClr val="accent1"/>
+              </a:effectRef>
+              <a:fontRef idx="minor">
+                <a:schemeClr val="tx1"/>
+              </a:fontRef>
+            </p:style>
+          </p:cxnSp>
+          <p:sp>
+            <p:nvSpPr>
+              <p:cNvPr id="18" name="Rounded Rectangle 17"/>
+              <p:cNvSpPr/>
+              <p:nvPr/>
+            </p:nvSpPr>
+            <p:spPr>
+              <a:xfrm>
+                <a:off x="2750268" y="1998434"/>
+                <a:ext cx="1915886" cy="657679"/>
+              </a:xfrm>
+              <a:prstGeom prst="roundRect">
+                <a:avLst>
+                  <a:gd name="adj" fmla="val 29908"/>
+                </a:avLst>
+              </a:prstGeom>
+              <a:solidFill>
+                <a:schemeClr val="tx1"/>
+              </a:solidFill>
+              <a:ln>
+                <a:solidFill>
+                  <a:schemeClr val="bg1"/>
+                </a:solidFill>
+              </a:ln>
+            </p:spPr>
+            <p:style>
+              <a:lnRef idx="2">
+                <a:schemeClr val="accent1">
+                  <a:shade val="50000"/>
+                </a:schemeClr>
+              </a:lnRef>
+              <a:fillRef idx="1">
+                <a:schemeClr val="accent1"/>
+              </a:fillRef>
+              <a:effectRef idx="0">
+                <a:schemeClr val="accent1"/>
+              </a:effectRef>
+              <a:fontRef idx="minor">
+                <a:schemeClr val="lt1"/>
+              </a:fontRef>
+            </p:style>
+            <p:txBody>
+              <a:bodyPr rtlCol="0" anchor="ctr"/>
+              <a:lstStyle/>
+              <a:p>
+                <a:pPr algn="ctr"/>
+                <a:r>
+                  <a:rPr lang="en-IN" b="1" dirty="0" smtClean="0">
+                    <a:solidFill>
+                      <a:schemeClr val="bg1"/>
+                    </a:solidFill>
+                    <a:latin typeface="Open Sans" panose="020B0606030504020204" pitchFamily="34" charset="0"/>
+                    <a:ea typeface="Open Sans" panose="020B0606030504020204" pitchFamily="34" charset="0"/>
+                    <a:cs typeface="Open Sans" panose="020B0606030504020204" pitchFamily="34" charset="0"/>
+                  </a:rPr>
+                  <a:t>Launch App</a:t>
+                </a:r>
+                <a:endParaRPr lang="en-IN" b="1" dirty="0">
+                  <a:solidFill>
+                    <a:schemeClr val="bg1"/>
+                  </a:solidFill>
+                  <a:latin typeface="Open Sans" panose="020B0606030504020204" pitchFamily="34" charset="0"/>
+                  <a:ea typeface="Open Sans" panose="020B0606030504020204" pitchFamily="34" charset="0"/>
+                  <a:cs typeface="Open Sans" panose="020B0606030504020204" pitchFamily="34" charset="0"/>
+                </a:endParaRPr>
+              </a:p>
+            </p:txBody>
+          </p:sp>
+          <p:cxnSp>
+            <p:nvCxnSpPr>
+              <p:cNvPr id="22" name="Straight Arrow Connector 21"/>
+              <p:cNvCxnSpPr>
+                <a:stCxn id="18" idx="3"/>
+                <a:endCxn id="25" idx="1"/>
+              </p:cNvCxnSpPr>
+              <p:nvPr/>
+            </p:nvCxnSpPr>
+            <p:spPr>
+              <a:xfrm>
+                <a:off x="4666154" y="2327274"/>
+                <a:ext cx="1266308" cy="0"/>
+              </a:xfrm>
+              <a:prstGeom prst="straightConnector1">
+                <a:avLst/>
+              </a:prstGeom>
+              <a:ln>
+                <a:solidFill>
+                  <a:schemeClr val="bg1"/>
+                </a:solidFill>
+                <a:tailEnd type="triangle" w="lg" len="lg"/>
+              </a:ln>
+            </p:spPr>
+            <p:style>
+              <a:lnRef idx="1">
+                <a:schemeClr val="accent1"/>
+              </a:lnRef>
+              <a:fillRef idx="0">
+                <a:schemeClr val="accent1"/>
+              </a:fillRef>
+              <a:effectRef idx="0">
+                <a:schemeClr val="accent1"/>
+              </a:effectRef>
+              <a:fontRef idx="minor">
+                <a:schemeClr val="tx1"/>
+              </a:fontRef>
+            </p:style>
+          </p:cxnSp>
+          <p:sp>
+            <p:nvSpPr>
+              <p:cNvPr id="25" name="Rounded Rectangle 24"/>
+              <p:cNvSpPr/>
+              <p:nvPr/>
+            </p:nvSpPr>
+            <p:spPr>
+              <a:xfrm>
+                <a:off x="5932462" y="1998434"/>
+                <a:ext cx="1973943" cy="657679"/>
+              </a:xfrm>
+              <a:prstGeom prst="roundRect">
+                <a:avLst>
+                  <a:gd name="adj" fmla="val 29908"/>
+                </a:avLst>
+              </a:prstGeom>
+              <a:solidFill>
+                <a:schemeClr val="tx1"/>
+              </a:solidFill>
+              <a:ln>
+                <a:solidFill>
+                  <a:schemeClr val="bg1"/>
+                </a:solidFill>
+              </a:ln>
+            </p:spPr>
+            <p:style>
+              <a:lnRef idx="2">
+                <a:schemeClr val="accent1">
+                  <a:shade val="50000"/>
+                </a:schemeClr>
+              </a:lnRef>
+              <a:fillRef idx="1">
+                <a:schemeClr val="accent1"/>
+              </a:fillRef>
+              <a:effectRef idx="0">
+                <a:schemeClr val="accent1"/>
+              </a:effectRef>
+              <a:fontRef idx="minor">
+                <a:schemeClr val="lt1"/>
+              </a:fontRef>
+            </p:style>
+            <p:txBody>
+              <a:bodyPr rtlCol="0" anchor="ctr"/>
+              <a:lstStyle/>
+              <a:p>
+                <a:pPr algn="ctr"/>
+                <a:r>
+                  <a:rPr lang="en-IN" b="1" dirty="0" smtClean="0">
+                    <a:solidFill>
+                      <a:schemeClr val="bg1"/>
+                    </a:solidFill>
+                    <a:latin typeface="Open Sans" panose="020B0606030504020204" pitchFamily="34" charset="0"/>
+                    <a:ea typeface="Open Sans" panose="020B0606030504020204" pitchFamily="34" charset="0"/>
+                    <a:cs typeface="Open Sans" panose="020B0606030504020204" pitchFamily="34" charset="0"/>
+                  </a:rPr>
+                  <a:t>Select Log File</a:t>
+                </a:r>
+                <a:endParaRPr lang="en-IN" b="1" dirty="0">
+                  <a:solidFill>
+                    <a:schemeClr val="bg1"/>
+                  </a:solidFill>
+                  <a:latin typeface="Open Sans" panose="020B0606030504020204" pitchFamily="34" charset="0"/>
+                  <a:ea typeface="Open Sans" panose="020B0606030504020204" pitchFamily="34" charset="0"/>
+                  <a:cs typeface="Open Sans" panose="020B0606030504020204" pitchFamily="34" charset="0"/>
+                </a:endParaRPr>
+              </a:p>
+            </p:txBody>
+          </p:sp>
+          <p:cxnSp>
+            <p:nvCxnSpPr>
+              <p:cNvPr id="28" name="Straight Arrow Connector 27"/>
+              <p:cNvCxnSpPr>
+                <a:stCxn id="25" idx="3"/>
+                <a:endCxn id="37" idx="1"/>
+              </p:cNvCxnSpPr>
+              <p:nvPr/>
+            </p:nvCxnSpPr>
+            <p:spPr>
+              <a:xfrm>
+                <a:off x="7906405" y="2327274"/>
+                <a:ext cx="1266308" cy="0"/>
+              </a:xfrm>
+              <a:prstGeom prst="straightConnector1">
+                <a:avLst/>
+              </a:prstGeom>
+              <a:ln>
+                <a:solidFill>
+                  <a:schemeClr val="bg1"/>
+                </a:solidFill>
+                <a:tailEnd type="triangle" w="lg" len="lg"/>
+              </a:ln>
+            </p:spPr>
+            <p:style>
+              <a:lnRef idx="1">
+                <a:schemeClr val="accent1"/>
+              </a:lnRef>
+              <a:fillRef idx="0">
+                <a:schemeClr val="accent1"/>
+              </a:fillRef>
+              <a:effectRef idx="0">
+                <a:schemeClr val="accent1"/>
+              </a:effectRef>
+              <a:fontRef idx="minor">
+                <a:schemeClr val="tx1"/>
+              </a:fontRef>
+            </p:style>
+          </p:cxnSp>
+          <p:sp>
+            <p:nvSpPr>
+              <p:cNvPr id="37" name="Rounded Rectangle 36"/>
+              <p:cNvSpPr/>
+              <p:nvPr/>
+            </p:nvSpPr>
+            <p:spPr>
+              <a:xfrm>
+                <a:off x="9172713" y="1998434"/>
+                <a:ext cx="1973943" cy="657679"/>
+              </a:xfrm>
+              <a:prstGeom prst="roundRect">
+                <a:avLst>
+                  <a:gd name="adj" fmla="val 29908"/>
+                </a:avLst>
+              </a:prstGeom>
+              <a:solidFill>
+                <a:schemeClr val="tx1"/>
+              </a:solidFill>
+              <a:ln>
+                <a:solidFill>
+                  <a:schemeClr val="bg1"/>
+                </a:solidFill>
+              </a:ln>
+            </p:spPr>
+            <p:style>
+              <a:lnRef idx="2">
+                <a:schemeClr val="accent1">
+                  <a:shade val="50000"/>
+                </a:schemeClr>
+              </a:lnRef>
+              <a:fillRef idx="1">
+                <a:schemeClr val="accent1"/>
+              </a:fillRef>
+              <a:effectRef idx="0">
+                <a:schemeClr val="accent1"/>
+              </a:effectRef>
+              <a:fontRef idx="minor">
+                <a:schemeClr val="lt1"/>
+              </a:fontRef>
+            </p:style>
+            <p:txBody>
+              <a:bodyPr rtlCol="0" anchor="ctr"/>
+              <a:lstStyle/>
+              <a:p>
+                <a:pPr algn="ctr"/>
+                <a:r>
+                  <a:rPr lang="en-IN" b="1" dirty="0" smtClean="0">
+                    <a:solidFill>
+                      <a:schemeClr val="bg1"/>
+                    </a:solidFill>
+                    <a:latin typeface="Open Sans" panose="020B0606030504020204" pitchFamily="34" charset="0"/>
+                    <a:ea typeface="Open Sans" panose="020B0606030504020204" pitchFamily="34" charset="0"/>
+                    <a:cs typeface="Open Sans" panose="020B0606030504020204" pitchFamily="34" charset="0"/>
+                  </a:rPr>
+                  <a:t>Analyse Log File</a:t>
+                </a:r>
+                <a:endParaRPr lang="en-IN" b="1" dirty="0">
+                  <a:solidFill>
+                    <a:schemeClr val="bg1"/>
+                  </a:solidFill>
+                  <a:latin typeface="Open Sans" panose="020B0606030504020204" pitchFamily="34" charset="0"/>
+                  <a:ea typeface="Open Sans" panose="020B0606030504020204" pitchFamily="34" charset="0"/>
+                  <a:cs typeface="Open Sans" panose="020B0606030504020204" pitchFamily="34" charset="0"/>
+                </a:endParaRPr>
+              </a:p>
+            </p:txBody>
+          </p:sp>
+          <p:sp>
+            <p:nvSpPr>
+              <p:cNvPr id="39" name="Rounded Rectangle 38"/>
+              <p:cNvSpPr/>
+              <p:nvPr/>
+            </p:nvSpPr>
+            <p:spPr>
+              <a:xfrm>
+                <a:off x="9172712" y="3825533"/>
+                <a:ext cx="1973943" cy="657679"/>
+              </a:xfrm>
+              <a:prstGeom prst="roundRect">
+                <a:avLst>
+                  <a:gd name="adj" fmla="val 29908"/>
+                </a:avLst>
+              </a:prstGeom>
+              <a:solidFill>
+                <a:schemeClr val="tx1"/>
+              </a:solidFill>
+              <a:ln>
+                <a:solidFill>
+                  <a:schemeClr val="bg1"/>
+                </a:solidFill>
+              </a:ln>
+            </p:spPr>
+            <p:style>
+              <a:lnRef idx="2">
+                <a:schemeClr val="accent1">
+                  <a:shade val="50000"/>
+                </a:schemeClr>
+              </a:lnRef>
+              <a:fillRef idx="1">
+                <a:schemeClr val="accent1"/>
+              </a:fillRef>
+              <a:effectRef idx="0">
+                <a:schemeClr val="accent1"/>
+              </a:effectRef>
+              <a:fontRef idx="minor">
+                <a:schemeClr val="lt1"/>
+              </a:fontRef>
+            </p:style>
+            <p:txBody>
+              <a:bodyPr rtlCol="0" anchor="ctr"/>
+              <a:lstStyle/>
+              <a:p>
+                <a:pPr algn="ctr"/>
+                <a:r>
+                  <a:rPr lang="en-IN" b="1" dirty="0" smtClean="0">
+                    <a:solidFill>
+                      <a:schemeClr val="bg1"/>
+                    </a:solidFill>
+                    <a:latin typeface="Open Sans" panose="020B0606030504020204" pitchFamily="34" charset="0"/>
+                    <a:ea typeface="Open Sans" panose="020B0606030504020204" pitchFamily="34" charset="0"/>
+                    <a:cs typeface="Open Sans" panose="020B0606030504020204" pitchFamily="34" charset="0"/>
+                  </a:rPr>
+                  <a:t>Get Output</a:t>
+                </a:r>
+                <a:endParaRPr lang="en-IN" b="1" dirty="0">
+                  <a:solidFill>
+                    <a:schemeClr val="bg1"/>
+                  </a:solidFill>
+                  <a:latin typeface="Open Sans" panose="020B0606030504020204" pitchFamily="34" charset="0"/>
+                  <a:ea typeface="Open Sans" panose="020B0606030504020204" pitchFamily="34" charset="0"/>
+                  <a:cs typeface="Open Sans" panose="020B0606030504020204" pitchFamily="34" charset="0"/>
+                </a:endParaRPr>
+              </a:p>
+            </p:txBody>
+          </p:sp>
+          <p:cxnSp>
+            <p:nvCxnSpPr>
+              <p:cNvPr id="40" name="Straight Arrow Connector 39"/>
+              <p:cNvCxnSpPr>
+                <a:stCxn id="37" idx="2"/>
+                <a:endCxn id="39" idx="0"/>
+              </p:cNvCxnSpPr>
+              <p:nvPr/>
+            </p:nvCxnSpPr>
+            <p:spPr>
+              <a:xfrm flipH="1">
+                <a:off x="10159684" y="2656113"/>
+                <a:ext cx="1" cy="1169420"/>
+              </a:xfrm>
+              <a:prstGeom prst="straightConnector1">
+                <a:avLst/>
+              </a:prstGeom>
+              <a:ln>
+                <a:solidFill>
+                  <a:schemeClr val="bg1"/>
+                </a:solidFill>
+                <a:tailEnd type="triangle" w="lg" len="lg"/>
+              </a:ln>
+            </p:spPr>
+            <p:style>
+              <a:lnRef idx="1">
+                <a:schemeClr val="accent1"/>
+              </a:lnRef>
+              <a:fillRef idx="0">
+                <a:schemeClr val="accent1"/>
+              </a:fillRef>
+              <a:effectRef idx="0">
+                <a:schemeClr val="accent1"/>
+              </a:effectRef>
+              <a:fontRef idx="minor">
+                <a:schemeClr val="tx1"/>
+              </a:fontRef>
+            </p:style>
+          </p:cxnSp>
+          <p:cxnSp>
+            <p:nvCxnSpPr>
+              <p:cNvPr id="44" name="Straight Arrow Connector 43"/>
+              <p:cNvCxnSpPr>
+                <a:stCxn id="39" idx="1"/>
+                <a:endCxn id="50" idx="2"/>
+              </p:cNvCxnSpPr>
+              <p:nvPr/>
+            </p:nvCxnSpPr>
+            <p:spPr>
+              <a:xfrm flipH="1" flipV="1">
+                <a:off x="8681255" y="4125253"/>
+                <a:ext cx="491457" cy="29120"/>
+              </a:xfrm>
+              <a:prstGeom prst="straightConnector1">
+                <a:avLst/>
+              </a:prstGeom>
+              <a:ln>
+                <a:solidFill>
+                  <a:schemeClr val="bg1"/>
+                </a:solidFill>
+                <a:tailEnd type="triangle" w="lg" len="lg"/>
+              </a:ln>
+            </p:spPr>
+            <p:style>
+              <a:lnRef idx="1">
+                <a:schemeClr val="accent1"/>
+              </a:lnRef>
+              <a:fillRef idx="0">
+                <a:schemeClr val="accent1"/>
+              </a:fillRef>
+              <a:effectRef idx="0">
+                <a:schemeClr val="accent1"/>
+              </a:effectRef>
+              <a:fontRef idx="minor">
+                <a:schemeClr val="tx1"/>
+              </a:fontRef>
+            </p:style>
+          </p:cxnSp>
+          <p:sp>
+            <p:nvSpPr>
+              <p:cNvPr id="48" name="Rounded Rectangle 47"/>
+              <p:cNvSpPr/>
+              <p:nvPr/>
+            </p:nvSpPr>
+            <p:spPr>
+              <a:xfrm>
+                <a:off x="5932461" y="3825531"/>
+                <a:ext cx="1973943" cy="657679"/>
+              </a:xfrm>
+              <a:prstGeom prst="roundRect">
+                <a:avLst>
+                  <a:gd name="adj" fmla="val 29908"/>
+                </a:avLst>
+              </a:prstGeom>
+              <a:solidFill>
+                <a:schemeClr val="tx1"/>
+              </a:solidFill>
+              <a:ln>
+                <a:solidFill>
+                  <a:schemeClr val="bg1"/>
+                </a:solidFill>
+              </a:ln>
+            </p:spPr>
+            <p:style>
+              <a:lnRef idx="2">
+                <a:schemeClr val="accent1">
+                  <a:shade val="50000"/>
+                </a:schemeClr>
+              </a:lnRef>
+              <a:fillRef idx="1">
+                <a:schemeClr val="accent1"/>
+              </a:fillRef>
+              <a:effectRef idx="0">
+                <a:schemeClr val="accent1"/>
+              </a:effectRef>
+              <a:fontRef idx="minor">
+                <a:schemeClr val="lt1"/>
+              </a:fontRef>
+            </p:style>
+            <p:txBody>
+              <a:bodyPr rtlCol="0" anchor="ctr"/>
+              <a:lstStyle/>
+              <a:p>
+                <a:pPr algn="ctr"/>
+                <a:r>
+                  <a:rPr lang="en-IN" b="1" dirty="0" smtClean="0">
+                    <a:solidFill>
+                      <a:schemeClr val="bg1"/>
+                    </a:solidFill>
+                    <a:latin typeface="Open Sans" panose="020B0606030504020204" pitchFamily="34" charset="0"/>
+                    <a:ea typeface="Open Sans" panose="020B0606030504020204" pitchFamily="34" charset="0"/>
+                    <a:cs typeface="Open Sans" panose="020B0606030504020204" pitchFamily="34" charset="0"/>
+                  </a:rPr>
+                  <a:t>Export Output</a:t>
+                </a:r>
+                <a:endParaRPr lang="en-IN" b="1" dirty="0">
+                  <a:solidFill>
+                    <a:schemeClr val="bg1"/>
+                  </a:solidFill>
+                  <a:latin typeface="Open Sans" panose="020B0606030504020204" pitchFamily="34" charset="0"/>
+                  <a:ea typeface="Open Sans" panose="020B0606030504020204" pitchFamily="34" charset="0"/>
+                  <a:cs typeface="Open Sans" panose="020B0606030504020204" pitchFamily="34" charset="0"/>
+                </a:endParaRPr>
+              </a:p>
+            </p:txBody>
+          </p:sp>
+          <p:sp>
+            <p:nvSpPr>
+              <p:cNvPr id="50" name="Diagonal Stripe 49"/>
+              <p:cNvSpPr/>
+              <p:nvPr/>
+            </p:nvSpPr>
+            <p:spPr>
+              <a:xfrm rot="7851648">
+                <a:off x="8111545" y="3805887"/>
+                <a:ext cx="820835" cy="689753"/>
+              </a:xfrm>
+              <a:prstGeom prst="diagStripe">
+                <a:avLst>
+                  <a:gd name="adj" fmla="val 69907"/>
+                </a:avLst>
+              </a:prstGeom>
               <a:solidFill>
                 <a:schemeClr val="bg1"/>
               </a:solidFill>
-              <a:latin typeface="Open Sans" panose="020B0606030504020204" pitchFamily="34" charset="0"/>
-              <a:ea typeface="Open Sans" panose="020B0606030504020204" pitchFamily="34" charset="0"/>
-              <a:cs typeface="Open Sans" panose="020B0606030504020204" pitchFamily="34" charset="0"/>
-            </a:endParaRPr>
-          </a:p>
-        </p:txBody>
-      </p:sp>
-      <p:cxnSp>
-        <p:nvCxnSpPr>
-          <p:cNvPr id="22" name="Straight Arrow Connector 21"/>
-          <p:cNvCxnSpPr>
-            <a:stCxn id="18" idx="3"/>
-            <a:endCxn id="25" idx="1"/>
-          </p:cNvCxnSpPr>
-          <p:nvPr/>
-        </p:nvCxnSpPr>
-        <p:spPr>
-          <a:xfrm>
-            <a:off x="4666154" y="2327274"/>
-            <a:ext cx="1266308" cy="0"/>
-          </a:xfrm>
-          <a:prstGeom prst="straightConnector1">
-            <a:avLst/>
-          </a:prstGeom>
-          <a:ln>
-            <a:solidFill>
-              <a:schemeClr val="bg1"/>
-            </a:solidFill>
-            <a:tailEnd type="triangle" w="lg" len="lg"/>
-          </a:ln>
-        </p:spPr>
-        <p:style>
-          <a:lnRef idx="1">
-            <a:schemeClr val="accent1"/>
-          </a:lnRef>
-          <a:fillRef idx="0">
-            <a:schemeClr val="accent1"/>
-          </a:fillRef>
-          <a:effectRef idx="0">
-            <a:schemeClr val="accent1"/>
-          </a:effectRef>
-          <a:fontRef idx="minor">
-            <a:schemeClr val="tx1"/>
-          </a:fontRef>
-        </p:style>
-      </p:cxnSp>
-      <p:sp>
-        <p:nvSpPr>
-          <p:cNvPr id="25" name="Rounded Rectangle 24"/>
-          <p:cNvSpPr/>
-          <p:nvPr/>
-        </p:nvSpPr>
-        <p:spPr>
-          <a:xfrm>
-            <a:off x="5932462" y="1998434"/>
-            <a:ext cx="1973943" cy="657679"/>
-          </a:xfrm>
-          <a:prstGeom prst="roundRect">
-            <a:avLst>
-              <a:gd name="adj" fmla="val 29908"/>
-            </a:avLst>
-          </a:prstGeom>
-          <a:solidFill>
-            <a:schemeClr val="tx1"/>
-          </a:solidFill>
-          <a:ln>
-            <a:solidFill>
-              <a:schemeClr val="bg1"/>
-            </a:solidFill>
-          </a:ln>
-        </p:spPr>
-        <p:style>
-          <a:lnRef idx="2">
-            <a:schemeClr val="accent1">
-              <a:shade val="50000"/>
-            </a:schemeClr>
-          </a:lnRef>
-          <a:fillRef idx="1">
-            <a:schemeClr val="accent1"/>
-          </a:fillRef>
-          <a:effectRef idx="0">
-            <a:schemeClr val="accent1"/>
-          </a:effectRef>
-          <a:fontRef idx="minor">
-            <a:schemeClr val="lt1"/>
-          </a:fontRef>
-        </p:style>
-        <p:txBody>
-          <a:bodyPr rtlCol="0" anchor="ctr"/>
-          <a:lstStyle/>
-          <a:p>
-            <a:pPr algn="ctr"/>
-            <a:r>
-              <a:rPr lang="en-IN" b="1" dirty="0" smtClean="0">
+              <a:ln>
+                <a:noFill/>
+              </a:ln>
+            </p:spPr>
+            <p:style>
+              <a:lnRef idx="2">
+                <a:schemeClr val="accent1">
+                  <a:shade val="50000"/>
+                </a:schemeClr>
+              </a:lnRef>
+              <a:fillRef idx="1">
+                <a:schemeClr val="accent1"/>
+              </a:fillRef>
+              <a:effectRef idx="0">
+                <a:schemeClr val="accent1"/>
+              </a:effectRef>
+              <a:fontRef idx="minor">
+                <a:schemeClr val="lt1"/>
+              </a:fontRef>
+            </p:style>
+            <p:txBody>
+              <a:bodyPr rtlCol="0" anchor="ctr"/>
+              <a:lstStyle/>
+              <a:p>
+                <a:pPr algn="ctr"/>
+                <a:endParaRPr lang="en-IN">
+                  <a:solidFill>
+                    <a:schemeClr val="tx1"/>
+                  </a:solidFill>
+                </a:endParaRPr>
+              </a:p>
+            </p:txBody>
+          </p:sp>
+          <p:cxnSp>
+            <p:nvCxnSpPr>
+              <p:cNvPr id="51" name="Straight Arrow Connector 50"/>
+              <p:cNvCxnSpPr>
+                <a:stCxn id="50" idx="0"/>
+                <a:endCxn id="48" idx="3"/>
+              </p:cNvCxnSpPr>
+              <p:nvPr/>
+            </p:nvCxnSpPr>
+            <p:spPr>
+              <a:xfrm flipH="1">
+                <a:off x="7906404" y="4150764"/>
+                <a:ext cx="615558" cy="3607"/>
+              </a:xfrm>
+              <a:prstGeom prst="straightConnector1">
+                <a:avLst/>
+              </a:prstGeom>
+              <a:ln>
                 <a:solidFill>
                   <a:schemeClr val="bg1"/>
                 </a:solidFill>
-                <a:latin typeface="Open Sans" panose="020B0606030504020204" pitchFamily="34" charset="0"/>
-                <a:ea typeface="Open Sans" panose="020B0606030504020204" pitchFamily="34" charset="0"/>
-                <a:cs typeface="Open Sans" panose="020B0606030504020204" pitchFamily="34" charset="0"/>
-              </a:rPr>
-              <a:t>Select Log File</a:t>
-            </a:r>
-            <a:endParaRPr lang="en-IN" b="1" dirty="0">
+                <a:tailEnd type="triangle" w="lg" len="lg"/>
+              </a:ln>
+            </p:spPr>
+            <p:style>
+              <a:lnRef idx="1">
+                <a:schemeClr val="accent1"/>
+              </a:lnRef>
+              <a:fillRef idx="0">
+                <a:schemeClr val="accent1"/>
+              </a:fillRef>
+              <a:effectRef idx="0">
+                <a:schemeClr val="accent1"/>
+              </a:effectRef>
+              <a:fontRef idx="minor">
+                <a:schemeClr val="tx1"/>
+              </a:fontRef>
+            </p:style>
+          </p:cxnSp>
+          <p:sp>
+            <p:nvSpPr>
+              <p:cNvPr id="64" name="Rounded Rectangle 63"/>
+              <p:cNvSpPr/>
+              <p:nvPr/>
+            </p:nvSpPr>
+            <p:spPr>
+              <a:xfrm>
+                <a:off x="2721239" y="3832532"/>
+                <a:ext cx="1973943" cy="657679"/>
+              </a:xfrm>
+              <a:prstGeom prst="roundRect">
+                <a:avLst>
+                  <a:gd name="adj" fmla="val 29908"/>
+                </a:avLst>
+              </a:prstGeom>
+              <a:solidFill>
+                <a:schemeClr val="tx1"/>
+              </a:solidFill>
+              <a:ln>
+                <a:solidFill>
+                  <a:schemeClr val="bg1"/>
+                </a:solidFill>
+              </a:ln>
+            </p:spPr>
+            <p:style>
+              <a:lnRef idx="2">
+                <a:schemeClr val="accent1">
+                  <a:shade val="50000"/>
+                </a:schemeClr>
+              </a:lnRef>
+              <a:fillRef idx="1">
+                <a:schemeClr val="accent1"/>
+              </a:fillRef>
+              <a:effectRef idx="0">
+                <a:schemeClr val="accent1"/>
+              </a:effectRef>
+              <a:fontRef idx="minor">
+                <a:schemeClr val="lt1"/>
+              </a:fontRef>
+            </p:style>
+            <p:txBody>
+              <a:bodyPr rtlCol="0" anchor="ctr"/>
+              <a:lstStyle/>
+              <a:p>
+                <a:pPr algn="ctr"/>
+                <a:r>
+                  <a:rPr lang="en-IN" sz="1600" b="1" dirty="0" smtClean="0">
+                    <a:solidFill>
+                      <a:schemeClr val="bg1"/>
+                    </a:solidFill>
+                    <a:latin typeface="Open Sans" panose="020B0606030504020204" pitchFamily="34" charset="0"/>
+                    <a:ea typeface="Open Sans" panose="020B0606030504020204" pitchFamily="34" charset="0"/>
+                    <a:cs typeface="Open Sans" panose="020B0606030504020204" pitchFamily="34" charset="0"/>
+                  </a:rPr>
+                  <a:t>Analyse another Log File</a:t>
+                </a:r>
+                <a:endParaRPr lang="en-IN" sz="1600" b="1" dirty="0">
+                  <a:solidFill>
+                    <a:schemeClr val="bg1"/>
+                  </a:solidFill>
+                  <a:latin typeface="Open Sans" panose="020B0606030504020204" pitchFamily="34" charset="0"/>
+                  <a:ea typeface="Open Sans" panose="020B0606030504020204" pitchFamily="34" charset="0"/>
+                  <a:cs typeface="Open Sans" panose="020B0606030504020204" pitchFamily="34" charset="0"/>
+                </a:endParaRPr>
+              </a:p>
+            </p:txBody>
+          </p:sp>
+          <p:cxnSp>
+            <p:nvCxnSpPr>
+              <p:cNvPr id="65" name="Straight Arrow Connector 64"/>
+              <p:cNvCxnSpPr>
+                <a:stCxn id="48" idx="1"/>
+                <a:endCxn id="64" idx="3"/>
+              </p:cNvCxnSpPr>
+              <p:nvPr/>
+            </p:nvCxnSpPr>
+            <p:spPr>
+              <a:xfrm flipH="1">
+                <a:off x="4695182" y="4154371"/>
+                <a:ext cx="1237279" cy="7001"/>
+              </a:xfrm>
+              <a:prstGeom prst="straightConnector1">
+                <a:avLst/>
+              </a:prstGeom>
+              <a:ln>
+                <a:solidFill>
+                  <a:schemeClr val="bg1"/>
+                </a:solidFill>
+                <a:tailEnd type="triangle" w="lg" len="lg"/>
+              </a:ln>
+            </p:spPr>
+            <p:style>
+              <a:lnRef idx="1">
+                <a:schemeClr val="accent1"/>
+              </a:lnRef>
+              <a:fillRef idx="0">
+                <a:schemeClr val="accent1"/>
+              </a:fillRef>
+              <a:effectRef idx="0">
+                <a:schemeClr val="accent1"/>
+              </a:effectRef>
+              <a:fontRef idx="minor">
+                <a:schemeClr val="tx1"/>
+              </a:fontRef>
+            </p:style>
+          </p:cxnSp>
+          <p:sp>
+            <p:nvSpPr>
+              <p:cNvPr id="70" name="Oval 69"/>
+              <p:cNvSpPr/>
+              <p:nvPr/>
+            </p:nvSpPr>
+            <p:spPr>
+              <a:xfrm>
+                <a:off x="1055538" y="3955649"/>
+                <a:ext cx="428422" cy="425450"/>
+              </a:xfrm>
+              <a:prstGeom prst="ellipse">
+                <a:avLst/>
+              </a:prstGeom>
+              <a:solidFill>
+                <a:schemeClr val="tx1"/>
+              </a:solidFill>
+              <a:ln w="101600" cmpd="dbl">
+                <a:solidFill>
+                  <a:schemeClr val="bg1">
+                    <a:alpha val="99000"/>
+                  </a:schemeClr>
+                </a:solidFill>
+              </a:ln>
+            </p:spPr>
+            <p:style>
+              <a:lnRef idx="2">
+                <a:schemeClr val="accent1">
+                  <a:shade val="50000"/>
+                </a:schemeClr>
+              </a:lnRef>
+              <a:fillRef idx="1">
+                <a:schemeClr val="accent1"/>
+              </a:fillRef>
+              <a:effectRef idx="0">
+                <a:schemeClr val="accent1"/>
+              </a:effectRef>
+              <a:fontRef idx="minor">
+                <a:schemeClr val="lt1"/>
+              </a:fontRef>
+            </p:style>
+            <p:txBody>
+              <a:bodyPr rtlCol="0" anchor="ctr"/>
+              <a:lstStyle/>
+              <a:p>
+                <a:pPr algn="ctr"/>
+                <a:endParaRPr lang="en-IN"/>
+              </a:p>
+            </p:txBody>
+          </p:sp>
+          <p:cxnSp>
+            <p:nvCxnSpPr>
+              <p:cNvPr id="80" name="Elbow Connector 79"/>
+              <p:cNvCxnSpPr>
+                <a:stCxn id="50" idx="0"/>
+                <a:endCxn id="64" idx="3"/>
+              </p:cNvCxnSpPr>
+              <p:nvPr/>
+            </p:nvCxnSpPr>
+            <p:spPr>
+              <a:xfrm rot="5400000">
+                <a:off x="6603268" y="2242678"/>
+                <a:ext cx="10608" cy="3826780"/>
+              </a:xfrm>
+              <a:prstGeom prst="bentConnector4">
+                <a:avLst>
+                  <a:gd name="adj1" fmla="val -7677112"/>
+                  <a:gd name="adj2" fmla="val 80003"/>
+                </a:avLst>
+              </a:prstGeom>
+              <a:ln>
+                <a:solidFill>
+                  <a:schemeClr val="bg1"/>
+                </a:solidFill>
+                <a:tailEnd type="triangle" w="lg" len="lg"/>
+              </a:ln>
+            </p:spPr>
+            <p:style>
+              <a:lnRef idx="1">
+                <a:schemeClr val="accent1"/>
+              </a:lnRef>
+              <a:fillRef idx="0">
+                <a:schemeClr val="accent1"/>
+              </a:fillRef>
+              <a:effectRef idx="0">
+                <a:schemeClr val="accent1"/>
+              </a:effectRef>
+              <a:fontRef idx="minor">
+                <a:schemeClr val="tx1"/>
+              </a:fontRef>
+            </p:style>
+          </p:cxnSp>
+          <p:cxnSp>
+            <p:nvCxnSpPr>
+              <p:cNvPr id="11" name="Elbow Connector 10"/>
+              <p:cNvCxnSpPr>
+                <a:stCxn id="64" idx="0"/>
+                <a:endCxn id="25" idx="2"/>
+              </p:cNvCxnSpPr>
+              <p:nvPr/>
+            </p:nvCxnSpPr>
+            <p:spPr>
+              <a:xfrm rot="5400000" flipH="1" flipV="1">
+                <a:off x="4725613" y="1638712"/>
+                <a:ext cx="1176419" cy="3211223"/>
+              </a:xfrm>
+              <a:prstGeom prst="bentConnector3">
+                <a:avLst>
+                  <a:gd name="adj1" fmla="val 75504"/>
+                </a:avLst>
+              </a:prstGeom>
+              <a:ln>
+                <a:solidFill>
+                  <a:schemeClr val="bg1"/>
+                </a:solidFill>
+                <a:tailEnd type="triangle" w="lg" len="lg"/>
+              </a:ln>
+            </p:spPr>
+            <p:style>
+              <a:lnRef idx="1">
+                <a:schemeClr val="accent1"/>
+              </a:lnRef>
+              <a:fillRef idx="0">
+                <a:schemeClr val="accent1"/>
+              </a:fillRef>
+              <a:effectRef idx="0">
+                <a:schemeClr val="accent1"/>
+              </a:effectRef>
+              <a:fontRef idx="minor">
+                <a:schemeClr val="tx1"/>
+              </a:fontRef>
+            </p:style>
+          </p:cxnSp>
+          <p:cxnSp>
+            <p:nvCxnSpPr>
+              <p:cNvPr id="41" name="Elbow Connector 40"/>
+              <p:cNvCxnSpPr>
+                <a:stCxn id="48" idx="2"/>
+                <a:endCxn id="70" idx="4"/>
+              </p:cNvCxnSpPr>
+              <p:nvPr/>
+            </p:nvCxnSpPr>
+            <p:spPr>
+              <a:xfrm rot="5400000" flipH="1">
+                <a:off x="4043535" y="1607313"/>
+                <a:ext cx="102111" cy="5649684"/>
+              </a:xfrm>
+              <a:prstGeom prst="bentConnector3">
+                <a:avLst>
+                  <a:gd name="adj1" fmla="val -242756"/>
+                </a:avLst>
+              </a:prstGeom>
+              <a:ln>
+                <a:solidFill>
+                  <a:schemeClr val="bg1"/>
+                </a:solidFill>
+                <a:tailEnd type="triangle" w="lg" len="lg"/>
+              </a:ln>
+            </p:spPr>
+            <p:style>
+              <a:lnRef idx="1">
+                <a:schemeClr val="accent1"/>
+              </a:lnRef>
+              <a:fillRef idx="0">
+                <a:schemeClr val="accent1"/>
+              </a:fillRef>
+              <a:effectRef idx="0">
+                <a:schemeClr val="accent1"/>
+              </a:effectRef>
+              <a:fontRef idx="minor">
+                <a:schemeClr val="tx1"/>
+              </a:fontRef>
+            </p:style>
+          </p:cxnSp>
+        </p:grpSp>
+        <p:cxnSp>
+          <p:nvCxnSpPr>
+            <p:cNvPr id="29" name="Elbow Connector 28"/>
+            <p:cNvCxnSpPr>
+              <a:stCxn id="50" idx="0"/>
+              <a:endCxn id="70" idx="4"/>
+            </p:cNvCxnSpPr>
+            <p:nvPr/>
+          </p:nvCxnSpPr>
+          <p:spPr>
+            <a:xfrm rot="5400000">
+              <a:off x="4780689" y="639825"/>
+              <a:ext cx="230335" cy="7252213"/>
+            </a:xfrm>
+            <a:prstGeom prst="bentConnector3">
+              <a:avLst>
+                <a:gd name="adj1" fmla="val 360628"/>
+              </a:avLst>
+            </a:prstGeom>
+            <a:ln>
               <a:solidFill>
                 <a:schemeClr val="bg1"/>
               </a:solidFill>
-              <a:latin typeface="Open Sans" panose="020B0606030504020204" pitchFamily="34" charset="0"/>
-              <a:ea typeface="Open Sans" panose="020B0606030504020204" pitchFamily="34" charset="0"/>
-              <a:cs typeface="Open Sans" panose="020B0606030504020204" pitchFamily="34" charset="0"/>
-            </a:endParaRPr>
-          </a:p>
-        </p:txBody>
-      </p:sp>
-      <p:cxnSp>
-        <p:nvCxnSpPr>
-          <p:cNvPr id="28" name="Straight Arrow Connector 27"/>
-          <p:cNvCxnSpPr>
-            <a:stCxn id="25" idx="3"/>
-            <a:endCxn id="37" idx="1"/>
-          </p:cNvCxnSpPr>
-          <p:nvPr/>
-        </p:nvCxnSpPr>
-        <p:spPr>
-          <a:xfrm>
-            <a:off x="7906405" y="2327274"/>
-            <a:ext cx="1266308" cy="0"/>
-          </a:xfrm>
-          <a:prstGeom prst="straightConnector1">
-            <a:avLst/>
-          </a:prstGeom>
-          <a:ln>
-            <a:solidFill>
-              <a:schemeClr val="bg1"/>
-            </a:solidFill>
-            <a:tailEnd type="triangle" w="lg" len="lg"/>
-          </a:ln>
-        </p:spPr>
-        <p:style>
-          <a:lnRef idx="1">
-            <a:schemeClr val="accent1"/>
-          </a:lnRef>
-          <a:fillRef idx="0">
-            <a:schemeClr val="accent1"/>
-          </a:fillRef>
-          <a:effectRef idx="0">
-            <a:schemeClr val="accent1"/>
-          </a:effectRef>
-          <a:fontRef idx="minor">
-            <a:schemeClr val="tx1"/>
-          </a:fontRef>
-        </p:style>
-      </p:cxnSp>
-      <p:sp>
-        <p:nvSpPr>
-          <p:cNvPr id="37" name="Rounded Rectangle 36"/>
-          <p:cNvSpPr/>
-          <p:nvPr/>
-        </p:nvSpPr>
-        <p:spPr>
-          <a:xfrm>
-            <a:off x="9172713" y="1998434"/>
-            <a:ext cx="1973943" cy="657679"/>
-          </a:xfrm>
-          <a:prstGeom prst="roundRect">
-            <a:avLst>
-              <a:gd name="adj" fmla="val 29908"/>
-            </a:avLst>
-          </a:prstGeom>
-          <a:solidFill>
-            <a:schemeClr val="tx1"/>
-          </a:solidFill>
-          <a:ln>
-            <a:solidFill>
-              <a:schemeClr val="bg1"/>
-            </a:solidFill>
-          </a:ln>
-        </p:spPr>
-        <p:style>
-          <a:lnRef idx="2">
-            <a:schemeClr val="accent1">
-              <a:shade val="50000"/>
-            </a:schemeClr>
-          </a:lnRef>
-          <a:fillRef idx="1">
-            <a:schemeClr val="accent1"/>
-          </a:fillRef>
-          <a:effectRef idx="0">
-            <a:schemeClr val="accent1"/>
-          </a:effectRef>
-          <a:fontRef idx="minor">
-            <a:schemeClr val="lt1"/>
-          </a:fontRef>
-        </p:style>
-        <p:txBody>
-          <a:bodyPr rtlCol="0" anchor="ctr"/>
-          <a:lstStyle/>
-          <a:p>
-            <a:pPr algn="ctr"/>
-            <a:r>
-              <a:rPr lang="en-IN" b="1" dirty="0" smtClean="0">
-                <a:solidFill>
-                  <a:schemeClr val="bg1"/>
-                </a:solidFill>
-                <a:latin typeface="Open Sans" panose="020B0606030504020204" pitchFamily="34" charset="0"/>
-                <a:ea typeface="Open Sans" panose="020B0606030504020204" pitchFamily="34" charset="0"/>
-                <a:cs typeface="Open Sans" panose="020B0606030504020204" pitchFamily="34" charset="0"/>
-              </a:rPr>
-              <a:t>Analyse Log File</a:t>
-            </a:r>
-            <a:endParaRPr lang="en-IN" b="1" dirty="0">
-              <a:solidFill>
-                <a:schemeClr val="bg1"/>
-              </a:solidFill>
-              <a:latin typeface="Open Sans" panose="020B0606030504020204" pitchFamily="34" charset="0"/>
-              <a:ea typeface="Open Sans" panose="020B0606030504020204" pitchFamily="34" charset="0"/>
-              <a:cs typeface="Open Sans" panose="020B0606030504020204" pitchFamily="34" charset="0"/>
-            </a:endParaRPr>
-          </a:p>
-        </p:txBody>
-      </p:sp>
-      <p:sp>
-        <p:nvSpPr>
-          <p:cNvPr id="39" name="Rounded Rectangle 38"/>
-          <p:cNvSpPr/>
-          <p:nvPr/>
-        </p:nvSpPr>
-        <p:spPr>
-          <a:xfrm>
-            <a:off x="9172712" y="3825533"/>
-            <a:ext cx="1973943" cy="657679"/>
-          </a:xfrm>
-          <a:prstGeom prst="roundRect">
-            <a:avLst>
-              <a:gd name="adj" fmla="val 29908"/>
-            </a:avLst>
-          </a:prstGeom>
-          <a:solidFill>
-            <a:schemeClr val="tx1"/>
-          </a:solidFill>
-          <a:ln>
-            <a:solidFill>
-              <a:schemeClr val="bg1"/>
-            </a:solidFill>
-          </a:ln>
-        </p:spPr>
-        <p:style>
-          <a:lnRef idx="2">
-            <a:schemeClr val="accent1">
-              <a:shade val="50000"/>
-            </a:schemeClr>
-          </a:lnRef>
-          <a:fillRef idx="1">
-            <a:schemeClr val="accent1"/>
-          </a:fillRef>
-          <a:effectRef idx="0">
-            <a:schemeClr val="accent1"/>
-          </a:effectRef>
-          <a:fontRef idx="minor">
-            <a:schemeClr val="lt1"/>
-          </a:fontRef>
-        </p:style>
-        <p:txBody>
-          <a:bodyPr rtlCol="0" anchor="ctr"/>
-          <a:lstStyle/>
-          <a:p>
-            <a:pPr algn="ctr"/>
-            <a:r>
-              <a:rPr lang="en-IN" b="1" dirty="0" smtClean="0">
-                <a:solidFill>
-                  <a:schemeClr val="bg1"/>
-                </a:solidFill>
-                <a:latin typeface="Open Sans" panose="020B0606030504020204" pitchFamily="34" charset="0"/>
-                <a:ea typeface="Open Sans" panose="020B0606030504020204" pitchFamily="34" charset="0"/>
-                <a:cs typeface="Open Sans" panose="020B0606030504020204" pitchFamily="34" charset="0"/>
-              </a:rPr>
-              <a:t>Get Output</a:t>
-            </a:r>
-            <a:endParaRPr lang="en-IN" b="1" dirty="0">
-              <a:solidFill>
-                <a:schemeClr val="bg1"/>
-              </a:solidFill>
-              <a:latin typeface="Open Sans" panose="020B0606030504020204" pitchFamily="34" charset="0"/>
-              <a:ea typeface="Open Sans" panose="020B0606030504020204" pitchFamily="34" charset="0"/>
-              <a:cs typeface="Open Sans" panose="020B0606030504020204" pitchFamily="34" charset="0"/>
-            </a:endParaRPr>
-          </a:p>
-        </p:txBody>
-      </p:sp>
-      <p:cxnSp>
-        <p:nvCxnSpPr>
-          <p:cNvPr id="40" name="Straight Arrow Connector 39"/>
-          <p:cNvCxnSpPr>
-            <a:stCxn id="37" idx="2"/>
-            <a:endCxn id="39" idx="0"/>
-          </p:cNvCxnSpPr>
-          <p:nvPr/>
-        </p:nvCxnSpPr>
-        <p:spPr>
-          <a:xfrm flipH="1">
-            <a:off x="10159684" y="2656113"/>
-            <a:ext cx="1" cy="1169420"/>
-          </a:xfrm>
-          <a:prstGeom prst="straightConnector1">
-            <a:avLst/>
-          </a:prstGeom>
-          <a:ln>
-            <a:solidFill>
-              <a:schemeClr val="bg1"/>
-            </a:solidFill>
-            <a:tailEnd type="triangle" w="lg" len="lg"/>
-          </a:ln>
-        </p:spPr>
-        <p:style>
-          <a:lnRef idx="1">
-            <a:schemeClr val="accent1"/>
-          </a:lnRef>
-          <a:fillRef idx="0">
-            <a:schemeClr val="accent1"/>
-          </a:fillRef>
-          <a:effectRef idx="0">
-            <a:schemeClr val="accent1"/>
-          </a:effectRef>
-          <a:fontRef idx="minor">
-            <a:schemeClr val="tx1"/>
-          </a:fontRef>
-        </p:style>
-      </p:cxnSp>
-      <p:cxnSp>
-        <p:nvCxnSpPr>
-          <p:cNvPr id="44" name="Straight Arrow Connector 43"/>
-          <p:cNvCxnSpPr>
-            <a:stCxn id="39" idx="1"/>
-            <a:endCxn id="50" idx="2"/>
-          </p:cNvCxnSpPr>
-          <p:nvPr/>
-        </p:nvCxnSpPr>
-        <p:spPr>
-          <a:xfrm flipH="1" flipV="1">
-            <a:off x="8663770" y="4134124"/>
-            <a:ext cx="508942" cy="20249"/>
-          </a:xfrm>
-          <a:prstGeom prst="straightConnector1">
-            <a:avLst/>
-          </a:prstGeom>
-          <a:ln>
-            <a:solidFill>
-              <a:schemeClr val="bg1"/>
-            </a:solidFill>
-            <a:tailEnd type="triangle" w="lg" len="lg"/>
-          </a:ln>
-        </p:spPr>
-        <p:style>
-          <a:lnRef idx="1">
-            <a:schemeClr val="accent1"/>
-          </a:lnRef>
-          <a:fillRef idx="0">
-            <a:schemeClr val="accent1"/>
-          </a:fillRef>
-          <a:effectRef idx="0">
-            <a:schemeClr val="accent1"/>
-          </a:effectRef>
-          <a:fontRef idx="minor">
-            <a:schemeClr val="tx1"/>
-          </a:fontRef>
-        </p:style>
-      </p:cxnSp>
-      <p:sp>
-        <p:nvSpPr>
-          <p:cNvPr id="48" name="Rounded Rectangle 47"/>
-          <p:cNvSpPr/>
-          <p:nvPr/>
-        </p:nvSpPr>
-        <p:spPr>
-          <a:xfrm>
-            <a:off x="5932461" y="3825531"/>
-            <a:ext cx="1973943" cy="657679"/>
-          </a:xfrm>
-          <a:prstGeom prst="roundRect">
-            <a:avLst>
-              <a:gd name="adj" fmla="val 29908"/>
-            </a:avLst>
-          </a:prstGeom>
-          <a:solidFill>
-            <a:schemeClr val="tx1"/>
-          </a:solidFill>
-          <a:ln>
-            <a:solidFill>
-              <a:schemeClr val="bg1"/>
-            </a:solidFill>
-          </a:ln>
-        </p:spPr>
-        <p:style>
-          <a:lnRef idx="2">
-            <a:schemeClr val="accent1">
-              <a:shade val="50000"/>
-            </a:schemeClr>
-          </a:lnRef>
-          <a:fillRef idx="1">
-            <a:schemeClr val="accent1"/>
-          </a:fillRef>
-          <a:effectRef idx="0">
-            <a:schemeClr val="accent1"/>
-          </a:effectRef>
-          <a:fontRef idx="minor">
-            <a:schemeClr val="lt1"/>
-          </a:fontRef>
-        </p:style>
-        <p:txBody>
-          <a:bodyPr rtlCol="0" anchor="ctr"/>
-          <a:lstStyle/>
-          <a:p>
-            <a:pPr algn="ctr"/>
-            <a:r>
-              <a:rPr lang="en-IN" b="1" dirty="0" smtClean="0">
-                <a:solidFill>
-                  <a:schemeClr val="bg1"/>
-                </a:solidFill>
-                <a:latin typeface="Open Sans" panose="020B0606030504020204" pitchFamily="34" charset="0"/>
-                <a:ea typeface="Open Sans" panose="020B0606030504020204" pitchFamily="34" charset="0"/>
-                <a:cs typeface="Open Sans" panose="020B0606030504020204" pitchFamily="34" charset="0"/>
-              </a:rPr>
-              <a:t>Export Output</a:t>
-            </a:r>
-            <a:endParaRPr lang="en-IN" b="1" dirty="0">
-              <a:solidFill>
-                <a:schemeClr val="bg1"/>
-              </a:solidFill>
-              <a:latin typeface="Open Sans" panose="020B0606030504020204" pitchFamily="34" charset="0"/>
-              <a:ea typeface="Open Sans" panose="020B0606030504020204" pitchFamily="34" charset="0"/>
-              <a:cs typeface="Open Sans" panose="020B0606030504020204" pitchFamily="34" charset="0"/>
-            </a:endParaRPr>
-          </a:p>
-        </p:txBody>
-      </p:sp>
-      <p:sp>
-        <p:nvSpPr>
-          <p:cNvPr id="50" name="Diagonal Stripe 49"/>
-          <p:cNvSpPr/>
-          <p:nvPr/>
-        </p:nvSpPr>
-        <p:spPr>
-          <a:xfrm rot="7851648">
-            <a:off x="8108341" y="3798877"/>
-            <a:ext cx="792933" cy="710985"/>
-          </a:xfrm>
-          <a:prstGeom prst="diagStripe">
-            <a:avLst>
-              <a:gd name="adj" fmla="val 69907"/>
-            </a:avLst>
-          </a:prstGeom>
-          <a:solidFill>
-            <a:schemeClr val="bg1"/>
-          </a:solidFill>
-          <a:ln>
-            <a:noFill/>
-          </a:ln>
-        </p:spPr>
-        <p:style>
-          <a:lnRef idx="2">
-            <a:schemeClr val="accent1">
-              <a:shade val="50000"/>
-            </a:schemeClr>
-          </a:lnRef>
-          <a:fillRef idx="1">
-            <a:schemeClr val="accent1"/>
-          </a:fillRef>
-          <a:effectRef idx="0">
-            <a:schemeClr val="accent1"/>
-          </a:effectRef>
-          <a:fontRef idx="minor">
-            <a:schemeClr val="lt1"/>
-          </a:fontRef>
-        </p:style>
-        <p:txBody>
-          <a:bodyPr rtlCol="0" anchor="ctr"/>
-          <a:lstStyle/>
-          <a:p>
-            <a:pPr algn="ctr"/>
-            <a:endParaRPr lang="en-IN">
-              <a:solidFill>
-                <a:schemeClr val="tx1"/>
-              </a:solidFill>
-            </a:endParaRPr>
-          </a:p>
-        </p:txBody>
-      </p:sp>
-      <p:cxnSp>
-        <p:nvCxnSpPr>
-          <p:cNvPr id="51" name="Straight Arrow Connector 50"/>
-          <p:cNvCxnSpPr>
-            <a:stCxn id="50" idx="0"/>
-            <a:endCxn id="48" idx="3"/>
-          </p:cNvCxnSpPr>
-          <p:nvPr/>
-        </p:nvCxnSpPr>
-        <p:spPr>
-          <a:xfrm flipH="1">
-            <a:off x="7906404" y="4154370"/>
-            <a:ext cx="598403" cy="1"/>
-          </a:xfrm>
-          <a:prstGeom prst="straightConnector1">
-            <a:avLst/>
-          </a:prstGeom>
-          <a:ln>
-            <a:solidFill>
-              <a:schemeClr val="bg1"/>
-            </a:solidFill>
-            <a:tailEnd type="triangle" w="lg" len="lg"/>
-          </a:ln>
-        </p:spPr>
-        <p:style>
-          <a:lnRef idx="1">
-            <a:schemeClr val="accent1"/>
-          </a:lnRef>
-          <a:fillRef idx="0">
-            <a:schemeClr val="accent1"/>
-          </a:fillRef>
-          <a:effectRef idx="0">
-            <a:schemeClr val="accent1"/>
-          </a:effectRef>
-          <a:fontRef idx="minor">
-            <a:schemeClr val="tx1"/>
-          </a:fontRef>
-        </p:style>
-      </p:cxnSp>
-      <p:sp>
-        <p:nvSpPr>
-          <p:cNvPr id="64" name="Rounded Rectangle 63"/>
-          <p:cNvSpPr/>
-          <p:nvPr/>
-        </p:nvSpPr>
-        <p:spPr>
-          <a:xfrm>
-            <a:off x="2721239" y="3832532"/>
-            <a:ext cx="1973943" cy="657679"/>
-          </a:xfrm>
-          <a:prstGeom prst="roundRect">
-            <a:avLst>
-              <a:gd name="adj" fmla="val 29908"/>
-            </a:avLst>
-          </a:prstGeom>
-          <a:solidFill>
-            <a:schemeClr val="tx1"/>
-          </a:solidFill>
-          <a:ln>
-            <a:solidFill>
-              <a:schemeClr val="bg1"/>
-            </a:solidFill>
-          </a:ln>
-        </p:spPr>
-        <p:style>
-          <a:lnRef idx="2">
-            <a:schemeClr val="accent1">
-              <a:shade val="50000"/>
-            </a:schemeClr>
-          </a:lnRef>
-          <a:fillRef idx="1">
-            <a:schemeClr val="accent1"/>
-          </a:fillRef>
-          <a:effectRef idx="0">
-            <a:schemeClr val="accent1"/>
-          </a:effectRef>
-          <a:fontRef idx="minor">
-            <a:schemeClr val="lt1"/>
-          </a:fontRef>
-        </p:style>
-        <p:txBody>
-          <a:bodyPr rtlCol="0" anchor="ctr"/>
-          <a:lstStyle/>
-          <a:p>
-            <a:pPr algn="ctr"/>
-            <a:r>
-              <a:rPr lang="en-IN" sz="1600" b="1" dirty="0" smtClean="0">
-                <a:solidFill>
-                  <a:schemeClr val="bg1"/>
-                </a:solidFill>
-                <a:latin typeface="Open Sans" panose="020B0606030504020204" pitchFamily="34" charset="0"/>
-                <a:ea typeface="Open Sans" panose="020B0606030504020204" pitchFamily="34" charset="0"/>
-                <a:cs typeface="Open Sans" panose="020B0606030504020204" pitchFamily="34" charset="0"/>
-              </a:rPr>
-              <a:t>Analyse another Log File</a:t>
-            </a:r>
-            <a:endParaRPr lang="en-IN" sz="1600" b="1" dirty="0">
-              <a:solidFill>
-                <a:schemeClr val="bg1"/>
-              </a:solidFill>
-              <a:latin typeface="Open Sans" panose="020B0606030504020204" pitchFamily="34" charset="0"/>
-              <a:ea typeface="Open Sans" panose="020B0606030504020204" pitchFamily="34" charset="0"/>
-              <a:cs typeface="Open Sans" panose="020B0606030504020204" pitchFamily="34" charset="0"/>
-            </a:endParaRPr>
-          </a:p>
-        </p:txBody>
-      </p:sp>
-      <p:cxnSp>
-        <p:nvCxnSpPr>
-          <p:cNvPr id="65" name="Straight Arrow Connector 64"/>
-          <p:cNvCxnSpPr>
-            <a:stCxn id="48" idx="1"/>
-            <a:endCxn id="64" idx="3"/>
-          </p:cNvCxnSpPr>
-          <p:nvPr/>
-        </p:nvCxnSpPr>
-        <p:spPr>
-          <a:xfrm flipH="1">
-            <a:off x="4695182" y="4154371"/>
-            <a:ext cx="1237279" cy="7001"/>
-          </a:xfrm>
-          <a:prstGeom prst="straightConnector1">
-            <a:avLst/>
-          </a:prstGeom>
-          <a:ln>
-            <a:solidFill>
-              <a:schemeClr val="bg1"/>
-            </a:solidFill>
-            <a:tailEnd type="triangle" w="lg" len="lg"/>
-          </a:ln>
-        </p:spPr>
-        <p:style>
-          <a:lnRef idx="1">
-            <a:schemeClr val="accent1"/>
-          </a:lnRef>
-          <a:fillRef idx="0">
-            <a:schemeClr val="accent1"/>
-          </a:fillRef>
-          <a:effectRef idx="0">
-            <a:schemeClr val="accent1"/>
-          </a:effectRef>
-          <a:fontRef idx="minor">
-            <a:schemeClr val="tx1"/>
-          </a:fontRef>
-        </p:style>
-      </p:cxnSp>
-      <p:cxnSp>
-        <p:nvCxnSpPr>
-          <p:cNvPr id="68" name="Straight Arrow Connector 67"/>
-          <p:cNvCxnSpPr>
-            <a:stCxn id="64" idx="1"/>
-            <a:endCxn id="70" idx="6"/>
-          </p:cNvCxnSpPr>
-          <p:nvPr/>
-        </p:nvCxnSpPr>
-        <p:spPr>
-          <a:xfrm flipH="1">
-            <a:off x="1483960" y="4161372"/>
-            <a:ext cx="1237279" cy="7002"/>
-          </a:xfrm>
-          <a:prstGeom prst="straightConnector1">
-            <a:avLst/>
-          </a:prstGeom>
-          <a:ln>
-            <a:solidFill>
-              <a:schemeClr val="bg1"/>
-            </a:solidFill>
-            <a:tailEnd type="triangle" w="lg" len="lg"/>
-          </a:ln>
-        </p:spPr>
-        <p:style>
-          <a:lnRef idx="1">
-            <a:schemeClr val="accent1"/>
-          </a:lnRef>
-          <a:fillRef idx="0">
-            <a:schemeClr val="accent1"/>
-          </a:fillRef>
-          <a:effectRef idx="0">
-            <a:schemeClr val="accent1"/>
-          </a:effectRef>
-          <a:fontRef idx="minor">
-            <a:schemeClr val="tx1"/>
-          </a:fontRef>
-        </p:style>
-      </p:cxnSp>
-      <p:sp>
-        <p:nvSpPr>
-          <p:cNvPr id="70" name="Oval 69"/>
-          <p:cNvSpPr/>
-          <p:nvPr/>
-        </p:nvSpPr>
-        <p:spPr>
-          <a:xfrm>
-            <a:off x="1055538" y="3955649"/>
-            <a:ext cx="428422" cy="425450"/>
-          </a:xfrm>
-          <a:prstGeom prst="ellipse">
-            <a:avLst/>
-          </a:prstGeom>
-          <a:solidFill>
-            <a:schemeClr val="tx1"/>
-          </a:solidFill>
-          <a:ln w="101600" cmpd="dbl">
-            <a:solidFill>
-              <a:schemeClr val="bg1">
-                <a:alpha val="99000"/>
-              </a:schemeClr>
-            </a:solidFill>
-          </a:ln>
-        </p:spPr>
-        <p:style>
-          <a:lnRef idx="2">
-            <a:schemeClr val="accent1">
-              <a:shade val="50000"/>
-            </a:schemeClr>
-          </a:lnRef>
-          <a:fillRef idx="1">
-            <a:schemeClr val="accent1"/>
-          </a:fillRef>
-          <a:effectRef idx="0">
-            <a:schemeClr val="accent1"/>
-          </a:effectRef>
-          <a:fontRef idx="minor">
-            <a:schemeClr val="lt1"/>
-          </a:fontRef>
-        </p:style>
-        <p:txBody>
-          <a:bodyPr rtlCol="0" anchor="ctr"/>
-          <a:lstStyle/>
-          <a:p>
-            <a:pPr algn="ctr"/>
-            <a:endParaRPr lang="en-IN"/>
-          </a:p>
-        </p:txBody>
-      </p:sp>
-      <p:cxnSp>
-        <p:nvCxnSpPr>
-          <p:cNvPr id="75" name="Elbow Connector 74"/>
-          <p:cNvCxnSpPr>
-            <a:stCxn id="50" idx="0"/>
-          </p:cNvCxnSpPr>
-          <p:nvPr/>
-        </p:nvCxnSpPr>
-        <p:spPr>
-          <a:xfrm rot="5400000" flipH="1">
-            <a:off x="6793269" y="2442833"/>
-            <a:ext cx="850731" cy="2572344"/>
-          </a:xfrm>
-          <a:prstGeom prst="bentConnector4">
-            <a:avLst>
-              <a:gd name="adj1" fmla="val 25137"/>
-              <a:gd name="adj2" fmla="val 16425"/>
-            </a:avLst>
-          </a:prstGeom>
-          <a:ln>
-            <a:solidFill>
-              <a:schemeClr val="bg1"/>
-            </a:solidFill>
-            <a:tailEnd type="none"/>
-          </a:ln>
-        </p:spPr>
-        <p:style>
-          <a:lnRef idx="1">
-            <a:schemeClr val="accent1"/>
-          </a:lnRef>
-          <a:fillRef idx="0">
-            <a:schemeClr val="accent1"/>
-          </a:fillRef>
-          <a:effectRef idx="0">
-            <a:schemeClr val="accent1"/>
-          </a:effectRef>
-          <a:fontRef idx="minor">
-            <a:schemeClr val="tx1"/>
-          </a:fontRef>
-        </p:style>
-      </p:cxnSp>
-      <p:cxnSp>
-        <p:nvCxnSpPr>
-          <p:cNvPr id="80" name="Elbow Connector 79"/>
-          <p:cNvCxnSpPr>
-            <a:endCxn id="64" idx="3"/>
-          </p:cNvCxnSpPr>
-          <p:nvPr/>
-        </p:nvCxnSpPr>
-        <p:spPr>
-          <a:xfrm rot="10800000" flipV="1">
-            <a:off x="4695183" y="3303638"/>
-            <a:ext cx="1265659" cy="857733"/>
-          </a:xfrm>
-          <a:prstGeom prst="bentConnector3">
-            <a:avLst>
-              <a:gd name="adj1" fmla="val 50000"/>
-            </a:avLst>
-          </a:prstGeom>
-          <a:ln>
-            <a:solidFill>
-              <a:schemeClr val="bg1"/>
-            </a:solidFill>
-            <a:tailEnd type="triangle" w="lg" len="lg"/>
-          </a:ln>
-        </p:spPr>
-        <p:style>
-          <a:lnRef idx="1">
-            <a:schemeClr val="accent1"/>
-          </a:lnRef>
-          <a:fillRef idx="0">
-            <a:schemeClr val="accent1"/>
-          </a:fillRef>
-          <a:effectRef idx="0">
-            <a:schemeClr val="accent1"/>
-          </a:effectRef>
-          <a:fontRef idx="minor">
-            <a:schemeClr val="tx1"/>
-          </a:fontRef>
-        </p:style>
-      </p:cxnSp>
-      <p:cxnSp>
-        <p:nvCxnSpPr>
-          <p:cNvPr id="11" name="Elbow Connector 10"/>
-          <p:cNvCxnSpPr>
-            <a:stCxn id="64" idx="0"/>
-            <a:endCxn id="25" idx="2"/>
-          </p:cNvCxnSpPr>
-          <p:nvPr/>
-        </p:nvCxnSpPr>
-        <p:spPr>
-          <a:xfrm rot="5400000" flipH="1" flipV="1">
-            <a:off x="4725613" y="1638712"/>
-            <a:ext cx="1176419" cy="3211223"/>
-          </a:xfrm>
-          <a:prstGeom prst="bentConnector3">
-            <a:avLst>
-              <a:gd name="adj1" fmla="val 75504"/>
-            </a:avLst>
-          </a:prstGeom>
-          <a:ln>
-            <a:solidFill>
-              <a:schemeClr val="bg1"/>
-            </a:solidFill>
-            <a:tailEnd type="triangle" w="lg" len="lg"/>
-          </a:ln>
-        </p:spPr>
-        <p:style>
-          <a:lnRef idx="1">
-            <a:schemeClr val="accent1"/>
-          </a:lnRef>
-          <a:fillRef idx="0">
-            <a:schemeClr val="accent1"/>
-          </a:fillRef>
-          <a:effectRef idx="0">
-            <a:schemeClr val="accent1"/>
-          </a:effectRef>
-          <a:fontRef idx="minor">
-            <a:schemeClr val="tx1"/>
-          </a:fontRef>
-        </p:style>
-      </p:cxnSp>
-      <p:cxnSp>
-        <p:nvCxnSpPr>
-          <p:cNvPr id="41" name="Elbow Connector 40"/>
-          <p:cNvCxnSpPr>
-            <a:stCxn id="48" idx="2"/>
-            <a:endCxn id="70" idx="4"/>
-          </p:cNvCxnSpPr>
-          <p:nvPr/>
-        </p:nvCxnSpPr>
-        <p:spPr>
-          <a:xfrm rot="5400000" flipH="1">
-            <a:off x="4043535" y="1607313"/>
-            <a:ext cx="102111" cy="5649684"/>
-          </a:xfrm>
-          <a:prstGeom prst="bentConnector3">
-            <a:avLst>
-              <a:gd name="adj1" fmla="val -536589"/>
-            </a:avLst>
-          </a:prstGeom>
-          <a:ln>
-            <a:solidFill>
-              <a:schemeClr val="bg1"/>
-            </a:solidFill>
-            <a:tailEnd type="triangle" w="lg" len="lg"/>
-          </a:ln>
-        </p:spPr>
-        <p:style>
-          <a:lnRef idx="1">
-            <a:schemeClr val="accent1"/>
-          </a:lnRef>
-          <a:fillRef idx="0">
-            <a:schemeClr val="accent1"/>
-          </a:fillRef>
-          <a:effectRef idx="0">
-            <a:schemeClr val="accent1"/>
-          </a:effectRef>
-          <a:fontRef idx="minor">
-            <a:schemeClr val="tx1"/>
-          </a:fontRef>
-        </p:style>
-      </p:cxnSp>
+              <a:tailEnd type="triangle" w="lg" len="lg"/>
+            </a:ln>
+          </p:spPr>
+          <p:style>
+            <a:lnRef idx="1">
+              <a:schemeClr val="accent1"/>
+            </a:lnRef>
+            <a:fillRef idx="0">
+              <a:schemeClr val="accent1"/>
+            </a:fillRef>
+            <a:effectRef idx="0">
+              <a:schemeClr val="accent1"/>
+            </a:effectRef>
+            <a:fontRef idx="minor">
+              <a:schemeClr val="tx1"/>
+            </a:fontRef>
+          </p:style>
+        </p:cxnSp>
+      </p:grpSp>
     </p:spTree>
     <p:extLst>
       <p:ext uri="{BB962C8B-B14F-4D97-AF65-F5344CB8AC3E}">

</xml_diff>